<commit_message>
test case changes - screenshots - results
- small changes/adjustments to test cases
- screenshots of test cases & their results
</commit_message>
<xml_diff>
--- a/phase_2/phase_2_db_presentation.pptx
+++ b/phase_2/phase_2_db_presentation.pptx
@@ -3477,41 +3477,6 @@
           </a:p>
         </p:txBody>
       </p:sp>
-      <p:pic>
-        <p:nvPicPr>
-          <p:cNvPr id="6" name="Inhaltsplatzhalter 5" descr="Ein Bild, das Text, Screenshot, Quittung, Schrift enthält.&#10;&#10;Automatisch generierte Beschreibung">
-            <a:extLst>
-              <a:ext uri="{FF2B5EF4-FFF2-40B4-BE49-F238E27FC236}">
-                <a16:creationId xmlns:a16="http://schemas.microsoft.com/office/drawing/2014/main" id="{33F72CD2-EA9B-B1DE-33E6-A55C5A30DAE7}"/>
-              </a:ext>
-            </a:extLst>
-          </p:cNvPr>
-          <p:cNvPicPr>
-            <a:picLocks noGrp="1" noChangeAspect="1"/>
-          </p:cNvPicPr>
-          <p:nvPr>
-            <p:ph sz="half" idx="1"/>
-          </p:nvPr>
-        </p:nvPicPr>
-        <p:blipFill>
-          <a:blip r:embed="rId2">
-            <a:extLst>
-              <a:ext uri="{28A0092B-C50C-407E-A947-70E740481C1C}">
-                <a14:useLocalDpi xmlns:a14="http://schemas.microsoft.com/office/drawing/2010/main" val="0"/>
-              </a:ext>
-            </a:extLst>
-          </a:blip>
-          <a:stretch>
-            <a:fillRect/>
-          </a:stretch>
-        </p:blipFill>
-        <p:spPr>
-          <a:xfrm>
-            <a:off x="2855119" y="3184525"/>
-            <a:ext cx="1724025" cy="2009775"/>
-          </a:xfrm>
-        </p:spPr>
-      </p:pic>
       <p:sp>
         <p:nvSpPr>
           <p:cNvPr id="4" name="Inhaltsplatzhalter 3">
@@ -3528,10 +3493,15 @@
             <p:ph sz="half" idx="2"/>
           </p:nvPr>
         </p:nvSpPr>
-        <p:spPr/>
+        <p:spPr>
+          <a:xfrm>
+            <a:off x="6338315" y="2490451"/>
+            <a:ext cx="4270247" cy="3534156"/>
+          </a:xfrm>
+        </p:spPr>
         <p:txBody>
           <a:bodyPr>
-            <a:normAutofit lnSpcReduction="10000"/>
+            <a:normAutofit fontScale="92500" lnSpcReduction="20000"/>
           </a:bodyPr>
           <a:lstStyle/>
           <a:p>
@@ -3564,6 +3534,12 @@
             <a:r>
               <a:rPr lang="en-US" dirty="0"/>
               <a:t>User and author_user ids and timestamps are also saved</a:t>
+            </a:r>
+          </a:p>
+          <a:p>
+            <a:r>
+              <a:rPr lang="en-US" dirty="0"/>
+              <a:t>The test case tests the content and relationship of user reviews and users by returning all data entries of user reviews for a given user.</a:t>
             </a:r>
           </a:p>
         </p:txBody>
@@ -3583,7 +3559,7 @@
           <p:nvPr/>
         </p:nvPicPr>
         <p:blipFill>
-          <a:blip r:embed="rId3">
+          <a:blip r:embed="rId2">
             <a:extLst>
               <a:ext uri="{28A0092B-C50C-407E-A947-70E740481C1C}">
                 <a14:useLocalDpi xmlns:a14="http://schemas.microsoft.com/office/drawing/2010/main" val="0"/>
@@ -3598,6 +3574,113 @@
           <a:xfrm>
             <a:off x="11633200" y="6299200"/>
             <a:ext cx="457200" cy="457200"/>
+          </a:xfrm>
+          <a:prstGeom prst="rect">
+            <a:avLst/>
+          </a:prstGeom>
+        </p:spPr>
+      </p:pic>
+      <p:pic>
+        <p:nvPicPr>
+          <p:cNvPr id="11" name="Inhaltsplatzhalter 10" descr="Ein Bild, das Text, Screenshot, Software enthält.&#10;&#10;Automatisch generierte Beschreibung">
+            <a:extLst>
+              <a:ext uri="{FF2B5EF4-FFF2-40B4-BE49-F238E27FC236}">
+                <a16:creationId xmlns:a16="http://schemas.microsoft.com/office/drawing/2014/main" id="{5576E20E-93EB-363E-B527-9243C177E0E6}"/>
+              </a:ext>
+            </a:extLst>
+          </p:cNvPr>
+          <p:cNvPicPr>
+            <a:picLocks noGrp="1" noChangeAspect="1"/>
+          </p:cNvPicPr>
+          <p:nvPr>
+            <p:ph sz="half" idx="1"/>
+          </p:nvPr>
+        </p:nvPicPr>
+        <p:blipFill>
+          <a:blip r:embed="rId3">
+            <a:extLst>
+              <a:ext uri="{28A0092B-C50C-407E-A947-70E740481C1C}">
+                <a14:useLocalDpi xmlns:a14="http://schemas.microsoft.com/office/drawing/2010/main" val="0"/>
+              </a:ext>
+            </a:extLst>
+          </a:blip>
+          <a:stretch>
+            <a:fillRect/>
+          </a:stretch>
+        </p:blipFill>
+        <p:spPr>
+          <a:xfrm>
+            <a:off x="752627" y="2989262"/>
+            <a:ext cx="5382578" cy="1963738"/>
+          </a:xfrm>
+        </p:spPr>
+      </p:pic>
+      <p:pic>
+        <p:nvPicPr>
+          <p:cNvPr id="13" name="Grafik 12" descr="Ein Bild, das Text, Screenshot, Schrift, Quittung enthält.&#10;&#10;Automatisch generierte Beschreibung">
+            <a:extLst>
+              <a:ext uri="{FF2B5EF4-FFF2-40B4-BE49-F238E27FC236}">
+                <a16:creationId xmlns:a16="http://schemas.microsoft.com/office/drawing/2014/main" id="{773877CB-C571-D1BA-61B7-B4E2D51931BA}"/>
+              </a:ext>
+            </a:extLst>
+          </p:cNvPr>
+          <p:cNvPicPr>
+            <a:picLocks noChangeAspect="1"/>
+          </p:cNvPicPr>
+          <p:nvPr/>
+        </p:nvPicPr>
+        <p:blipFill>
+          <a:blip r:embed="rId4">
+            <a:extLst>
+              <a:ext uri="{28A0092B-C50C-407E-A947-70E740481C1C}">
+                <a14:useLocalDpi xmlns:a14="http://schemas.microsoft.com/office/drawing/2010/main" val="0"/>
+              </a:ext>
+            </a:extLst>
+          </a:blip>
+          <a:stretch>
+            <a:fillRect/>
+          </a:stretch>
+        </p:blipFill>
+        <p:spPr>
+          <a:xfrm>
+            <a:off x="4724293" y="3429000"/>
+            <a:ext cx="1533631" cy="1778001"/>
+          </a:xfrm>
+          <a:prstGeom prst="rect">
+            <a:avLst/>
+          </a:prstGeom>
+        </p:spPr>
+      </p:pic>
+      <p:pic>
+        <p:nvPicPr>
+          <p:cNvPr id="15" name="Grafik 14">
+            <a:extLst>
+              <a:ext uri="{FF2B5EF4-FFF2-40B4-BE49-F238E27FC236}">
+                <a16:creationId xmlns:a16="http://schemas.microsoft.com/office/drawing/2014/main" id="{B6EB1A78-F5C0-58C2-F3B8-29F2DA54591F}"/>
+              </a:ext>
+            </a:extLst>
+          </p:cNvPr>
+          <p:cNvPicPr>
+            <a:picLocks noChangeAspect="1"/>
+          </p:cNvPicPr>
+          <p:nvPr/>
+        </p:nvPicPr>
+        <p:blipFill>
+          <a:blip r:embed="rId5">
+            <a:extLst>
+              <a:ext uri="{28A0092B-C50C-407E-A947-70E740481C1C}">
+                <a14:useLocalDpi xmlns:a14="http://schemas.microsoft.com/office/drawing/2010/main" val="0"/>
+              </a:ext>
+            </a:extLst>
+          </a:blip>
+          <a:stretch>
+            <a:fillRect/>
+          </a:stretch>
+        </p:blipFill>
+        <p:spPr>
+          <a:xfrm>
+            <a:off x="752627" y="5842453"/>
+            <a:ext cx="9855935" cy="638084"/>
           </a:xfrm>
           <a:prstGeom prst="rect">
             <a:avLst/>
@@ -3662,41 +3745,6 @@
           </a:p>
         </p:txBody>
       </p:sp>
-      <p:pic>
-        <p:nvPicPr>
-          <p:cNvPr id="6" name="Inhaltsplatzhalter 5" descr="Ein Bild, das Text, Screenshot, Quittung, Schrift enthält.&#10;&#10;Automatisch generierte Beschreibung">
-            <a:extLst>
-              <a:ext uri="{FF2B5EF4-FFF2-40B4-BE49-F238E27FC236}">
-                <a16:creationId xmlns:a16="http://schemas.microsoft.com/office/drawing/2014/main" id="{317DD520-10FF-9B63-194E-984567D9FA3D}"/>
-              </a:ext>
-            </a:extLst>
-          </p:cNvPr>
-          <p:cNvPicPr>
-            <a:picLocks noGrp="1" noChangeAspect="1"/>
-          </p:cNvPicPr>
-          <p:nvPr>
-            <p:ph sz="half" idx="1"/>
-          </p:nvPr>
-        </p:nvPicPr>
-        <p:blipFill>
-          <a:blip r:embed="rId2">
-            <a:extLst>
-              <a:ext uri="{28A0092B-C50C-407E-A947-70E740481C1C}">
-                <a14:useLocalDpi xmlns:a14="http://schemas.microsoft.com/office/drawing/2010/main" val="0"/>
-              </a:ext>
-            </a:extLst>
-          </a:blip>
-          <a:stretch>
-            <a:fillRect/>
-          </a:stretch>
-        </p:blipFill>
-        <p:spPr>
-          <a:xfrm>
-            <a:off x="2855119" y="3041650"/>
-            <a:ext cx="1724025" cy="2295525"/>
-          </a:xfrm>
-        </p:spPr>
-      </p:pic>
       <p:sp>
         <p:nvSpPr>
           <p:cNvPr id="4" name="Inhaltsplatzhalter 3">
@@ -3715,7 +3763,9 @@
         </p:nvSpPr>
         <p:spPr/>
         <p:txBody>
-          <a:bodyPr/>
+          <a:bodyPr>
+            <a:normAutofit fontScale="92500" lnSpcReduction="20000"/>
+          </a:bodyPr>
           <a:lstStyle/>
           <a:p>
             <a:r>
@@ -3733,6 +3783,12 @@
             <a:r>
               <a:rPr lang="en-US" dirty="0"/>
               <a:t>An address can be used by either users, properties (listings) or banks.</a:t>
+            </a:r>
+          </a:p>
+          <a:p>
+            <a:r>
+              <a:rPr lang="en-US" dirty="0"/>
+              <a:t>This table is tested is a part of many other tables and is therefore already tested more than enough. There is still a simple select all test to check for completeness of content in the test.sql file.</a:t>
             </a:r>
           </a:p>
         </p:txBody>
@@ -3752,7 +3808,7 @@
           <p:nvPr/>
         </p:nvPicPr>
         <p:blipFill>
-          <a:blip r:embed="rId3">
+          <a:blip r:embed="rId2">
             <a:extLst>
               <a:ext uri="{28A0092B-C50C-407E-A947-70E740481C1C}">
                 <a14:useLocalDpi xmlns:a14="http://schemas.microsoft.com/office/drawing/2010/main" val="0"/>
@@ -3773,6 +3829,135 @@
           </a:prstGeom>
         </p:spPr>
       </p:pic>
+      <p:pic>
+        <p:nvPicPr>
+          <p:cNvPr id="11" name="Inhaltsplatzhalter 10" descr="Ein Bild, das Text, Screenshot, Schrift, Zahl enthält.&#10;&#10;Automatisch generierte Beschreibung">
+            <a:extLst>
+              <a:ext uri="{FF2B5EF4-FFF2-40B4-BE49-F238E27FC236}">
+                <a16:creationId xmlns:a16="http://schemas.microsoft.com/office/drawing/2014/main" id="{6C3AEB56-B09A-0EC0-B9F5-398750AF08E1}"/>
+              </a:ext>
+            </a:extLst>
+          </p:cNvPr>
+          <p:cNvPicPr>
+            <a:picLocks noGrp="1" noChangeAspect="1"/>
+          </p:cNvPicPr>
+          <p:nvPr>
+            <p:ph sz="half" idx="1"/>
+          </p:nvPr>
+        </p:nvPicPr>
+        <p:blipFill>
+          <a:blip r:embed="rId3">
+            <a:extLst>
+              <a:ext uri="{28A0092B-C50C-407E-A947-70E740481C1C}">
+                <a14:useLocalDpi xmlns:a14="http://schemas.microsoft.com/office/drawing/2010/main" val="0"/>
+              </a:ext>
+            </a:extLst>
+          </a:blip>
+          <a:stretch>
+            <a:fillRect/>
+          </a:stretch>
+        </p:blipFill>
+        <p:spPr>
+          <a:xfrm>
+            <a:off x="2850356" y="2638044"/>
+            <a:ext cx="1733550" cy="2581275"/>
+          </a:xfrm>
+        </p:spPr>
+      </p:pic>
+      <p:sp>
+        <p:nvSpPr>
+          <p:cNvPr id="8" name="Rechteck 7">
+            <a:extLst>
+              <a:ext uri="{FF2B5EF4-FFF2-40B4-BE49-F238E27FC236}">
+                <a16:creationId xmlns:a16="http://schemas.microsoft.com/office/drawing/2014/main" id="{6AC08763-1958-CBE3-D3E6-EB528FCA8F1F}"/>
+              </a:ext>
+            </a:extLst>
+          </p:cNvPr>
+          <p:cNvSpPr/>
+          <p:nvPr/>
+        </p:nvSpPr>
+        <p:spPr>
+          <a:xfrm>
+            <a:off x="2428081" y="5283133"/>
+            <a:ext cx="2578100" cy="610175"/>
+          </a:xfrm>
+          <a:prstGeom prst="rect">
+            <a:avLst/>
+          </a:prstGeom>
+          <a:solidFill>
+            <a:schemeClr val="bg1"/>
+          </a:solidFill>
+          <a:ln w="19050">
+            <a:solidFill>
+              <a:srgbClr val="404040"/>
+            </a:solidFill>
+          </a:ln>
+        </p:spPr>
+        <p:style>
+          <a:lnRef idx="2">
+            <a:schemeClr val="accent1">
+              <a:shade val="15000"/>
+            </a:schemeClr>
+          </a:lnRef>
+          <a:fillRef idx="1">
+            <a:schemeClr val="accent1"/>
+          </a:fillRef>
+          <a:effectRef idx="0">
+            <a:schemeClr val="accent1"/>
+          </a:effectRef>
+          <a:fontRef idx="minor">
+            <a:schemeClr val="lt1"/>
+          </a:fontRef>
+        </p:style>
+        <p:txBody>
+          <a:bodyPr rtlCol="0" anchor="ctr"/>
+          <a:lstStyle/>
+          <a:p>
+            <a:pPr algn="ctr"/>
+            <a:endParaRPr lang="en-US">
+              <a:solidFill>
+                <a:sysClr val="windowText" lastClr="000000"/>
+              </a:solidFill>
+            </a:endParaRPr>
+          </a:p>
+        </p:txBody>
+      </p:sp>
+      <p:sp>
+        <p:nvSpPr>
+          <p:cNvPr id="9" name="Textfeld 8">
+            <a:extLst>
+              <a:ext uri="{FF2B5EF4-FFF2-40B4-BE49-F238E27FC236}">
+                <a16:creationId xmlns:a16="http://schemas.microsoft.com/office/drawing/2014/main" id="{C7779F64-5D44-2924-2BF1-0B6F078B7B58}"/>
+              </a:ext>
+            </a:extLst>
+          </p:cNvPr>
+          <p:cNvSpPr txBox="1"/>
+          <p:nvPr/>
+        </p:nvSpPr>
+        <p:spPr>
+          <a:xfrm>
+            <a:off x="2428081" y="5308533"/>
+            <a:ext cx="2578100" cy="584775"/>
+          </a:xfrm>
+          <a:prstGeom prst="rect">
+            <a:avLst/>
+          </a:prstGeom>
+          <a:noFill/>
+        </p:spPr>
+        <p:txBody>
+          <a:bodyPr wrap="square" rtlCol="0">
+            <a:spAutoFit/>
+          </a:bodyPr>
+          <a:lstStyle/>
+          <a:p>
+            <a:pPr algn="ctr"/>
+            <a:r>
+              <a:rPr lang="en-US" sz="1600" dirty="0"/>
+              <a:t>Tested via multiple other test cases</a:t>
+            </a:r>
+          </a:p>
+        </p:txBody>
+      </p:sp>
     </p:spTree>
     <p:extLst>
       <p:ext uri="{BB962C8B-B14F-4D97-AF65-F5344CB8AC3E}">
@@ -3831,41 +4016,6 @@
           </a:p>
         </p:txBody>
       </p:sp>
-      <p:pic>
-        <p:nvPicPr>
-          <p:cNvPr id="6" name="Inhaltsplatzhalter 5" descr="Ein Bild, das Text, Quittung, Screenshot, Schrift enthält.&#10;&#10;Automatisch generierte Beschreibung">
-            <a:extLst>
-              <a:ext uri="{FF2B5EF4-FFF2-40B4-BE49-F238E27FC236}">
-                <a16:creationId xmlns:a16="http://schemas.microsoft.com/office/drawing/2014/main" id="{40261B95-DEC7-BCA2-2AF1-1B92A5671A81}"/>
-              </a:ext>
-            </a:extLst>
-          </p:cNvPr>
-          <p:cNvPicPr>
-            <a:picLocks noGrp="1" noChangeAspect="1"/>
-          </p:cNvPicPr>
-          <p:nvPr>
-            <p:ph sz="half" idx="1"/>
-          </p:nvPr>
-        </p:nvPicPr>
-        <p:blipFill>
-          <a:blip r:embed="rId2">
-            <a:extLst>
-              <a:ext uri="{28A0092B-C50C-407E-A947-70E740481C1C}">
-                <a14:useLocalDpi xmlns:a14="http://schemas.microsoft.com/office/drawing/2010/main" val="0"/>
-              </a:ext>
-            </a:extLst>
-          </a:blip>
-          <a:stretch>
-            <a:fillRect/>
-          </a:stretch>
-        </p:blipFill>
-        <p:spPr>
-          <a:xfrm>
-            <a:off x="2855119" y="3470275"/>
-            <a:ext cx="1724025" cy="1438275"/>
-          </a:xfrm>
-        </p:spPr>
-      </p:pic>
       <p:sp>
         <p:nvSpPr>
           <p:cNvPr id="4" name="Inhaltsplatzhalter 3">
@@ -3882,10 +4032,15 @@
             <p:ph sz="half" idx="2"/>
           </p:nvPr>
         </p:nvSpPr>
-        <p:spPr/>
+        <p:spPr>
+          <a:xfrm>
+            <a:off x="6338315" y="2638044"/>
+            <a:ext cx="4270247" cy="3591306"/>
+          </a:xfrm>
+        </p:spPr>
         <p:txBody>
           <a:bodyPr>
-            <a:normAutofit fontScale="92500" lnSpcReduction="10000"/>
+            <a:normAutofit fontScale="85000" lnSpcReduction="20000"/>
           </a:bodyPr>
           <a:lstStyle/>
           <a:p>
@@ -3910,6 +4065,12 @@
             <a:r>
               <a:rPr lang="en-US" dirty="0"/>
               <a:t>The ‘created’ attribute is defaulted to the current timestamp, meaning it shows the time the image was uploaded.</a:t>
+            </a:r>
+          </a:p>
+          <a:p>
+            <a:r>
+              <a:rPr lang="en-US" dirty="0"/>
+              <a:t>Like the ‘Address’ table, the ‘Image’ table is also part of many other tables, meaning that the relationships of this table are already thoroughly tested. There is, again, still a select all test to check for completeness of content.</a:t>
             </a:r>
           </a:p>
         </p:txBody>
@@ -3929,7 +4090,7 @@
           <p:nvPr/>
         </p:nvPicPr>
         <p:blipFill>
-          <a:blip r:embed="rId3">
+          <a:blip r:embed="rId2">
             <a:extLst>
               <a:ext uri="{28A0092B-C50C-407E-A947-70E740481C1C}">
                 <a14:useLocalDpi xmlns:a14="http://schemas.microsoft.com/office/drawing/2010/main" val="0"/>
@@ -3948,6 +4109,135 @@
           <a:prstGeom prst="rect">
             <a:avLst/>
           </a:prstGeom>
+        </p:spPr>
+      </p:pic>
+      <p:sp>
+        <p:nvSpPr>
+          <p:cNvPr id="3" name="Rechteck 2">
+            <a:extLst>
+              <a:ext uri="{FF2B5EF4-FFF2-40B4-BE49-F238E27FC236}">
+                <a16:creationId xmlns:a16="http://schemas.microsoft.com/office/drawing/2014/main" id="{C9CE2BF6-A022-B9E4-8962-66659C5F67E5}"/>
+              </a:ext>
+            </a:extLst>
+          </p:cNvPr>
+          <p:cNvSpPr/>
+          <p:nvPr/>
+        </p:nvSpPr>
+        <p:spPr>
+          <a:xfrm>
+            <a:off x="2428081" y="5283133"/>
+            <a:ext cx="2578100" cy="610175"/>
+          </a:xfrm>
+          <a:prstGeom prst="rect">
+            <a:avLst/>
+          </a:prstGeom>
+          <a:solidFill>
+            <a:schemeClr val="bg1"/>
+          </a:solidFill>
+          <a:ln w="19050">
+            <a:solidFill>
+              <a:srgbClr val="404040"/>
+            </a:solidFill>
+          </a:ln>
+        </p:spPr>
+        <p:style>
+          <a:lnRef idx="2">
+            <a:schemeClr val="accent1">
+              <a:shade val="15000"/>
+            </a:schemeClr>
+          </a:lnRef>
+          <a:fillRef idx="1">
+            <a:schemeClr val="accent1"/>
+          </a:fillRef>
+          <a:effectRef idx="0">
+            <a:schemeClr val="accent1"/>
+          </a:effectRef>
+          <a:fontRef idx="minor">
+            <a:schemeClr val="lt1"/>
+          </a:fontRef>
+        </p:style>
+        <p:txBody>
+          <a:bodyPr rtlCol="0" anchor="ctr"/>
+          <a:lstStyle/>
+          <a:p>
+            <a:pPr algn="ctr"/>
+            <a:endParaRPr lang="en-US">
+              <a:solidFill>
+                <a:sysClr val="windowText" lastClr="000000"/>
+              </a:solidFill>
+            </a:endParaRPr>
+          </a:p>
+        </p:txBody>
+      </p:sp>
+      <p:sp>
+        <p:nvSpPr>
+          <p:cNvPr id="5" name="Textfeld 4">
+            <a:extLst>
+              <a:ext uri="{FF2B5EF4-FFF2-40B4-BE49-F238E27FC236}">
+                <a16:creationId xmlns:a16="http://schemas.microsoft.com/office/drawing/2014/main" id="{58CF1F12-98FD-466F-A63D-6D37F4E98183}"/>
+              </a:ext>
+            </a:extLst>
+          </p:cNvPr>
+          <p:cNvSpPr txBox="1"/>
+          <p:nvPr/>
+        </p:nvSpPr>
+        <p:spPr>
+          <a:xfrm>
+            <a:off x="2428081" y="5308533"/>
+            <a:ext cx="2578100" cy="584775"/>
+          </a:xfrm>
+          <a:prstGeom prst="rect">
+            <a:avLst/>
+          </a:prstGeom>
+          <a:noFill/>
+        </p:spPr>
+        <p:txBody>
+          <a:bodyPr wrap="square" rtlCol="0">
+            <a:spAutoFit/>
+          </a:bodyPr>
+          <a:lstStyle/>
+          <a:p>
+            <a:pPr algn="ctr"/>
+            <a:r>
+              <a:rPr lang="en-US" sz="1600" dirty="0"/>
+              <a:t>Tested via multiple other test cases</a:t>
+            </a:r>
+          </a:p>
+        </p:txBody>
+      </p:sp>
+      <p:pic>
+        <p:nvPicPr>
+          <p:cNvPr id="11" name="Inhaltsplatzhalter 10" descr="Ein Bild, das Text, Quittung, Screenshot, Schrift enthält.&#10;&#10;Automatisch generierte Beschreibung">
+            <a:extLst>
+              <a:ext uri="{FF2B5EF4-FFF2-40B4-BE49-F238E27FC236}">
+                <a16:creationId xmlns:a16="http://schemas.microsoft.com/office/drawing/2014/main" id="{AE22C404-2E2E-FDCC-9117-F689FF01ECB9}"/>
+              </a:ext>
+            </a:extLst>
+          </p:cNvPr>
+          <p:cNvPicPr>
+            <a:picLocks noGrp="1" noChangeAspect="1"/>
+          </p:cNvPicPr>
+          <p:nvPr>
+            <p:ph sz="half" idx="1"/>
+          </p:nvPr>
+        </p:nvPicPr>
+        <p:blipFill>
+          <a:blip r:embed="rId3">
+            <a:extLst>
+              <a:ext uri="{28A0092B-C50C-407E-A947-70E740481C1C}">
+                <a14:useLocalDpi xmlns:a14="http://schemas.microsoft.com/office/drawing/2010/main" val="0"/>
+              </a:ext>
+            </a:extLst>
+          </a:blip>
+          <a:stretch>
+            <a:fillRect/>
+          </a:stretch>
+        </p:blipFill>
+        <p:spPr>
+          <a:xfrm>
+            <a:off x="2850356" y="3470275"/>
+            <a:ext cx="1733550" cy="1438275"/>
+          </a:xfrm>
         </p:spPr>
       </p:pic>
     </p:spTree>
@@ -4008,41 +4298,6 @@
           </a:p>
         </p:txBody>
       </p:sp>
-      <p:pic>
-        <p:nvPicPr>
-          <p:cNvPr id="9" name="Inhaltsplatzhalter 8" descr="Ein Bild, das Text, Screenshot, Quittung, Schrift enthält.&#10;&#10;Automatisch generierte Beschreibung">
-            <a:extLst>
-              <a:ext uri="{FF2B5EF4-FFF2-40B4-BE49-F238E27FC236}">
-                <a16:creationId xmlns:a16="http://schemas.microsoft.com/office/drawing/2014/main" id="{72CB893A-86A1-3C3E-2847-2CA25C7683B9}"/>
-              </a:ext>
-            </a:extLst>
-          </p:cNvPr>
-          <p:cNvPicPr>
-            <a:picLocks noGrp="1" noChangeAspect="1"/>
-          </p:cNvPicPr>
-          <p:nvPr>
-            <p:ph sz="half" idx="1"/>
-          </p:nvPr>
-        </p:nvPicPr>
-        <p:blipFill>
-          <a:blip r:embed="rId2">
-            <a:extLst>
-              <a:ext uri="{28A0092B-C50C-407E-A947-70E740481C1C}">
-                <a14:useLocalDpi xmlns:a14="http://schemas.microsoft.com/office/drawing/2010/main" val="0"/>
-              </a:ext>
-            </a:extLst>
-          </a:blip>
-          <a:stretch>
-            <a:fillRect/>
-          </a:stretch>
-        </p:blipFill>
-        <p:spPr>
-          <a:xfrm>
-            <a:off x="2855119" y="3613150"/>
-            <a:ext cx="1724025" cy="1152525"/>
-          </a:xfrm>
-        </p:spPr>
-      </p:pic>
       <p:sp>
         <p:nvSpPr>
           <p:cNvPr id="4" name="Inhaltsplatzhalter 3">
@@ -4059,9 +4314,16 @@
             <p:ph sz="half" idx="2"/>
           </p:nvPr>
         </p:nvSpPr>
-        <p:spPr/>
-        <p:txBody>
-          <a:bodyPr/>
+        <p:spPr>
+          <a:xfrm>
+            <a:off x="6338315" y="2638044"/>
+            <a:ext cx="4270247" cy="3661156"/>
+          </a:xfrm>
+        </p:spPr>
+        <p:txBody>
+          <a:bodyPr>
+            <a:normAutofit fontScale="92500" lnSpcReduction="10000"/>
+          </a:bodyPr>
           <a:lstStyle/>
           <a:p>
             <a:r>
@@ -4085,6 +4347,12 @@
             <a:r>
               <a:rPr lang="en-US" dirty="0"/>
               <a:t>Currency is not a table that will see frequent changes and is rather used as a reference.</a:t>
+            </a:r>
+          </a:p>
+          <a:p>
+            <a:r>
+              <a:rPr lang="en-US" dirty="0"/>
+              <a:t>This table is very simple and does not require complicated testing, a simple select all test can be found in the test.sql file.</a:t>
             </a:r>
           </a:p>
         </p:txBody>
@@ -4104,7 +4372,7 @@
           <p:nvPr/>
         </p:nvPicPr>
         <p:blipFill>
-          <a:blip r:embed="rId3">
+          <a:blip r:embed="rId2">
             <a:extLst>
               <a:ext uri="{28A0092B-C50C-407E-A947-70E740481C1C}">
                 <a14:useLocalDpi xmlns:a14="http://schemas.microsoft.com/office/drawing/2010/main" val="0"/>
@@ -4123,6 +4391,140 @@
           <a:prstGeom prst="rect">
             <a:avLst/>
           </a:prstGeom>
+        </p:spPr>
+      </p:pic>
+      <p:sp>
+        <p:nvSpPr>
+          <p:cNvPr id="3" name="Rechteck 2">
+            <a:extLst>
+              <a:ext uri="{FF2B5EF4-FFF2-40B4-BE49-F238E27FC236}">
+                <a16:creationId xmlns:a16="http://schemas.microsoft.com/office/drawing/2014/main" id="{ECAFBDAD-B853-FD0A-3524-39E2CACBF339}"/>
+              </a:ext>
+            </a:extLst>
+          </p:cNvPr>
+          <p:cNvSpPr/>
+          <p:nvPr/>
+        </p:nvSpPr>
+        <p:spPr>
+          <a:xfrm>
+            <a:off x="2428081" y="5283133"/>
+            <a:ext cx="2578100" cy="610175"/>
+          </a:xfrm>
+          <a:prstGeom prst="rect">
+            <a:avLst/>
+          </a:prstGeom>
+          <a:solidFill>
+            <a:schemeClr val="bg1"/>
+          </a:solidFill>
+          <a:ln w="19050">
+            <a:solidFill>
+              <a:srgbClr val="404040"/>
+            </a:solidFill>
+          </a:ln>
+        </p:spPr>
+        <p:style>
+          <a:lnRef idx="2">
+            <a:schemeClr val="accent1">
+              <a:shade val="15000"/>
+            </a:schemeClr>
+          </a:lnRef>
+          <a:fillRef idx="1">
+            <a:schemeClr val="accent1"/>
+          </a:fillRef>
+          <a:effectRef idx="0">
+            <a:schemeClr val="accent1"/>
+          </a:effectRef>
+          <a:fontRef idx="minor">
+            <a:schemeClr val="lt1"/>
+          </a:fontRef>
+        </p:style>
+        <p:txBody>
+          <a:bodyPr rtlCol="0" anchor="ctr"/>
+          <a:lstStyle/>
+          <a:p>
+            <a:pPr algn="ctr"/>
+            <a:endParaRPr lang="en-US">
+              <a:solidFill>
+                <a:sysClr val="windowText" lastClr="000000"/>
+              </a:solidFill>
+            </a:endParaRPr>
+          </a:p>
+        </p:txBody>
+      </p:sp>
+      <p:sp>
+        <p:nvSpPr>
+          <p:cNvPr id="5" name="Textfeld 4">
+            <a:extLst>
+              <a:ext uri="{FF2B5EF4-FFF2-40B4-BE49-F238E27FC236}">
+                <a16:creationId xmlns:a16="http://schemas.microsoft.com/office/drawing/2014/main" id="{6784358B-94BE-389E-4235-A280EBAC5414}"/>
+              </a:ext>
+            </a:extLst>
+          </p:cNvPr>
+          <p:cNvSpPr txBox="1"/>
+          <p:nvPr/>
+        </p:nvSpPr>
+        <p:spPr>
+          <a:xfrm>
+            <a:off x="2428081" y="5308533"/>
+            <a:ext cx="2578100" cy="584775"/>
+          </a:xfrm>
+          <a:prstGeom prst="rect">
+            <a:avLst/>
+          </a:prstGeom>
+          <a:noFill/>
+        </p:spPr>
+        <p:txBody>
+          <a:bodyPr wrap="square" rtlCol="0">
+            <a:spAutoFit/>
+          </a:bodyPr>
+          <a:lstStyle/>
+          <a:p>
+            <a:pPr algn="ctr"/>
+            <a:r>
+              <a:rPr lang="en-US" sz="1600" dirty="0"/>
+              <a:t>‘Currency’ is a simple table, see test case in </a:t>
+            </a:r>
+            <a:r>
+              <a:rPr lang="en-US" sz="1600" dirty="0" err="1"/>
+              <a:t>test.sql</a:t>
+            </a:r>
+            <a:endParaRPr lang="en-US" sz="1600" dirty="0"/>
+          </a:p>
+        </p:txBody>
+      </p:sp>
+      <p:pic>
+        <p:nvPicPr>
+          <p:cNvPr id="11" name="Inhaltsplatzhalter 10" descr="Ein Bild, das Text, Screenshot, Quittung, Schrift enthält.&#10;&#10;Automatisch generierte Beschreibung">
+            <a:extLst>
+              <a:ext uri="{FF2B5EF4-FFF2-40B4-BE49-F238E27FC236}">
+                <a16:creationId xmlns:a16="http://schemas.microsoft.com/office/drawing/2014/main" id="{0DA4E263-33CE-C66D-1A08-5B28762EE2B4}"/>
+              </a:ext>
+            </a:extLst>
+          </p:cNvPr>
+          <p:cNvPicPr>
+            <a:picLocks noGrp="1" noChangeAspect="1"/>
+          </p:cNvPicPr>
+          <p:nvPr>
+            <p:ph sz="half" idx="1"/>
+          </p:nvPr>
+        </p:nvPicPr>
+        <p:blipFill>
+          <a:blip r:embed="rId3">
+            <a:extLst>
+              <a:ext uri="{28A0092B-C50C-407E-A947-70E740481C1C}">
+                <a14:useLocalDpi xmlns:a14="http://schemas.microsoft.com/office/drawing/2010/main" val="0"/>
+              </a:ext>
+            </a:extLst>
+          </a:blip>
+          <a:stretch>
+            <a:fillRect/>
+          </a:stretch>
+        </p:blipFill>
+        <p:spPr>
+          <a:xfrm>
+            <a:off x="2850356" y="3613150"/>
+            <a:ext cx="1733550" cy="1152525"/>
+          </a:xfrm>
         </p:spPr>
       </p:pic>
     </p:spTree>
@@ -4183,41 +4585,6 @@
           </a:p>
         </p:txBody>
       </p:sp>
-      <p:pic>
-        <p:nvPicPr>
-          <p:cNvPr id="6" name="Inhaltsplatzhalter 5" descr="Ein Bild, das Text, Screenshot, Quittung, Schrift enthält.&#10;&#10;Automatisch generierte Beschreibung">
-            <a:extLst>
-              <a:ext uri="{FF2B5EF4-FFF2-40B4-BE49-F238E27FC236}">
-                <a16:creationId xmlns:a16="http://schemas.microsoft.com/office/drawing/2014/main" id="{D40EBB51-ABA5-8BD5-FE2E-34EA9DFFA72F}"/>
-              </a:ext>
-            </a:extLst>
-          </p:cNvPr>
-          <p:cNvPicPr>
-            <a:picLocks noGrp="1" noChangeAspect="1"/>
-          </p:cNvPicPr>
-          <p:nvPr>
-            <p:ph sz="half" idx="1"/>
-          </p:nvPr>
-        </p:nvPicPr>
-        <p:blipFill>
-          <a:blip r:embed="rId2">
-            <a:extLst>
-              <a:ext uri="{28A0092B-C50C-407E-A947-70E740481C1C}">
-                <a14:useLocalDpi xmlns:a14="http://schemas.microsoft.com/office/drawing/2010/main" val="0"/>
-              </a:ext>
-            </a:extLst>
-          </a:blip>
-          <a:stretch>
-            <a:fillRect/>
-          </a:stretch>
-        </p:blipFill>
-        <p:spPr>
-          <a:xfrm>
-            <a:off x="2855119" y="3613150"/>
-            <a:ext cx="1724025" cy="1152525"/>
-          </a:xfrm>
-        </p:spPr>
-      </p:pic>
       <p:sp>
         <p:nvSpPr>
           <p:cNvPr id="4" name="Inhaltsplatzhalter 3">
@@ -4237,7 +4604,7 @@
         <p:spPr/>
         <p:txBody>
           <a:bodyPr>
-            <a:normAutofit fontScale="92500" lnSpcReduction="10000"/>
+            <a:normAutofit fontScale="85000" lnSpcReduction="10000"/>
           </a:bodyPr>
           <a:lstStyle/>
           <a:p>
@@ -4262,6 +4629,12 @@
             <a:r>
               <a:rPr lang="en-US" dirty="0"/>
               <a:t>Language is not a table that will see frequent changes and is rather used as a reference.</a:t>
+            </a:r>
+          </a:p>
+          <a:p>
+            <a:r>
+              <a:rPr lang="en-US" dirty="0"/>
+              <a:t>Like the ‘Currency’, this table is also very simple, a test for content should suffice for this table, which can be found in the test.sql file.</a:t>
             </a:r>
           </a:p>
         </p:txBody>
@@ -4281,7 +4654,7 @@
           <p:nvPr/>
         </p:nvPicPr>
         <p:blipFill>
-          <a:blip r:embed="rId3">
+          <a:blip r:embed="rId2">
             <a:extLst>
               <a:ext uri="{28A0092B-C50C-407E-A947-70E740481C1C}">
                 <a14:useLocalDpi xmlns:a14="http://schemas.microsoft.com/office/drawing/2010/main" val="0"/>
@@ -4302,6 +4675,143 @@
           </a:prstGeom>
         </p:spPr>
       </p:pic>
+      <p:pic>
+        <p:nvPicPr>
+          <p:cNvPr id="9" name="Inhaltsplatzhalter 8" descr="Ein Bild, das Text, Screenshot, Quittung, Schrift enthält.&#10;&#10;Automatisch generierte Beschreibung">
+            <a:extLst>
+              <a:ext uri="{FF2B5EF4-FFF2-40B4-BE49-F238E27FC236}">
+                <a16:creationId xmlns:a16="http://schemas.microsoft.com/office/drawing/2014/main" id="{1CABA4CC-1013-29DF-D313-77146BC62E21}"/>
+              </a:ext>
+            </a:extLst>
+          </p:cNvPr>
+          <p:cNvPicPr>
+            <a:picLocks noGrp="1" noChangeAspect="1"/>
+          </p:cNvPicPr>
+          <p:nvPr>
+            <p:ph sz="half" idx="1"/>
+          </p:nvPr>
+        </p:nvPicPr>
+        <p:blipFill>
+          <a:blip r:embed="rId3">
+            <a:extLst>
+              <a:ext uri="{28A0092B-C50C-407E-A947-70E740481C1C}">
+                <a14:useLocalDpi xmlns:a14="http://schemas.microsoft.com/office/drawing/2010/main" val="0"/>
+              </a:ext>
+            </a:extLst>
+          </a:blip>
+          <a:stretch>
+            <a:fillRect/>
+          </a:stretch>
+        </p:blipFill>
+        <p:spPr>
+          <a:xfrm>
+            <a:off x="2850356" y="3613150"/>
+            <a:ext cx="1733550" cy="1152525"/>
+          </a:xfrm>
+        </p:spPr>
+      </p:pic>
+      <p:sp>
+        <p:nvSpPr>
+          <p:cNvPr id="10" name="Rechteck 9">
+            <a:extLst>
+              <a:ext uri="{FF2B5EF4-FFF2-40B4-BE49-F238E27FC236}">
+                <a16:creationId xmlns:a16="http://schemas.microsoft.com/office/drawing/2014/main" id="{B1B7A7F8-9AA5-2CBD-7FC6-842C4F7143E8}"/>
+              </a:ext>
+            </a:extLst>
+          </p:cNvPr>
+          <p:cNvSpPr/>
+          <p:nvPr/>
+        </p:nvSpPr>
+        <p:spPr>
+          <a:xfrm>
+            <a:off x="2428081" y="5283133"/>
+            <a:ext cx="2578100" cy="610175"/>
+          </a:xfrm>
+          <a:prstGeom prst="rect">
+            <a:avLst/>
+          </a:prstGeom>
+          <a:solidFill>
+            <a:schemeClr val="bg1"/>
+          </a:solidFill>
+          <a:ln w="19050">
+            <a:solidFill>
+              <a:srgbClr val="404040"/>
+            </a:solidFill>
+          </a:ln>
+        </p:spPr>
+        <p:style>
+          <a:lnRef idx="2">
+            <a:schemeClr val="accent1">
+              <a:shade val="15000"/>
+            </a:schemeClr>
+          </a:lnRef>
+          <a:fillRef idx="1">
+            <a:schemeClr val="accent1"/>
+          </a:fillRef>
+          <a:effectRef idx="0">
+            <a:schemeClr val="accent1"/>
+          </a:effectRef>
+          <a:fontRef idx="minor">
+            <a:schemeClr val="lt1"/>
+          </a:fontRef>
+        </p:style>
+        <p:txBody>
+          <a:bodyPr rtlCol="0" anchor="ctr"/>
+          <a:lstStyle/>
+          <a:p>
+            <a:pPr algn="ctr"/>
+            <a:endParaRPr lang="en-US">
+              <a:solidFill>
+                <a:sysClr val="windowText" lastClr="000000"/>
+              </a:solidFill>
+            </a:endParaRPr>
+          </a:p>
+        </p:txBody>
+      </p:sp>
+      <p:sp>
+        <p:nvSpPr>
+          <p:cNvPr id="11" name="Textfeld 10">
+            <a:extLst>
+              <a:ext uri="{FF2B5EF4-FFF2-40B4-BE49-F238E27FC236}">
+                <a16:creationId xmlns:a16="http://schemas.microsoft.com/office/drawing/2014/main" id="{CFE7A768-B194-ABC4-0133-4513BD84CE8C}"/>
+              </a:ext>
+            </a:extLst>
+          </p:cNvPr>
+          <p:cNvSpPr txBox="1"/>
+          <p:nvPr/>
+        </p:nvSpPr>
+        <p:spPr>
+          <a:xfrm>
+            <a:off x="2428081" y="5308533"/>
+            <a:ext cx="2578100" cy="584775"/>
+          </a:xfrm>
+          <a:prstGeom prst="rect">
+            <a:avLst/>
+          </a:prstGeom>
+          <a:noFill/>
+        </p:spPr>
+        <p:txBody>
+          <a:bodyPr wrap="square" rtlCol="0">
+            <a:spAutoFit/>
+          </a:bodyPr>
+          <a:lstStyle/>
+          <a:p>
+            <a:pPr algn="ctr"/>
+            <a:r>
+              <a:rPr lang="en-US" sz="1600" dirty="0"/>
+              <a:t>‘</a:t>
+            </a:r>
+            <a:r>
+              <a:rPr lang="en-US" altLang="ja-JP" sz="1600" dirty="0"/>
+              <a:t>Language</a:t>
+            </a:r>
+            <a:r>
+              <a:rPr lang="en-US" sz="1600" dirty="0"/>
+              <a:t>’ is a simple table, see test case in test.sql</a:t>
+            </a:r>
+          </a:p>
+        </p:txBody>
+      </p:sp>
     </p:spTree>
     <p:extLst>
       <p:ext uri="{BB962C8B-B14F-4D97-AF65-F5344CB8AC3E}">
@@ -4360,41 +4870,6 @@
           </a:p>
         </p:txBody>
       </p:sp>
-      <p:pic>
-        <p:nvPicPr>
-          <p:cNvPr id="6" name="Inhaltsplatzhalter 5" descr="Ein Bild, das Text, Quittung, Screenshot, Schrift enthält.&#10;&#10;Automatisch generierte Beschreibung">
-            <a:extLst>
-              <a:ext uri="{FF2B5EF4-FFF2-40B4-BE49-F238E27FC236}">
-                <a16:creationId xmlns:a16="http://schemas.microsoft.com/office/drawing/2014/main" id="{BA196DE5-CA99-31AD-43F5-E8BFBAC15AD8}"/>
-              </a:ext>
-            </a:extLst>
-          </p:cNvPr>
-          <p:cNvPicPr>
-            <a:picLocks noGrp="1" noChangeAspect="1"/>
-          </p:cNvPicPr>
-          <p:nvPr>
-            <p:ph sz="half" idx="1"/>
-          </p:nvPr>
-        </p:nvPicPr>
-        <p:blipFill>
-          <a:blip r:embed="rId2">
-            <a:extLst>
-              <a:ext uri="{28A0092B-C50C-407E-A947-70E740481C1C}">
-                <a14:useLocalDpi xmlns:a14="http://schemas.microsoft.com/office/drawing/2010/main" val="0"/>
-              </a:ext>
-            </a:extLst>
-          </a:blip>
-          <a:stretch>
-            <a:fillRect/>
-          </a:stretch>
-        </p:blipFill>
-        <p:spPr>
-          <a:xfrm>
-            <a:off x="2855119" y="3327400"/>
-            <a:ext cx="1724025" cy="1724025"/>
-          </a:xfrm>
-        </p:spPr>
-      </p:pic>
       <p:sp>
         <p:nvSpPr>
           <p:cNvPr id="4" name="Inhaltsplatzhalter 3">
@@ -4411,9 +4886,16 @@
             <p:ph sz="half" idx="2"/>
           </p:nvPr>
         </p:nvSpPr>
-        <p:spPr/>
-        <p:txBody>
-          <a:bodyPr/>
+        <p:spPr>
+          <a:xfrm>
+            <a:off x="6284133" y="2511552"/>
+            <a:ext cx="4270247" cy="3381756"/>
+          </a:xfrm>
+        </p:spPr>
+        <p:txBody>
+          <a:bodyPr>
+            <a:normAutofit fontScale="92500" lnSpcReduction="10000"/>
+          </a:bodyPr>
           <a:lstStyle/>
           <a:p>
             <a:r>
@@ -4431,6 +4913,12 @@
             <a:r>
               <a:rPr lang="en-US" dirty="0"/>
               <a:t>Other than the ‘created’ and ‘last_modified’ timestamps, the chats table also holds both chat participants.</a:t>
+            </a:r>
+          </a:p>
+          <a:p>
+            <a:r>
+              <a:rPr lang="en-US" dirty="0"/>
+              <a:t>The test case for this table works in combination with the message table (next slide). The first test case checks the general content of the chat table.</a:t>
             </a:r>
           </a:p>
         </p:txBody>
@@ -4450,7 +4938,7 @@
           <p:nvPr/>
         </p:nvPicPr>
         <p:blipFill>
-          <a:blip r:embed="rId3">
+          <a:blip r:embed="rId2">
             <a:extLst>
               <a:ext uri="{28A0092B-C50C-407E-A947-70E740481C1C}">
                 <a14:useLocalDpi xmlns:a14="http://schemas.microsoft.com/office/drawing/2010/main" val="0"/>
@@ -4465,6 +4953,113 @@
           <a:xfrm>
             <a:off x="11633200" y="6299200"/>
             <a:ext cx="457200" cy="457200"/>
+          </a:xfrm>
+          <a:prstGeom prst="rect">
+            <a:avLst/>
+          </a:prstGeom>
+        </p:spPr>
+      </p:pic>
+      <p:pic>
+        <p:nvPicPr>
+          <p:cNvPr id="17" name="Inhaltsplatzhalter 16" descr="Ein Bild, das Text, Screenshot, Software, Multimedia-Software enthält.&#10;&#10;Automatisch generierte Beschreibung">
+            <a:extLst>
+              <a:ext uri="{FF2B5EF4-FFF2-40B4-BE49-F238E27FC236}">
+                <a16:creationId xmlns:a16="http://schemas.microsoft.com/office/drawing/2014/main" id="{E31779C2-DEDC-B50C-4B79-4BF9F2F235D1}"/>
+              </a:ext>
+            </a:extLst>
+          </p:cNvPr>
+          <p:cNvPicPr>
+            <a:picLocks noGrp="1" noChangeAspect="1"/>
+          </p:cNvPicPr>
+          <p:nvPr>
+            <p:ph sz="half" idx="1"/>
+          </p:nvPr>
+        </p:nvPicPr>
+        <p:blipFill>
+          <a:blip r:embed="rId3">
+            <a:extLst>
+              <a:ext uri="{28A0092B-C50C-407E-A947-70E740481C1C}">
+                <a14:useLocalDpi xmlns:a14="http://schemas.microsoft.com/office/drawing/2010/main" val="0"/>
+              </a:ext>
+            </a:extLst>
+          </a:blip>
+          <a:stretch>
+            <a:fillRect/>
+          </a:stretch>
+        </p:blipFill>
+        <p:spPr>
+          <a:xfrm>
+            <a:off x="1104900" y="2356662"/>
+            <a:ext cx="4476750" cy="3335504"/>
+          </a:xfrm>
+        </p:spPr>
+      </p:pic>
+      <p:pic>
+        <p:nvPicPr>
+          <p:cNvPr id="13" name="Grafik 12" descr="Ein Bild, das Text, Screenshot, Quittung, Schrift enthält.&#10;&#10;Automatisch generierte Beschreibung">
+            <a:extLst>
+              <a:ext uri="{FF2B5EF4-FFF2-40B4-BE49-F238E27FC236}">
+                <a16:creationId xmlns:a16="http://schemas.microsoft.com/office/drawing/2014/main" id="{7CC42FE0-63A7-7F83-D254-A4B5BFE7990A}"/>
+              </a:ext>
+            </a:extLst>
+          </p:cNvPr>
+          <p:cNvPicPr>
+            <a:picLocks noChangeAspect="1"/>
+          </p:cNvPicPr>
+          <p:nvPr/>
+        </p:nvPicPr>
+        <p:blipFill>
+          <a:blip r:embed="rId4">
+            <a:extLst>
+              <a:ext uri="{28A0092B-C50C-407E-A947-70E740481C1C}">
+                <a14:useLocalDpi xmlns:a14="http://schemas.microsoft.com/office/drawing/2010/main" val="0"/>
+              </a:ext>
+            </a:extLst>
+          </a:blip>
+          <a:stretch>
+            <a:fillRect/>
+          </a:stretch>
+        </p:blipFill>
+        <p:spPr>
+          <a:xfrm>
+            <a:off x="4362449" y="3516312"/>
+            <a:ext cx="1733550" cy="1724025"/>
+          </a:xfrm>
+          <a:prstGeom prst="rect">
+            <a:avLst/>
+          </a:prstGeom>
+        </p:spPr>
+      </p:pic>
+      <p:pic>
+        <p:nvPicPr>
+          <p:cNvPr id="19" name="Grafik 18">
+            <a:extLst>
+              <a:ext uri="{FF2B5EF4-FFF2-40B4-BE49-F238E27FC236}">
+                <a16:creationId xmlns:a16="http://schemas.microsoft.com/office/drawing/2014/main" id="{335058CC-9361-3716-BE31-6904F6111CA9}"/>
+              </a:ext>
+            </a:extLst>
+          </p:cNvPr>
+          <p:cNvPicPr>
+            <a:picLocks noChangeAspect="1"/>
+          </p:cNvPicPr>
+          <p:nvPr/>
+        </p:nvPicPr>
+        <p:blipFill>
+          <a:blip r:embed="rId5">
+            <a:extLst>
+              <a:ext uri="{28A0092B-C50C-407E-A947-70E740481C1C}">
+                <a14:useLocalDpi xmlns:a14="http://schemas.microsoft.com/office/drawing/2010/main" val="0"/>
+              </a:ext>
+            </a:extLst>
+          </a:blip>
+          <a:stretch>
+            <a:fillRect/>
+          </a:stretch>
+        </p:blipFill>
+        <p:spPr>
+          <a:xfrm>
+            <a:off x="1104901" y="5869710"/>
+            <a:ext cx="9449480" cy="733527"/>
           </a:xfrm>
           <a:prstGeom prst="rect">
             <a:avLst/>
@@ -4501,49 +5096,19 @@
           <a:chExt cx="0" cy="0"/>
         </a:xfrm>
       </p:grpSpPr>
-      <p:sp>
-        <p:nvSpPr>
-          <p:cNvPr id="2" name="Titel 1">
-            <a:extLst>
-              <a:ext uri="{FF2B5EF4-FFF2-40B4-BE49-F238E27FC236}">
-                <a16:creationId xmlns:a16="http://schemas.microsoft.com/office/drawing/2014/main" id="{4CC63477-8154-0AB8-1A45-18A8C93FC856}"/>
-              </a:ext>
-            </a:extLst>
-          </p:cNvPr>
-          <p:cNvSpPr>
-            <a:spLocks noGrp="1"/>
-          </p:cNvSpPr>
-          <p:nvPr>
-            <p:ph type="title"/>
-          </p:nvPr>
-        </p:nvSpPr>
-        <p:spPr/>
-        <p:txBody>
-          <a:bodyPr/>
-          <a:lstStyle/>
-          <a:p>
-            <a:r>
-              <a:rPr lang="en-US" dirty="0"/>
-              <a:t>Table - Message</a:t>
-            </a:r>
-          </a:p>
-        </p:txBody>
-      </p:sp>
       <p:pic>
         <p:nvPicPr>
-          <p:cNvPr id="6" name="Inhaltsplatzhalter 5" descr="Ein Bild, das Text, Quittung, Screenshot, Schrift enthält.&#10;&#10;Automatisch generierte Beschreibung">
-            <a:extLst>
-              <a:ext uri="{FF2B5EF4-FFF2-40B4-BE49-F238E27FC236}">
-                <a16:creationId xmlns:a16="http://schemas.microsoft.com/office/drawing/2014/main" id="{F662A10D-6E9E-783A-DE9F-8490DA7A17D0}"/>
+          <p:cNvPr id="16" name="Inhaltsplatzhalter 16" descr="Ein Bild, das Text, Screenshot, Software, Multimedia-Software enthält.&#10;&#10;Automatisch generierte Beschreibung">
+            <a:extLst>
+              <a:ext uri="{FF2B5EF4-FFF2-40B4-BE49-F238E27FC236}">
+                <a16:creationId xmlns:a16="http://schemas.microsoft.com/office/drawing/2014/main" id="{0F58DAE8-591A-FC15-C972-5260FF5EFC59}"/>
               </a:ext>
             </a:extLst>
           </p:cNvPr>
           <p:cNvPicPr>
-            <a:picLocks noGrp="1" noChangeAspect="1"/>
+            <a:picLocks noChangeAspect="1"/>
           </p:cNvPicPr>
-          <p:nvPr>
-            <p:ph sz="half" idx="1"/>
-          </p:nvPr>
+          <p:nvPr/>
         </p:nvPicPr>
         <p:blipFill>
           <a:blip r:embed="rId2">
@@ -4559,13 +5124,44 @@
         </p:blipFill>
         <p:spPr>
           <a:xfrm>
-            <a:off x="2855119" y="3327400"/>
-            <a:ext cx="1724025" cy="1724025"/>
-          </a:xfrm>
+            <a:off x="1108993" y="2294668"/>
+            <a:ext cx="4744692" cy="3535140"/>
+          </a:xfrm>
+          <a:prstGeom prst="rect">
+            <a:avLst/>
+          </a:prstGeom>
         </p:spPr>
       </p:pic>
       <p:sp>
         <p:nvSpPr>
+          <p:cNvPr id="2" name="Titel 1">
+            <a:extLst>
+              <a:ext uri="{FF2B5EF4-FFF2-40B4-BE49-F238E27FC236}">
+                <a16:creationId xmlns:a16="http://schemas.microsoft.com/office/drawing/2014/main" id="{4CC63477-8154-0AB8-1A45-18A8C93FC856}"/>
+              </a:ext>
+            </a:extLst>
+          </p:cNvPr>
+          <p:cNvSpPr>
+            <a:spLocks noGrp="1"/>
+          </p:cNvSpPr>
+          <p:nvPr>
+            <p:ph type="title"/>
+          </p:nvPr>
+        </p:nvSpPr>
+        <p:spPr/>
+        <p:txBody>
+          <a:bodyPr/>
+          <a:lstStyle/>
+          <a:p>
+            <a:r>
+              <a:rPr lang="en-US" dirty="0"/>
+              <a:t>Table - Message</a:t>
+            </a:r>
+          </a:p>
+        </p:txBody>
+      </p:sp>
+      <p:sp>
+        <p:nvSpPr>
           <p:cNvPr id="4" name="Inhaltsplatzhalter 3">
             <a:extLst>
               <a:ext uri="{FF2B5EF4-FFF2-40B4-BE49-F238E27FC236}">
@@ -4580,9 +5176,16 @@
             <p:ph sz="half" idx="2"/>
           </p:nvPr>
         </p:nvSpPr>
-        <p:spPr/>
-        <p:txBody>
-          <a:bodyPr/>
+        <p:spPr>
+          <a:xfrm>
+            <a:off x="6338317" y="2511552"/>
+            <a:ext cx="4270247" cy="3318256"/>
+          </a:xfrm>
+        </p:spPr>
+        <p:txBody>
+          <a:bodyPr>
+            <a:normAutofit fontScale="92500" lnSpcReduction="20000"/>
+          </a:bodyPr>
           <a:lstStyle/>
           <a:p>
             <a:r>
@@ -4600,6 +5203,12 @@
             <a:r>
               <a:rPr lang="en-US" dirty="0"/>
               <a:t>The created timestamp is essentially the ‘sent’ timestamp of the message.</a:t>
+            </a:r>
+          </a:p>
+          <a:p>
+            <a:r>
+              <a:rPr lang="en-US" dirty="0"/>
+              <a:t>The second test case in the screenshot test the relationship of ‘Chat’ and ‘Message’ tables by returning all data entries of messages for a given</a:t>
             </a:r>
           </a:p>
         </p:txBody>
@@ -4634,6 +5243,77 @@
           <a:xfrm>
             <a:off x="11633200" y="6299200"/>
             <a:ext cx="457200" cy="457200"/>
+          </a:xfrm>
+          <a:prstGeom prst="rect">
+            <a:avLst/>
+          </a:prstGeom>
+        </p:spPr>
+      </p:pic>
+      <p:pic>
+        <p:nvPicPr>
+          <p:cNvPr id="15" name="Inhaltsplatzhalter 14" descr="Ein Bild, das Text, Screenshot, Quittung, Schrift enthält.&#10;&#10;Automatisch generierte Beschreibung">
+            <a:extLst>
+              <a:ext uri="{FF2B5EF4-FFF2-40B4-BE49-F238E27FC236}">
+                <a16:creationId xmlns:a16="http://schemas.microsoft.com/office/drawing/2014/main" id="{DCFA7393-EE2D-65D0-E31A-1D74D209148A}"/>
+              </a:ext>
+            </a:extLst>
+          </p:cNvPr>
+          <p:cNvPicPr>
+            <a:picLocks noGrp="1" noChangeAspect="1"/>
+          </p:cNvPicPr>
+          <p:nvPr>
+            <p:ph sz="half" idx="1"/>
+          </p:nvPr>
+        </p:nvPicPr>
+        <p:blipFill>
+          <a:blip r:embed="rId4">
+            <a:extLst>
+              <a:ext uri="{28A0092B-C50C-407E-A947-70E740481C1C}">
+                <a14:useLocalDpi xmlns:a14="http://schemas.microsoft.com/office/drawing/2010/main" val="0"/>
+              </a:ext>
+            </a:extLst>
+          </a:blip>
+          <a:stretch>
+            <a:fillRect/>
+          </a:stretch>
+        </p:blipFill>
+        <p:spPr>
+          <a:xfrm>
+            <a:off x="4362450" y="3373437"/>
+            <a:ext cx="1733550" cy="2009775"/>
+          </a:xfrm>
+        </p:spPr>
+      </p:pic>
+      <p:pic>
+        <p:nvPicPr>
+          <p:cNvPr id="18" name="Grafik 17" descr="Ein Bild, das Text, Screenshot, Schrift, Reihe enthält.&#10;&#10;Automatisch generierte Beschreibung">
+            <a:extLst>
+              <a:ext uri="{FF2B5EF4-FFF2-40B4-BE49-F238E27FC236}">
+                <a16:creationId xmlns:a16="http://schemas.microsoft.com/office/drawing/2014/main" id="{9331A313-D8A4-889A-0AA9-6AE67509673A}"/>
+              </a:ext>
+            </a:extLst>
+          </p:cNvPr>
+          <p:cNvPicPr>
+            <a:picLocks noChangeAspect="1"/>
+          </p:cNvPicPr>
+          <p:nvPr/>
+        </p:nvPicPr>
+        <p:blipFill>
+          <a:blip r:embed="rId5">
+            <a:extLst>
+              <a:ext uri="{28A0092B-C50C-407E-A947-70E740481C1C}">
+                <a14:useLocalDpi xmlns:a14="http://schemas.microsoft.com/office/drawing/2010/main" val="0"/>
+              </a:ext>
+            </a:extLst>
+          </a:blip>
+          <a:stretch>
+            <a:fillRect/>
+          </a:stretch>
+        </p:blipFill>
+        <p:spPr>
+          <a:xfrm>
+            <a:off x="1108993" y="5893308"/>
+            <a:ext cx="4744692" cy="739913"/>
           </a:xfrm>
           <a:prstGeom prst="rect">
             <a:avLst/>
@@ -4698,41 +5378,6 @@
           </a:p>
         </p:txBody>
       </p:sp>
-      <p:pic>
-        <p:nvPicPr>
-          <p:cNvPr id="6" name="Inhaltsplatzhalter 5" descr="Ein Bild, das Text, Screenshot, Schrift, Quittung enthält.&#10;&#10;Automatisch generierte Beschreibung">
-            <a:extLst>
-              <a:ext uri="{FF2B5EF4-FFF2-40B4-BE49-F238E27FC236}">
-                <a16:creationId xmlns:a16="http://schemas.microsoft.com/office/drawing/2014/main" id="{A7D2F5F9-1B5F-DA24-1337-69467405A10F}"/>
-              </a:ext>
-            </a:extLst>
-          </p:cNvPr>
-          <p:cNvPicPr>
-            <a:picLocks noGrp="1" noChangeAspect="1"/>
-          </p:cNvPicPr>
-          <p:nvPr>
-            <p:ph sz="half" idx="1"/>
-          </p:nvPr>
-        </p:nvPicPr>
-        <p:blipFill>
-          <a:blip r:embed="rId2">
-            <a:extLst>
-              <a:ext uri="{28A0092B-C50C-407E-A947-70E740481C1C}">
-                <a14:useLocalDpi xmlns:a14="http://schemas.microsoft.com/office/drawing/2010/main" val="0"/>
-              </a:ext>
-            </a:extLst>
-          </a:blip>
-          <a:stretch>
-            <a:fillRect/>
-          </a:stretch>
-        </p:blipFill>
-        <p:spPr>
-          <a:xfrm>
-            <a:off x="2855119" y="2898775"/>
-            <a:ext cx="1724025" cy="2581275"/>
-          </a:xfrm>
-        </p:spPr>
-      </p:pic>
       <p:sp>
         <p:nvSpPr>
           <p:cNvPr id="4" name="Inhaltsplatzhalter 3">
@@ -4749,9 +5394,16 @@
             <p:ph sz="half" idx="2"/>
           </p:nvPr>
         </p:nvSpPr>
-        <p:spPr/>
-        <p:txBody>
-          <a:bodyPr/>
+        <p:spPr>
+          <a:xfrm>
+            <a:off x="6338315" y="2638044"/>
+            <a:ext cx="4270247" cy="3565906"/>
+          </a:xfrm>
+        </p:spPr>
+        <p:txBody>
+          <a:bodyPr>
+            <a:normAutofit fontScale="92500" lnSpcReduction="10000"/>
+          </a:bodyPr>
           <a:lstStyle/>
           <a:p>
             <a:r>
@@ -4769,6 +5421,12 @@
             <a:r>
               <a:rPr lang="en-US" dirty="0"/>
               <a:t>The ‘owning_user_id’ refers to the user that owns it.</a:t>
+            </a:r>
+          </a:p>
+          <a:p>
+            <a:r>
+              <a:rPr lang="en-US" dirty="0"/>
+              <a:t>This table is covered in the Guest user test cases, another simple select all statement is provided in the test.sql file to check for completeness of content.</a:t>
             </a:r>
           </a:p>
         </p:txBody>
@@ -4788,7 +5446,7 @@
           <p:nvPr/>
         </p:nvPicPr>
         <p:blipFill>
-          <a:blip r:embed="rId3">
+          <a:blip r:embed="rId2">
             <a:extLst>
               <a:ext uri="{28A0092B-C50C-407E-A947-70E740481C1C}">
                 <a14:useLocalDpi xmlns:a14="http://schemas.microsoft.com/office/drawing/2010/main" val="0"/>
@@ -4809,6 +5467,143 @@
           </a:prstGeom>
         </p:spPr>
       </p:pic>
+      <p:pic>
+        <p:nvPicPr>
+          <p:cNvPr id="9" name="Inhaltsplatzhalter 8" descr="Ein Bild, das Text, Screenshot, Schrift, Zahl enthält.&#10;&#10;Automatisch generierte Beschreibung">
+            <a:extLst>
+              <a:ext uri="{FF2B5EF4-FFF2-40B4-BE49-F238E27FC236}">
+                <a16:creationId xmlns:a16="http://schemas.microsoft.com/office/drawing/2014/main" id="{9A019792-7DCC-6FCD-6DD7-F77CE1D19EDD}"/>
+              </a:ext>
+            </a:extLst>
+          </p:cNvPr>
+          <p:cNvPicPr>
+            <a:picLocks noGrp="1" noChangeAspect="1"/>
+          </p:cNvPicPr>
+          <p:nvPr>
+            <p:ph sz="half" idx="1"/>
+          </p:nvPr>
+        </p:nvPicPr>
+        <p:blipFill>
+          <a:blip r:embed="rId3">
+            <a:extLst>
+              <a:ext uri="{28A0092B-C50C-407E-A947-70E740481C1C}">
+                <a14:useLocalDpi xmlns:a14="http://schemas.microsoft.com/office/drawing/2010/main" val="0"/>
+              </a:ext>
+            </a:extLst>
+          </a:blip>
+          <a:stretch>
+            <a:fillRect/>
+          </a:stretch>
+        </p:blipFill>
+        <p:spPr>
+          <a:xfrm>
+            <a:off x="2850356" y="2898775"/>
+            <a:ext cx="1733550" cy="2581275"/>
+          </a:xfrm>
+        </p:spPr>
+      </p:pic>
+      <p:sp>
+        <p:nvSpPr>
+          <p:cNvPr id="10" name="Rechteck 9">
+            <a:extLst>
+              <a:ext uri="{FF2B5EF4-FFF2-40B4-BE49-F238E27FC236}">
+                <a16:creationId xmlns:a16="http://schemas.microsoft.com/office/drawing/2014/main" id="{EB9D4C04-40F6-EC2A-E7C7-FCE7F25D6797}"/>
+              </a:ext>
+            </a:extLst>
+          </p:cNvPr>
+          <p:cNvSpPr/>
+          <p:nvPr/>
+        </p:nvSpPr>
+        <p:spPr>
+          <a:xfrm>
+            <a:off x="2497931" y="5689025"/>
+            <a:ext cx="2578100" cy="610175"/>
+          </a:xfrm>
+          <a:prstGeom prst="rect">
+            <a:avLst/>
+          </a:prstGeom>
+          <a:solidFill>
+            <a:schemeClr val="bg1"/>
+          </a:solidFill>
+          <a:ln w="19050">
+            <a:solidFill>
+              <a:srgbClr val="404040"/>
+            </a:solidFill>
+          </a:ln>
+        </p:spPr>
+        <p:style>
+          <a:lnRef idx="2">
+            <a:schemeClr val="accent1">
+              <a:shade val="15000"/>
+            </a:schemeClr>
+          </a:lnRef>
+          <a:fillRef idx="1">
+            <a:schemeClr val="accent1"/>
+          </a:fillRef>
+          <a:effectRef idx="0">
+            <a:schemeClr val="accent1"/>
+          </a:effectRef>
+          <a:fontRef idx="minor">
+            <a:schemeClr val="lt1"/>
+          </a:fontRef>
+        </p:style>
+        <p:txBody>
+          <a:bodyPr rtlCol="0" anchor="ctr"/>
+          <a:lstStyle/>
+          <a:p>
+            <a:pPr algn="ctr"/>
+            <a:endParaRPr lang="en-US">
+              <a:solidFill>
+                <a:sysClr val="windowText" lastClr="000000"/>
+              </a:solidFill>
+            </a:endParaRPr>
+          </a:p>
+        </p:txBody>
+      </p:sp>
+      <p:sp>
+        <p:nvSpPr>
+          <p:cNvPr id="11" name="Textfeld 10">
+            <a:extLst>
+              <a:ext uri="{FF2B5EF4-FFF2-40B4-BE49-F238E27FC236}">
+                <a16:creationId xmlns:a16="http://schemas.microsoft.com/office/drawing/2014/main" id="{98D0C36F-A29C-8A90-67E6-A857A80EEEBB}"/>
+              </a:ext>
+            </a:extLst>
+          </p:cNvPr>
+          <p:cNvSpPr txBox="1"/>
+          <p:nvPr/>
+        </p:nvSpPr>
+        <p:spPr>
+          <a:xfrm>
+            <a:off x="2497931" y="5714425"/>
+            <a:ext cx="2578100" cy="584775"/>
+          </a:xfrm>
+          <a:prstGeom prst="rect">
+            <a:avLst/>
+          </a:prstGeom>
+          <a:noFill/>
+        </p:spPr>
+        <p:txBody>
+          <a:bodyPr wrap="square" rtlCol="0">
+            <a:spAutoFit/>
+          </a:bodyPr>
+          <a:lstStyle/>
+          <a:p>
+            <a:pPr algn="ctr"/>
+            <a:r>
+              <a:rPr lang="en-US" sz="1600" dirty="0"/>
+              <a:t>‘</a:t>
+            </a:r>
+            <a:r>
+              <a:rPr lang="en-US" altLang="ja-JP" sz="1600" dirty="0"/>
+              <a:t>Language</a:t>
+            </a:r>
+            <a:r>
+              <a:rPr lang="en-US" sz="1600" dirty="0"/>
+              <a:t>’ is a simple table, see test case in test.sql</a:t>
+            </a:r>
+          </a:p>
+        </p:txBody>
+      </p:sp>
     </p:spTree>
     <p:extLst>
       <p:ext uri="{BB962C8B-B14F-4D97-AF65-F5344CB8AC3E}">
@@ -4869,19 +5664,17 @@
       </p:sp>
       <p:pic>
         <p:nvPicPr>
-          <p:cNvPr id="6" name="Inhaltsplatzhalter 5" descr="Ein Bild, das Text, Quittung, Screenshot, Schrift enthält.&#10;&#10;Automatisch generierte Beschreibung">
-            <a:extLst>
-              <a:ext uri="{FF2B5EF4-FFF2-40B4-BE49-F238E27FC236}">
-                <a16:creationId xmlns:a16="http://schemas.microsoft.com/office/drawing/2014/main" id="{7D900F81-8280-E830-31F5-A06081787BF5}"/>
+          <p:cNvPr id="19" name="Grafik 18" descr="Ein Bild, das Text, Screenshot, Software enthält.&#10;&#10;Automatisch generierte Beschreibung">
+            <a:extLst>
+              <a:ext uri="{FF2B5EF4-FFF2-40B4-BE49-F238E27FC236}">
+                <a16:creationId xmlns:a16="http://schemas.microsoft.com/office/drawing/2014/main" id="{D4DB5899-55E5-4345-0A0C-A34185ECAC3D}"/>
               </a:ext>
             </a:extLst>
           </p:cNvPr>
           <p:cNvPicPr>
-            <a:picLocks noGrp="1" noChangeAspect="1"/>
+            <a:picLocks noChangeAspect="1"/>
           </p:cNvPicPr>
-          <p:nvPr>
-            <p:ph sz="half" idx="1"/>
-          </p:nvPr>
+          <p:nvPr/>
         </p:nvPicPr>
         <p:blipFill>
           <a:blip r:embed="rId2">
@@ -4897,9 +5690,12 @@
         </p:blipFill>
         <p:spPr>
           <a:xfrm>
-            <a:off x="2855119" y="3470275"/>
-            <a:ext cx="1724025" cy="1438275"/>
-          </a:xfrm>
+            <a:off x="427038" y="2328101"/>
+            <a:ext cx="5270093" cy="4085399"/>
+          </a:xfrm>
+          <a:prstGeom prst="rect">
+            <a:avLst/>
+          </a:prstGeom>
         </p:spPr>
       </p:pic>
       <p:sp>
@@ -4921,7 +5717,7 @@
         <p:spPr/>
         <p:txBody>
           <a:bodyPr>
-            <a:normAutofit lnSpcReduction="10000"/>
+            <a:normAutofit fontScale="77500" lnSpcReduction="20000"/>
           </a:bodyPr>
           <a:lstStyle/>
           <a:p>
@@ -4939,13 +5735,27 @@
           <a:p>
             <a:r>
               <a:rPr lang="en-US" dirty="0"/>
-              <a:t>A user can have multiple Wishlists, hence the need for a name.</a:t>
+              <a:t>A user can have multiple </a:t>
+            </a:r>
+            <a:r>
+              <a:rPr lang="en-US" dirty="0" err="1"/>
+              <a:t>wishlists</a:t>
+            </a:r>
+            <a:r>
+              <a:rPr lang="en-US" dirty="0"/>
+              <a:t>, hence the need for a name.</a:t>
             </a:r>
           </a:p>
           <a:p>
             <a:r>
               <a:rPr lang="en-US" dirty="0"/>
               <a:t>The ‘wishlist_id’ is used in the next table to normalize the M:N relation.</a:t>
+            </a:r>
+          </a:p>
+          <a:p>
+            <a:r>
+              <a:rPr lang="en-US" dirty="0"/>
+              <a:t>The table works in close relation to the ‘wishlist_propertylisting’ table (next slide). This first test case checks for general data of the chat table and other related tables in conjunction. The second test checks the relation of a chat and its messages.</a:t>
             </a:r>
           </a:p>
         </p:txBody>
@@ -4980,6 +5790,78 @@
           <a:xfrm>
             <a:off x="11633200" y="6299200"/>
             <a:ext cx="457200" cy="457200"/>
+          </a:xfrm>
+          <a:prstGeom prst="rect">
+            <a:avLst/>
+          </a:prstGeom>
+        </p:spPr>
+      </p:pic>
+      <p:pic>
+        <p:nvPicPr>
+          <p:cNvPr id="11" name="Grafik 10" descr="Ein Bild, das Text, Quittung, Screenshot, Schrift enthält.&#10;&#10;Automatisch generierte Beschreibung">
+            <a:extLst>
+              <a:ext uri="{FF2B5EF4-FFF2-40B4-BE49-F238E27FC236}">
+                <a16:creationId xmlns:a16="http://schemas.microsoft.com/office/drawing/2014/main" id="{5EEFCFCE-09C5-E0AA-76D8-E86549ACEF5E}"/>
+              </a:ext>
+            </a:extLst>
+          </p:cNvPr>
+          <p:cNvPicPr>
+            <a:picLocks noChangeAspect="1"/>
+          </p:cNvPicPr>
+          <p:nvPr/>
+        </p:nvPicPr>
+        <p:blipFill>
+          <a:blip r:embed="rId4">
+            <a:extLst>
+              <a:ext uri="{28A0092B-C50C-407E-A947-70E740481C1C}">
+                <a14:useLocalDpi xmlns:a14="http://schemas.microsoft.com/office/drawing/2010/main" val="0"/>
+              </a:ext>
+            </a:extLst>
+          </a:blip>
+          <a:stretch>
+            <a:fillRect/>
+          </a:stretch>
+        </p:blipFill>
+        <p:spPr>
+          <a:xfrm>
+            <a:off x="4651025" y="2750760"/>
+            <a:ext cx="1733550" cy="1438275"/>
+          </a:xfrm>
+          <a:prstGeom prst="rect">
+            <a:avLst/>
+          </a:prstGeom>
+        </p:spPr>
+      </p:pic>
+      <p:pic>
+        <p:nvPicPr>
+          <p:cNvPr id="21" name="Grafik 20" descr="Ein Bild, das Text, Screenshot, Schrift, Zahl enthält.&#10;&#10;Automatisch generierte Beschreibung">
+            <a:extLst>
+              <a:ext uri="{FF2B5EF4-FFF2-40B4-BE49-F238E27FC236}">
+                <a16:creationId xmlns:a16="http://schemas.microsoft.com/office/drawing/2014/main" id="{D1F30D4E-2893-1262-4A48-694B11C8C4CF}"/>
+              </a:ext>
+            </a:extLst>
+          </p:cNvPr>
+          <p:cNvPicPr>
+            <a:picLocks noChangeAspect="1"/>
+          </p:cNvPicPr>
+          <p:nvPr/>
+        </p:nvPicPr>
+        <p:blipFill>
+          <a:blip r:embed="rId5">
+            <a:extLst>
+              <a:ext uri="{28A0092B-C50C-407E-A947-70E740481C1C}">
+                <a14:useLocalDpi xmlns:a14="http://schemas.microsoft.com/office/drawing/2010/main" val="0"/>
+              </a:ext>
+            </a:extLst>
+          </a:blip>
+          <a:stretch>
+            <a:fillRect/>
+          </a:stretch>
+        </p:blipFill>
+        <p:spPr>
+          <a:xfrm>
+            <a:off x="5802886" y="5740026"/>
+            <a:ext cx="5093820" cy="891068"/>
           </a:xfrm>
           <a:prstGeom prst="rect">
             <a:avLst/>
@@ -5016,49 +5898,19 @@
           <a:chExt cx="0" cy="0"/>
         </a:xfrm>
       </p:grpSpPr>
-      <p:sp>
-        <p:nvSpPr>
-          <p:cNvPr id="2" name="Titel 1">
-            <a:extLst>
-              <a:ext uri="{FF2B5EF4-FFF2-40B4-BE49-F238E27FC236}">
-                <a16:creationId xmlns:a16="http://schemas.microsoft.com/office/drawing/2014/main" id="{A0F25EF5-F273-2C46-EE92-9D79CDFD3C6C}"/>
-              </a:ext>
-            </a:extLst>
-          </p:cNvPr>
-          <p:cNvSpPr>
-            <a:spLocks noGrp="1"/>
-          </p:cNvSpPr>
-          <p:nvPr>
-            <p:ph type="title"/>
-          </p:nvPr>
-        </p:nvSpPr>
-        <p:spPr/>
-        <p:txBody>
-          <a:bodyPr/>
-          <a:lstStyle/>
-          <a:p>
-            <a:r>
-              <a:rPr lang="en-US" dirty="0"/>
-              <a:t>Table – Wishlist_PropertyListing</a:t>
-            </a:r>
-          </a:p>
-        </p:txBody>
-      </p:sp>
       <p:pic>
         <p:nvPicPr>
-          <p:cNvPr id="6" name="Inhaltsplatzhalter 5" descr="Ein Bild, das Text, Schrift, Screenshot, Quittung enthält.&#10;&#10;Automatisch generierte Beschreibung">
-            <a:extLst>
-              <a:ext uri="{FF2B5EF4-FFF2-40B4-BE49-F238E27FC236}">
-                <a16:creationId xmlns:a16="http://schemas.microsoft.com/office/drawing/2014/main" id="{F52374AF-EB19-DB2F-6264-BF01715F6521}"/>
+          <p:cNvPr id="14" name="Grafik 13" descr="Ein Bild, das Text, Screenshot, Software enthält.&#10;&#10;Automatisch generierte Beschreibung">
+            <a:extLst>
+              <a:ext uri="{FF2B5EF4-FFF2-40B4-BE49-F238E27FC236}">
+                <a16:creationId xmlns:a16="http://schemas.microsoft.com/office/drawing/2014/main" id="{4388A9A4-ED0A-CC23-6F6F-50A1DFAFA8B5}"/>
               </a:ext>
             </a:extLst>
           </p:cNvPr>
           <p:cNvPicPr>
-            <a:picLocks noGrp="1" noChangeAspect="1"/>
+            <a:picLocks noChangeAspect="1"/>
           </p:cNvPicPr>
-          <p:nvPr>
-            <p:ph sz="half" idx="1"/>
-          </p:nvPr>
+          <p:nvPr/>
         </p:nvPicPr>
         <p:blipFill>
           <a:blip r:embed="rId2">
@@ -5074,13 +5926,44 @@
         </p:blipFill>
         <p:spPr>
           <a:xfrm>
-            <a:off x="2759869" y="3613150"/>
-            <a:ext cx="1914525" cy="1152525"/>
-          </a:xfrm>
+            <a:off x="1174750" y="2328101"/>
+            <a:ext cx="4522381" cy="3505769"/>
+          </a:xfrm>
+          <a:prstGeom prst="rect">
+            <a:avLst/>
+          </a:prstGeom>
         </p:spPr>
       </p:pic>
       <p:sp>
         <p:nvSpPr>
+          <p:cNvPr id="2" name="Titel 1">
+            <a:extLst>
+              <a:ext uri="{FF2B5EF4-FFF2-40B4-BE49-F238E27FC236}">
+                <a16:creationId xmlns:a16="http://schemas.microsoft.com/office/drawing/2014/main" id="{A0F25EF5-F273-2C46-EE92-9D79CDFD3C6C}"/>
+              </a:ext>
+            </a:extLst>
+          </p:cNvPr>
+          <p:cNvSpPr>
+            <a:spLocks noGrp="1"/>
+          </p:cNvSpPr>
+          <p:nvPr>
+            <p:ph type="title"/>
+          </p:nvPr>
+        </p:nvSpPr>
+        <p:spPr/>
+        <p:txBody>
+          <a:bodyPr/>
+          <a:lstStyle/>
+          <a:p>
+            <a:r>
+              <a:rPr lang="en-US" dirty="0"/>
+              <a:t>Table – Wishlist_PropertyListing</a:t>
+            </a:r>
+          </a:p>
+        </p:txBody>
+      </p:sp>
+      <p:sp>
+        <p:nvSpPr>
           <p:cNvPr id="4" name="Inhaltsplatzhalter 3">
             <a:extLst>
               <a:ext uri="{FF2B5EF4-FFF2-40B4-BE49-F238E27FC236}">
@@ -5095,9 +5978,16 @@
             <p:ph sz="half" idx="2"/>
           </p:nvPr>
         </p:nvSpPr>
-        <p:spPr/>
-        <p:txBody>
-          <a:bodyPr/>
+        <p:spPr>
+          <a:xfrm>
+            <a:off x="6338315" y="2638044"/>
+            <a:ext cx="4270247" cy="3184906"/>
+          </a:xfrm>
+        </p:spPr>
+        <p:txBody>
+          <a:bodyPr>
+            <a:normAutofit fontScale="92500" lnSpcReduction="20000"/>
+          </a:bodyPr>
           <a:lstStyle/>
           <a:p>
             <a:r>
@@ -5115,6 +6005,12 @@
             <a:r>
               <a:rPr lang="en-US" dirty="0"/>
               <a:t>The propertylisting table will be introduced in the following slides.</a:t>
+            </a:r>
+          </a:p>
+          <a:p>
+            <a:r>
+              <a:rPr lang="en-US" dirty="0"/>
+              <a:t>As explained in the previous slide, this table stands in close relation to the wishlist table. The second test case demonstrates the relationship of a wishlist with the propertylisting table via the link of this table very well.</a:t>
             </a:r>
           </a:p>
         </p:txBody>
@@ -5149,6 +6045,78 @@
           <a:xfrm>
             <a:off x="11633200" y="6299200"/>
             <a:ext cx="457200" cy="457200"/>
+          </a:xfrm>
+          <a:prstGeom prst="rect">
+            <a:avLst/>
+          </a:prstGeom>
+        </p:spPr>
+      </p:pic>
+      <p:pic>
+        <p:nvPicPr>
+          <p:cNvPr id="11" name="Grafik 10" descr="Ein Bild, das Text, Schrift, Screenshot, Quittung enthält.&#10;&#10;Automatisch generierte Beschreibung">
+            <a:extLst>
+              <a:ext uri="{FF2B5EF4-FFF2-40B4-BE49-F238E27FC236}">
+                <a16:creationId xmlns:a16="http://schemas.microsoft.com/office/drawing/2014/main" id="{4A23B7E3-BAF9-8220-24CD-8387E4FFD85E}"/>
+              </a:ext>
+            </a:extLst>
+          </p:cNvPr>
+          <p:cNvPicPr>
+            <a:picLocks noChangeAspect="1"/>
+          </p:cNvPicPr>
+          <p:nvPr/>
+        </p:nvPicPr>
+        <p:blipFill>
+          <a:blip r:embed="rId4">
+            <a:extLst>
+              <a:ext uri="{28A0092B-C50C-407E-A947-70E740481C1C}">
+                <a14:useLocalDpi xmlns:a14="http://schemas.microsoft.com/office/drawing/2010/main" val="0"/>
+              </a:ext>
+            </a:extLst>
+          </a:blip>
+          <a:stretch>
+            <a:fillRect/>
+          </a:stretch>
+        </p:blipFill>
+        <p:spPr>
+          <a:xfrm>
+            <a:off x="4496421" y="2700337"/>
+            <a:ext cx="1841894" cy="1103313"/>
+          </a:xfrm>
+          <a:prstGeom prst="rect">
+            <a:avLst/>
+          </a:prstGeom>
+        </p:spPr>
+      </p:pic>
+      <p:pic>
+        <p:nvPicPr>
+          <p:cNvPr id="16" name="Grafik 15">
+            <a:extLst>
+              <a:ext uri="{FF2B5EF4-FFF2-40B4-BE49-F238E27FC236}">
+                <a16:creationId xmlns:a16="http://schemas.microsoft.com/office/drawing/2014/main" id="{978BC9D5-EEB4-9211-BD46-CAC9068FE4C0}"/>
+              </a:ext>
+            </a:extLst>
+          </p:cNvPr>
+          <p:cNvPicPr>
+            <a:picLocks noChangeAspect="1"/>
+          </p:cNvPicPr>
+          <p:nvPr/>
+        </p:nvPicPr>
+        <p:blipFill>
+          <a:blip r:embed="rId5">
+            <a:extLst>
+              <a:ext uri="{28A0092B-C50C-407E-A947-70E740481C1C}">
+                <a14:useLocalDpi xmlns:a14="http://schemas.microsoft.com/office/drawing/2010/main" val="0"/>
+              </a:ext>
+            </a:extLst>
+          </a:blip>
+          <a:stretch>
+            <a:fillRect/>
+          </a:stretch>
+        </p:blipFill>
+        <p:spPr>
+          <a:xfrm>
+            <a:off x="1174750" y="5885243"/>
+            <a:ext cx="9433812" cy="721146"/>
           </a:xfrm>
           <a:prstGeom prst="rect">
             <a:avLst/>
@@ -5240,7 +6208,7 @@
             </a:pPr>
             <a:r>
               <a:rPr lang="en-US" dirty="0"/>
-              <a:t>Introduction and Structure of Presentation</a:t>
+              <a:t>Introduction and Presentation Structure</a:t>
             </a:r>
           </a:p>
           <a:p>
@@ -5250,7 +6218,7 @@
             </a:pPr>
             <a:r>
               <a:rPr lang="en-US" dirty="0"/>
-              <a:t>General Database Structure</a:t>
+              <a:t>Changes compared to Phase 1</a:t>
             </a:r>
           </a:p>
           <a:p>
@@ -5260,7 +6228,7 @@
             </a:pPr>
             <a:r>
               <a:rPr lang="en-US" dirty="0"/>
-              <a:t>Individual Table Examinations</a:t>
+              <a:t>General Database Structure</a:t>
             </a:r>
           </a:p>
           <a:p>
@@ -5268,7 +6236,20 @@
               <a:buFont typeface="+mj-lt"/>
               <a:buAutoNum type="arabicPeriod"/>
             </a:pPr>
-            <a:endParaRPr lang="en-US" dirty="0"/>
+            <a:r>
+              <a:rPr lang="en-US" dirty="0"/>
+              <a:t>Examining Individual Table</a:t>
+            </a:r>
+          </a:p>
+          <a:p>
+            <a:pPr marL="457200" indent="-457200">
+              <a:buFont typeface="+mj-lt"/>
+              <a:buAutoNum type="arabicPeriod"/>
+            </a:pPr>
+            <a:r>
+              <a:rPr lang="en-US" dirty="0"/>
+              <a:t>Conclusion &amp; Closing Thoughts</a:t>
+            </a:r>
           </a:p>
           <a:p>
             <a:pPr marL="857250" lvl="1" indent="-457200">
@@ -5380,41 +6361,6 @@
           </a:p>
         </p:txBody>
       </p:sp>
-      <p:pic>
-        <p:nvPicPr>
-          <p:cNvPr id="6" name="Inhaltsplatzhalter 5" descr="Ein Bild, das Text, Screenshot, Schrift, Zahl enthält.&#10;&#10;Automatisch generierte Beschreibung">
-            <a:extLst>
-              <a:ext uri="{FF2B5EF4-FFF2-40B4-BE49-F238E27FC236}">
-                <a16:creationId xmlns:a16="http://schemas.microsoft.com/office/drawing/2014/main" id="{75BA3FCB-75A3-13E5-8492-EB52495AFB02}"/>
-              </a:ext>
-            </a:extLst>
-          </p:cNvPr>
-          <p:cNvPicPr>
-            <a:picLocks noGrp="1" noChangeAspect="1"/>
-          </p:cNvPicPr>
-          <p:nvPr>
-            <p:ph sz="half" idx="1"/>
-          </p:nvPr>
-        </p:nvPicPr>
-        <p:blipFill>
-          <a:blip r:embed="rId2">
-            <a:extLst>
-              <a:ext uri="{28A0092B-C50C-407E-A947-70E740481C1C}">
-                <a14:useLocalDpi xmlns:a14="http://schemas.microsoft.com/office/drawing/2010/main" val="0"/>
-              </a:ext>
-            </a:extLst>
-          </a:blip>
-          <a:stretch>
-            <a:fillRect/>
-          </a:stretch>
-        </p:blipFill>
-        <p:spPr>
-          <a:xfrm>
-            <a:off x="3094673" y="2638425"/>
-            <a:ext cx="1244916" cy="3101975"/>
-          </a:xfrm>
-        </p:spPr>
-      </p:pic>
       <p:sp>
         <p:nvSpPr>
           <p:cNvPr id="4" name="Inhaltsplatzhalter 3">
@@ -5431,9 +6377,16 @@
             <p:ph sz="half" idx="2"/>
           </p:nvPr>
         </p:nvSpPr>
-        <p:spPr/>
-        <p:txBody>
-          <a:bodyPr/>
+        <p:spPr>
+          <a:xfrm>
+            <a:off x="6338888" y="2440704"/>
+            <a:ext cx="4270247" cy="4024504"/>
+          </a:xfrm>
+        </p:spPr>
+        <p:txBody>
+          <a:bodyPr>
+            <a:normAutofit fontScale="85000" lnSpcReduction="10000"/>
+          </a:bodyPr>
           <a:lstStyle/>
           <a:p>
             <a:r>
@@ -5451,6 +6404,12 @@
             <a:r>
               <a:rPr lang="en-US" dirty="0"/>
               <a:t>These relations rely on the ‘propertylisting_id’ and are introduced in the following slides.</a:t>
+            </a:r>
+          </a:p>
+          <a:p>
+            <a:r>
+              <a:rPr lang="en-US" dirty="0"/>
+              <a:t>Although many of the relations of this table have already been tested, this table of great importance to the overall system. It is therefore reasonable to create a test case that generally tests all relationships of this table. Said test case can be seen here, it focuses on returning relevant from all tables that have a relationship with the propertylisting table. (Either via property or host id)</a:t>
             </a:r>
           </a:p>
         </p:txBody>
@@ -5470,7 +6429,7 @@
           <p:nvPr/>
         </p:nvPicPr>
         <p:blipFill>
-          <a:blip r:embed="rId3">
+          <a:blip r:embed="rId2">
             <a:extLst>
               <a:ext uri="{28A0092B-C50C-407E-A947-70E740481C1C}">
                 <a14:useLocalDpi xmlns:a14="http://schemas.microsoft.com/office/drawing/2010/main" val="0"/>
@@ -5485,6 +6444,113 @@
           <a:xfrm>
             <a:off x="11633200" y="6299200"/>
             <a:ext cx="457200" cy="457200"/>
+          </a:xfrm>
+          <a:prstGeom prst="rect">
+            <a:avLst/>
+          </a:prstGeom>
+        </p:spPr>
+      </p:pic>
+      <p:pic>
+        <p:nvPicPr>
+          <p:cNvPr id="20" name="Inhaltsplatzhalter 19" descr="Ein Bild, das Text, Screenshot, Software, Multimedia-Software enthält.&#10;&#10;Automatisch generierte Beschreibung">
+            <a:extLst>
+              <a:ext uri="{FF2B5EF4-FFF2-40B4-BE49-F238E27FC236}">
+                <a16:creationId xmlns:a16="http://schemas.microsoft.com/office/drawing/2014/main" id="{2716A5CB-430C-15CA-760E-E64295F2DF47}"/>
+              </a:ext>
+            </a:extLst>
+          </p:cNvPr>
+          <p:cNvPicPr>
+            <a:picLocks noGrp="1" noChangeAspect="1"/>
+          </p:cNvPicPr>
+          <p:nvPr>
+            <p:ph sz="half" idx="1"/>
+          </p:nvPr>
+        </p:nvPicPr>
+        <p:blipFill>
+          <a:blip r:embed="rId3">
+            <a:extLst>
+              <a:ext uri="{28A0092B-C50C-407E-A947-70E740481C1C}">
+                <a14:useLocalDpi xmlns:a14="http://schemas.microsoft.com/office/drawing/2010/main" val="0"/>
+              </a:ext>
+            </a:extLst>
+          </a:blip>
+          <a:stretch>
+            <a:fillRect/>
+          </a:stretch>
+        </p:blipFill>
+        <p:spPr>
+          <a:xfrm>
+            <a:off x="1621202" y="2638425"/>
+            <a:ext cx="4191858" cy="3101975"/>
+          </a:xfrm>
+        </p:spPr>
+      </p:pic>
+      <p:pic>
+        <p:nvPicPr>
+          <p:cNvPr id="11" name="Grafik 10" descr="Ein Bild, das Text, Screenshot, Zahl, Schrift enthält.&#10;&#10;Automatisch generierte Beschreibung">
+            <a:extLst>
+              <a:ext uri="{FF2B5EF4-FFF2-40B4-BE49-F238E27FC236}">
+                <a16:creationId xmlns:a16="http://schemas.microsoft.com/office/drawing/2014/main" id="{816AC3BA-D019-A7AE-090A-EC2F07898D55}"/>
+              </a:ext>
+            </a:extLst>
+          </p:cNvPr>
+          <p:cNvPicPr>
+            <a:picLocks noChangeAspect="1"/>
+          </p:cNvPicPr>
+          <p:nvPr/>
+        </p:nvPicPr>
+        <p:blipFill>
+          <a:blip r:embed="rId4">
+            <a:extLst>
+              <a:ext uri="{28A0092B-C50C-407E-A947-70E740481C1C}">
+                <a14:useLocalDpi xmlns:a14="http://schemas.microsoft.com/office/drawing/2010/main" val="0"/>
+              </a:ext>
+            </a:extLst>
+          </a:blip>
+          <a:stretch>
+            <a:fillRect/>
+          </a:stretch>
+        </p:blipFill>
+        <p:spPr>
+          <a:xfrm>
+            <a:off x="4915915" y="3050414"/>
+            <a:ext cx="1249211" cy="3308350"/>
+          </a:xfrm>
+          <a:prstGeom prst="rect">
+            <a:avLst/>
+          </a:prstGeom>
+        </p:spPr>
+      </p:pic>
+      <p:pic>
+        <p:nvPicPr>
+          <p:cNvPr id="22" name="Grafik 21">
+            <a:extLst>
+              <a:ext uri="{FF2B5EF4-FFF2-40B4-BE49-F238E27FC236}">
+                <a16:creationId xmlns:a16="http://schemas.microsoft.com/office/drawing/2014/main" id="{8427C8DD-220F-2932-C5D7-9653F6A8A613}"/>
+              </a:ext>
+            </a:extLst>
+          </p:cNvPr>
+          <p:cNvPicPr>
+            <a:picLocks noChangeAspect="1"/>
+          </p:cNvPicPr>
+          <p:nvPr/>
+        </p:nvPicPr>
+        <p:blipFill>
+          <a:blip r:embed="rId5">
+            <a:extLst>
+              <a:ext uri="{28A0092B-C50C-407E-A947-70E740481C1C}">
+                <a14:useLocalDpi xmlns:a14="http://schemas.microsoft.com/office/drawing/2010/main" val="0"/>
+              </a:ext>
+            </a:extLst>
+          </a:blip>
+          <a:stretch>
+            <a:fillRect/>
+          </a:stretch>
+        </p:blipFill>
+        <p:spPr>
+          <a:xfrm>
+            <a:off x="352441" y="5779273"/>
+            <a:ext cx="4518009" cy="892279"/>
           </a:xfrm>
           <a:prstGeom prst="rect">
             <a:avLst/>
@@ -5549,41 +6615,6 @@
           </a:p>
         </p:txBody>
       </p:sp>
-      <p:pic>
-        <p:nvPicPr>
-          <p:cNvPr id="6" name="Inhaltsplatzhalter 5" descr="Ein Bild, das Text, Screenshot, Schrift, Zahl enthält.&#10;&#10;Automatisch generierte Beschreibung">
-            <a:extLst>
-              <a:ext uri="{FF2B5EF4-FFF2-40B4-BE49-F238E27FC236}">
-                <a16:creationId xmlns:a16="http://schemas.microsoft.com/office/drawing/2014/main" id="{38CF2E26-2A16-775E-AD0E-1BCE92551688}"/>
-              </a:ext>
-            </a:extLst>
-          </p:cNvPr>
-          <p:cNvPicPr>
-            <a:picLocks noGrp="1" noChangeAspect="1"/>
-          </p:cNvPicPr>
-          <p:nvPr>
-            <p:ph sz="half" idx="1"/>
-          </p:nvPr>
-        </p:nvPicPr>
-        <p:blipFill>
-          <a:blip r:embed="rId2">
-            <a:extLst>
-              <a:ext uri="{28A0092B-C50C-407E-A947-70E740481C1C}">
-                <a14:useLocalDpi xmlns:a14="http://schemas.microsoft.com/office/drawing/2010/main" val="0"/>
-              </a:ext>
-            </a:extLst>
-          </a:blip>
-          <a:stretch>
-            <a:fillRect/>
-          </a:stretch>
-        </p:blipFill>
-        <p:spPr>
-          <a:xfrm>
-            <a:off x="2999155" y="2638425"/>
-            <a:ext cx="1435952" cy="3101975"/>
-          </a:xfrm>
-        </p:spPr>
-      </p:pic>
       <p:sp>
         <p:nvSpPr>
           <p:cNvPr id="4" name="Inhaltsplatzhalter 3">
@@ -5600,9 +6631,16 @@
             <p:ph sz="half" idx="2"/>
           </p:nvPr>
         </p:nvSpPr>
-        <p:spPr/>
-        <p:txBody>
-          <a:bodyPr/>
+        <p:spPr>
+          <a:xfrm>
+            <a:off x="6338315" y="2638043"/>
+            <a:ext cx="4270247" cy="3391165"/>
+          </a:xfrm>
+        </p:spPr>
+        <p:txBody>
+          <a:bodyPr>
+            <a:normAutofit fontScale="92500" lnSpcReduction="10000"/>
+          </a:bodyPr>
           <a:lstStyle/>
           <a:p>
             <a:r>
@@ -5620,6 +6658,12 @@
             <a:r>
               <a:rPr lang="en-US" dirty="0"/>
               <a:t>Users can also add comments and images to the review.</a:t>
+            </a:r>
+          </a:p>
+          <a:p>
+            <a:r>
+              <a:rPr lang="en-US" dirty="0"/>
+              <a:t>The test case simple checks the relationship between propertylistings and reviews, as well as the review content.</a:t>
             </a:r>
           </a:p>
         </p:txBody>
@@ -5639,7 +6683,7 @@
           <p:nvPr/>
         </p:nvPicPr>
         <p:blipFill>
-          <a:blip r:embed="rId3">
+          <a:blip r:embed="rId2">
             <a:extLst>
               <a:ext uri="{28A0092B-C50C-407E-A947-70E740481C1C}">
                 <a14:useLocalDpi xmlns:a14="http://schemas.microsoft.com/office/drawing/2010/main" val="0"/>
@@ -5654,6 +6698,113 @@
           <a:xfrm>
             <a:off x="11633200" y="6299200"/>
             <a:ext cx="457200" cy="457200"/>
+          </a:xfrm>
+          <a:prstGeom prst="rect">
+            <a:avLst/>
+          </a:prstGeom>
+        </p:spPr>
+      </p:pic>
+      <p:pic>
+        <p:nvPicPr>
+          <p:cNvPr id="11" name="Inhaltsplatzhalter 10" descr="Ein Bild, das Text, Screenshot, Software enthält.&#10;&#10;Automatisch generierte Beschreibung">
+            <a:extLst>
+              <a:ext uri="{FF2B5EF4-FFF2-40B4-BE49-F238E27FC236}">
+                <a16:creationId xmlns:a16="http://schemas.microsoft.com/office/drawing/2014/main" id="{5ECA4C77-A0BE-B411-80B6-AB048F94F0D3}"/>
+              </a:ext>
+            </a:extLst>
+          </p:cNvPr>
+          <p:cNvPicPr>
+            <a:picLocks noGrp="1" noChangeAspect="1"/>
+          </p:cNvPicPr>
+          <p:nvPr>
+            <p:ph sz="half" idx="1"/>
+          </p:nvPr>
+        </p:nvPicPr>
+        <p:blipFill>
+          <a:blip r:embed="rId3">
+            <a:extLst>
+              <a:ext uri="{28A0092B-C50C-407E-A947-70E740481C1C}">
+                <a14:useLocalDpi xmlns:a14="http://schemas.microsoft.com/office/drawing/2010/main" val="0"/>
+              </a:ext>
+            </a:extLst>
+          </a:blip>
+          <a:stretch>
+            <a:fillRect/>
+          </a:stretch>
+        </p:blipFill>
+        <p:spPr>
+          <a:xfrm>
+            <a:off x="120650" y="2638044"/>
+            <a:ext cx="4932364" cy="1573909"/>
+          </a:xfrm>
+        </p:spPr>
+      </p:pic>
+      <p:pic>
+        <p:nvPicPr>
+          <p:cNvPr id="13" name="Grafik 12" descr="Ein Bild, das Text, Screenshot, Schrift, Zahl enthält.&#10;&#10;Automatisch generierte Beschreibung">
+            <a:extLst>
+              <a:ext uri="{FF2B5EF4-FFF2-40B4-BE49-F238E27FC236}">
+                <a16:creationId xmlns:a16="http://schemas.microsoft.com/office/drawing/2014/main" id="{5AD69A3A-5416-AAB6-C406-98192A02DD0C}"/>
+              </a:ext>
+            </a:extLst>
+          </p:cNvPr>
+          <p:cNvPicPr>
+            <a:picLocks noChangeAspect="1"/>
+          </p:cNvPicPr>
+          <p:nvPr/>
+        </p:nvPicPr>
+        <p:blipFill>
+          <a:blip r:embed="rId4">
+            <a:extLst>
+              <a:ext uri="{28A0092B-C50C-407E-A947-70E740481C1C}">
+                <a14:useLocalDpi xmlns:a14="http://schemas.microsoft.com/office/drawing/2010/main" val="0"/>
+              </a:ext>
+            </a:extLst>
+          </a:blip>
+          <a:stretch>
+            <a:fillRect/>
+          </a:stretch>
+        </p:blipFill>
+        <p:spPr>
+          <a:xfrm>
+            <a:off x="4984176" y="2791554"/>
+            <a:ext cx="1233489" cy="2656746"/>
+          </a:xfrm>
+          <a:prstGeom prst="rect">
+            <a:avLst/>
+          </a:prstGeom>
+        </p:spPr>
+      </p:pic>
+      <p:pic>
+        <p:nvPicPr>
+          <p:cNvPr id="17" name="Grafik 16">
+            <a:extLst>
+              <a:ext uri="{FF2B5EF4-FFF2-40B4-BE49-F238E27FC236}">
+                <a16:creationId xmlns:a16="http://schemas.microsoft.com/office/drawing/2014/main" id="{AC1B6790-9E80-3AE3-79EE-22B71AAB3113}"/>
+              </a:ext>
+            </a:extLst>
+          </p:cNvPr>
+          <p:cNvPicPr>
+            <a:picLocks noChangeAspect="1"/>
+          </p:cNvPicPr>
+          <p:nvPr/>
+        </p:nvPicPr>
+        <p:blipFill>
+          <a:blip r:embed="rId5">
+            <a:extLst>
+              <a:ext uri="{28A0092B-C50C-407E-A947-70E740481C1C}">
+                <a14:useLocalDpi xmlns:a14="http://schemas.microsoft.com/office/drawing/2010/main" val="0"/>
+              </a:ext>
+            </a:extLst>
+          </a:blip>
+          <a:stretch>
+            <a:fillRect/>
+          </a:stretch>
+        </p:blipFill>
+        <p:spPr>
+          <a:xfrm>
+            <a:off x="101600" y="6029209"/>
+            <a:ext cx="10775950" cy="493245"/>
           </a:xfrm>
           <a:prstGeom prst="rect">
             <a:avLst/>
@@ -5748,7 +6899,7 @@
         </p:blipFill>
         <p:spPr>
           <a:xfrm>
-            <a:off x="2880519" y="2955925"/>
+            <a:off x="2568464" y="2396744"/>
             <a:ext cx="1724025" cy="1152525"/>
           </a:xfrm>
         </p:spPr>
@@ -5769,22 +6920,27 @@
             <p:ph sz="half" idx="2"/>
           </p:nvPr>
         </p:nvSpPr>
-        <p:spPr/>
+        <p:spPr>
+          <a:xfrm>
+            <a:off x="6338315" y="2638044"/>
+            <a:ext cx="4270247" cy="3502406"/>
+          </a:xfrm>
+        </p:spPr>
         <p:txBody>
           <a:bodyPr>
-            <a:normAutofit fontScale="85000" lnSpcReduction="10000"/>
+            <a:normAutofit fontScale="85000" lnSpcReduction="20000"/>
           </a:bodyPr>
           <a:lstStyle/>
           <a:p>
             <a:r>
               <a:rPr lang="en-US" dirty="0"/>
-              <a:t>Each table is used to normalize a relation between the PropertyListing and their respective table.</a:t>
-            </a:r>
-          </a:p>
-          <a:p>
-            <a:r>
-              <a:rPr lang="en-US" dirty="0"/>
-              <a:t>The naming convention of these tables is meant to represent link between ‘PropertyListing’ and ‘Amenity’, ‘Category’ or ‘HouseRule’ table.</a:t>
+              <a:t>Each table is used to normalize a relation between the PropertyListing and their respective table. I see these tables as one equivalence class.</a:t>
+            </a:r>
+          </a:p>
+          <a:p>
+            <a:r>
+              <a:rPr lang="en-US" dirty="0"/>
+              <a:t>The naming convention of these tables is meant to represent the link between ‘PropertyListing’ and ‘Amenity’, ‘Category’ or ‘HouseRule’ table.</a:t>
             </a:r>
           </a:p>
           <a:p>
@@ -5813,6 +6969,16 @@
               <a:t>(I am considering removing these for the finalization phase and would appreciate feedback regarding this)</a:t>
             </a:r>
           </a:p>
+          <a:p>
+            <a:r>
+              <a:rPr lang="en-US" dirty="0">
+                <a:solidFill>
+                  <a:schemeClr val="tx1"/>
+                </a:solidFill>
+              </a:rPr>
+              <a:t>The test case checks the link of the propertylisting to the respective table via the link of these tables by returning data of each data entry.</a:t>
+            </a:r>
+          </a:p>
         </p:txBody>
       </p:sp>
       <p:pic>
@@ -5843,7 +7009,7 @@
         </p:blipFill>
         <p:spPr>
           <a:xfrm>
-            <a:off x="3799681" y="4216400"/>
+            <a:off x="4371975" y="2396744"/>
             <a:ext cx="1724025" cy="1152525"/>
           </a:xfrm>
           <a:prstGeom prst="rect">
@@ -5879,7 +7045,7 @@
         </p:blipFill>
         <p:spPr>
           <a:xfrm>
-            <a:off x="1959767" y="4216400"/>
+            <a:off x="764953" y="2396744"/>
             <a:ext cx="1724025" cy="1152525"/>
           </a:xfrm>
           <a:prstGeom prst="rect">
@@ -5917,6 +7083,121 @@
           <a:xfrm>
             <a:off x="11633200" y="6299200"/>
             <a:ext cx="457200" cy="457200"/>
+          </a:xfrm>
+          <a:prstGeom prst="rect">
+            <a:avLst/>
+          </a:prstGeom>
+        </p:spPr>
+      </p:pic>
+      <p:pic>
+        <p:nvPicPr>
+          <p:cNvPr id="11" name="Grafik 10" descr="Ein Bild, das Text, Screenshot, Schrift enthält.&#10;&#10;Automatisch generierte Beschreibung">
+            <a:extLst>
+              <a:ext uri="{FF2B5EF4-FFF2-40B4-BE49-F238E27FC236}">
+                <a16:creationId xmlns:a16="http://schemas.microsoft.com/office/drawing/2014/main" id="{D7AABD4F-BADB-0519-75A0-013C9DB8E82E}"/>
+              </a:ext>
+            </a:extLst>
+          </p:cNvPr>
+          <p:cNvPicPr>
+            <a:picLocks noChangeAspect="1"/>
+          </p:cNvPicPr>
+          <p:nvPr/>
+        </p:nvPicPr>
+        <p:blipFill>
+          <a:blip r:embed="rId6">
+            <a:extLst>
+              <a:ext uri="{28A0092B-C50C-407E-A947-70E740481C1C}">
+                <a14:useLocalDpi xmlns:a14="http://schemas.microsoft.com/office/drawing/2010/main" val="0"/>
+              </a:ext>
+            </a:extLst>
+          </a:blip>
+          <a:stretch>
+            <a:fillRect/>
+          </a:stretch>
+        </p:blipFill>
+        <p:spPr>
+          <a:xfrm>
+            <a:off x="764952" y="3625954"/>
+            <a:ext cx="5331047" cy="2190668"/>
+          </a:xfrm>
+          <a:prstGeom prst="rect">
+            <a:avLst/>
+          </a:prstGeom>
+        </p:spPr>
+      </p:pic>
+      <p:sp>
+        <p:nvSpPr>
+          <p:cNvPr id="12" name="Textfeld 11">
+            <a:extLst>
+              <a:ext uri="{FF2B5EF4-FFF2-40B4-BE49-F238E27FC236}">
+                <a16:creationId xmlns:a16="http://schemas.microsoft.com/office/drawing/2014/main" id="{0A6F23B3-E557-D1C5-0818-4F5ABF05757C}"/>
+              </a:ext>
+            </a:extLst>
+          </p:cNvPr>
+          <p:cNvSpPr txBox="1"/>
+          <p:nvPr/>
+        </p:nvSpPr>
+        <p:spPr>
+          <a:xfrm>
+            <a:off x="7404100" y="2153412"/>
+            <a:ext cx="2556764" cy="276999"/>
+          </a:xfrm>
+          <a:prstGeom prst="rect">
+            <a:avLst/>
+          </a:prstGeom>
+          <a:noFill/>
+        </p:spPr>
+        <p:txBody>
+          <a:bodyPr wrap="square" rtlCol="0">
+            <a:spAutoFit/>
+          </a:bodyPr>
+          <a:lstStyle/>
+          <a:p>
+            <a:pPr algn="r"/>
+            <a:r>
+              <a:rPr lang="en-US" sz="1200" dirty="0">
+                <a:solidFill>
+                  <a:schemeClr val="tx1">
+                    <a:lumMod val="50000"/>
+                    <a:lumOff val="50000"/>
+                  </a:schemeClr>
+                </a:solidFill>
+              </a:rPr>
+              <a:t>*X = Category/Amenity/HouseRule</a:t>
+            </a:r>
+          </a:p>
+        </p:txBody>
+      </p:sp>
+      <p:pic>
+        <p:nvPicPr>
+          <p:cNvPr id="14" name="Grafik 13" descr="Ein Bild, das Text, Screenshot, Schrift enthält.&#10;&#10;Automatisch generierte Beschreibung">
+            <a:extLst>
+              <a:ext uri="{FF2B5EF4-FFF2-40B4-BE49-F238E27FC236}">
+                <a16:creationId xmlns:a16="http://schemas.microsoft.com/office/drawing/2014/main" id="{7F4B8A3B-8557-65E0-EABB-FA444C929B59}"/>
+              </a:ext>
+            </a:extLst>
+          </p:cNvPr>
+          <p:cNvPicPr>
+            <a:picLocks noChangeAspect="1"/>
+          </p:cNvPicPr>
+          <p:nvPr/>
+        </p:nvPicPr>
+        <p:blipFill>
+          <a:blip r:embed="rId7">
+            <a:extLst>
+              <a:ext uri="{28A0092B-C50C-407E-A947-70E740481C1C}">
+                <a14:useLocalDpi xmlns:a14="http://schemas.microsoft.com/office/drawing/2010/main" val="0"/>
+              </a:ext>
+            </a:extLst>
+          </a:blip>
+          <a:stretch>
+            <a:fillRect/>
+          </a:stretch>
+        </p:blipFill>
+        <p:spPr>
+          <a:xfrm>
+            <a:off x="764951" y="5893307"/>
+            <a:ext cx="5331047" cy="863093"/>
           </a:xfrm>
           <a:prstGeom prst="rect">
             <a:avLst/>
@@ -6015,7 +7296,7 @@
         </p:blipFill>
         <p:spPr>
           <a:xfrm>
-            <a:off x="2855119" y="3327400"/>
+            <a:off x="2855119" y="2566987"/>
             <a:ext cx="1724025" cy="1724025"/>
           </a:xfrm>
         </p:spPr>
@@ -6038,7 +7319,9 @@
         </p:nvSpPr>
         <p:spPr/>
         <p:txBody>
-          <a:bodyPr/>
+          <a:bodyPr>
+            <a:normAutofit fontScale="92500" lnSpcReduction="20000"/>
+          </a:bodyPr>
           <a:lstStyle/>
           <a:p>
             <a:r>
@@ -6049,7 +7332,19 @@
           <a:p>
             <a:r>
               <a:rPr lang="en-US" dirty="0"/>
+              <a:t>Like the tables in the last slide, I also consider these tables one equivalence class.</a:t>
+            </a:r>
+          </a:p>
+          <a:p>
+            <a:r>
+              <a:rPr lang="en-US" dirty="0"/>
               <a:t>These table hold unexpectedly little information because they are only represented by their name and an icon in the application.</a:t>
+            </a:r>
+          </a:p>
+          <a:p>
+            <a:r>
+              <a:rPr lang="en-US" dirty="0"/>
+              <a:t>Relevant for test cases are the relationships of these tables, these are already tested other test cases, resulting in these simple queries, which check for content.</a:t>
             </a:r>
           </a:p>
         </p:txBody>
@@ -6082,7 +7377,7 @@
         </p:blipFill>
         <p:spPr>
           <a:xfrm>
-            <a:off x="4614290" y="3327022"/>
+            <a:off x="4614290" y="2566609"/>
             <a:ext cx="1724025" cy="1724025"/>
           </a:xfrm>
           <a:prstGeom prst="rect">
@@ -6118,7 +7413,7 @@
         </p:blipFill>
         <p:spPr>
           <a:xfrm>
-            <a:off x="1095948" y="3327022"/>
+            <a:off x="1095948" y="2566609"/>
             <a:ext cx="1724025" cy="1724025"/>
           </a:xfrm>
           <a:prstGeom prst="rect">
@@ -6162,6 +7457,136 @@
           </a:prstGeom>
         </p:spPr>
       </p:pic>
+      <p:pic>
+        <p:nvPicPr>
+          <p:cNvPr id="5" name="Grafik 4" descr="Ein Bild, das Text, Screenshot, Schrift, Zahl enthält.&#10;&#10;Automatisch generierte Beschreibung">
+            <a:extLst>
+              <a:ext uri="{FF2B5EF4-FFF2-40B4-BE49-F238E27FC236}">
+                <a16:creationId xmlns:a16="http://schemas.microsoft.com/office/drawing/2014/main" id="{C34B7707-3C59-12E8-1182-49FAC6F90C4B}"/>
+              </a:ext>
+            </a:extLst>
+          </p:cNvPr>
+          <p:cNvPicPr>
+            <a:picLocks noChangeAspect="1"/>
+          </p:cNvPicPr>
+          <p:nvPr/>
+        </p:nvPicPr>
+        <p:blipFill>
+          <a:blip r:embed="rId6">
+            <a:extLst>
+              <a:ext uri="{28A0092B-C50C-407E-A947-70E740481C1C}">
+                <a14:useLocalDpi xmlns:a14="http://schemas.microsoft.com/office/drawing/2010/main" val="0"/>
+              </a:ext>
+            </a:extLst>
+          </a:blip>
+          <a:stretch>
+            <a:fillRect/>
+          </a:stretch>
+        </p:blipFill>
+        <p:spPr>
+          <a:xfrm>
+            <a:off x="1095948" y="4416727"/>
+            <a:ext cx="2734057" cy="1476581"/>
+          </a:xfrm>
+          <a:prstGeom prst="rect">
+            <a:avLst/>
+          </a:prstGeom>
+        </p:spPr>
+      </p:pic>
+      <p:sp>
+        <p:nvSpPr>
+          <p:cNvPr id="10" name="Rechteck 9">
+            <a:extLst>
+              <a:ext uri="{FF2B5EF4-FFF2-40B4-BE49-F238E27FC236}">
+                <a16:creationId xmlns:a16="http://schemas.microsoft.com/office/drawing/2014/main" id="{2CF20BD5-74D3-5F5C-D486-7F1412BCB992}"/>
+              </a:ext>
+            </a:extLst>
+          </p:cNvPr>
+          <p:cNvSpPr/>
+          <p:nvPr/>
+        </p:nvSpPr>
+        <p:spPr>
+          <a:xfrm>
+            <a:off x="3760215" y="5283133"/>
+            <a:ext cx="2578100" cy="610175"/>
+          </a:xfrm>
+          <a:prstGeom prst="rect">
+            <a:avLst/>
+          </a:prstGeom>
+          <a:solidFill>
+            <a:schemeClr val="bg1"/>
+          </a:solidFill>
+          <a:ln w="19050">
+            <a:solidFill>
+              <a:srgbClr val="404040"/>
+            </a:solidFill>
+          </a:ln>
+        </p:spPr>
+        <p:style>
+          <a:lnRef idx="2">
+            <a:schemeClr val="accent1">
+              <a:shade val="15000"/>
+            </a:schemeClr>
+          </a:lnRef>
+          <a:fillRef idx="1">
+            <a:schemeClr val="accent1"/>
+          </a:fillRef>
+          <a:effectRef idx="0">
+            <a:schemeClr val="accent1"/>
+          </a:effectRef>
+          <a:fontRef idx="minor">
+            <a:schemeClr val="lt1"/>
+          </a:fontRef>
+        </p:style>
+        <p:txBody>
+          <a:bodyPr rtlCol="0" anchor="ctr"/>
+          <a:lstStyle/>
+          <a:p>
+            <a:pPr algn="ctr"/>
+            <a:endParaRPr lang="en-US">
+              <a:solidFill>
+                <a:sysClr val="windowText" lastClr="000000"/>
+              </a:solidFill>
+            </a:endParaRPr>
+          </a:p>
+        </p:txBody>
+      </p:sp>
+      <p:sp>
+        <p:nvSpPr>
+          <p:cNvPr id="11" name="Textfeld 10">
+            <a:extLst>
+              <a:ext uri="{FF2B5EF4-FFF2-40B4-BE49-F238E27FC236}">
+                <a16:creationId xmlns:a16="http://schemas.microsoft.com/office/drawing/2014/main" id="{71CC41AF-DD77-218B-5C6B-65B5C4CCC064}"/>
+              </a:ext>
+            </a:extLst>
+          </p:cNvPr>
+          <p:cNvSpPr txBox="1"/>
+          <p:nvPr/>
+        </p:nvSpPr>
+        <p:spPr>
+          <a:xfrm>
+            <a:off x="3760215" y="5308533"/>
+            <a:ext cx="2578100" cy="584775"/>
+          </a:xfrm>
+          <a:prstGeom prst="rect">
+            <a:avLst/>
+          </a:prstGeom>
+          <a:noFill/>
+        </p:spPr>
+        <p:txBody>
+          <a:bodyPr wrap="square" rtlCol="0">
+            <a:spAutoFit/>
+          </a:bodyPr>
+          <a:lstStyle/>
+          <a:p>
+            <a:pPr algn="ctr"/>
+            <a:r>
+              <a:rPr lang="en-US" sz="1600" dirty="0"/>
+              <a:t>Simple tables,  which are tested in previous test case.</a:t>
+            </a:r>
+          </a:p>
+        </p:txBody>
+      </p:sp>
     </p:spTree>
     <p:extLst>
       <p:ext uri="{BB962C8B-B14F-4D97-AF65-F5344CB8AC3E}">
@@ -6220,41 +7645,6 @@
           </a:p>
         </p:txBody>
       </p:sp>
-      <p:pic>
-        <p:nvPicPr>
-          <p:cNvPr id="6" name="Inhaltsplatzhalter 5" descr="Ein Bild, das Text, Screenshot, Quittung, Schrift enthält.&#10;&#10;Automatisch generierte Beschreibung">
-            <a:extLst>
-              <a:ext uri="{FF2B5EF4-FFF2-40B4-BE49-F238E27FC236}">
-                <a16:creationId xmlns:a16="http://schemas.microsoft.com/office/drawing/2014/main" id="{A782A569-BCE5-C049-A229-479A081BF712}"/>
-              </a:ext>
-            </a:extLst>
-          </p:cNvPr>
-          <p:cNvPicPr>
-            <a:picLocks noGrp="1" noChangeAspect="1"/>
-          </p:cNvPicPr>
-          <p:nvPr>
-            <p:ph sz="half" idx="1"/>
-          </p:nvPr>
-        </p:nvPicPr>
-        <p:blipFill>
-          <a:blip r:embed="rId2">
-            <a:extLst>
-              <a:ext uri="{28A0092B-C50C-407E-A947-70E740481C1C}">
-                <a14:useLocalDpi xmlns:a14="http://schemas.microsoft.com/office/drawing/2010/main" val="0"/>
-              </a:ext>
-            </a:extLst>
-          </a:blip>
-          <a:stretch>
-            <a:fillRect/>
-          </a:stretch>
-        </p:blipFill>
-        <p:spPr>
-          <a:xfrm>
-            <a:off x="2855119" y="3327400"/>
-            <a:ext cx="1724025" cy="1724025"/>
-          </a:xfrm>
-        </p:spPr>
-      </p:pic>
       <p:sp>
         <p:nvSpPr>
           <p:cNvPr id="4" name="Inhaltsplatzhalter 3">
@@ -6271,9 +7661,16 @@
             <p:ph sz="half" idx="2"/>
           </p:nvPr>
         </p:nvSpPr>
-        <p:spPr/>
-        <p:txBody>
-          <a:bodyPr/>
+        <p:spPr>
+          <a:xfrm>
+            <a:off x="6338315" y="2638044"/>
+            <a:ext cx="4270247" cy="3305556"/>
+          </a:xfrm>
+        </p:spPr>
+        <p:txBody>
+          <a:bodyPr>
+            <a:normAutofit fontScale="92500" lnSpcReduction="20000"/>
+          </a:bodyPr>
           <a:lstStyle/>
           <a:p>
             <a:r>
@@ -6291,6 +7688,12 @@
             <a:r>
               <a:rPr lang="en-US" dirty="0"/>
               <a:t>These types are not frequently changed, and if they are, then they are changed by an admin.</a:t>
+            </a:r>
+          </a:p>
+          <a:p>
+            <a:r>
+              <a:rPr lang="en-US" dirty="0"/>
+              <a:t>The relevant relationship of this table is already table is already tested in the propertylisting test case, the content itself is once again tested via a simple select all statement in the test.sql file.</a:t>
             </a:r>
           </a:p>
         </p:txBody>
@@ -6310,7 +7713,7 @@
           <p:nvPr/>
         </p:nvPicPr>
         <p:blipFill>
-          <a:blip r:embed="rId3">
+          <a:blip r:embed="rId2">
             <a:extLst>
               <a:ext uri="{28A0092B-C50C-407E-A947-70E740481C1C}">
                 <a14:useLocalDpi xmlns:a14="http://schemas.microsoft.com/office/drawing/2010/main" val="0"/>
@@ -6331,6 +7734,143 @@
           </a:prstGeom>
         </p:spPr>
       </p:pic>
+      <p:pic>
+        <p:nvPicPr>
+          <p:cNvPr id="13" name="Inhaltsplatzhalter 12" descr="Ein Bild, das Text, Screenshot, Schrift, Quittung enthält.&#10;&#10;Automatisch generierte Beschreibung">
+            <a:extLst>
+              <a:ext uri="{FF2B5EF4-FFF2-40B4-BE49-F238E27FC236}">
+                <a16:creationId xmlns:a16="http://schemas.microsoft.com/office/drawing/2014/main" id="{EB3BF591-A7B5-8E7D-F335-E8B4351AE062}"/>
+              </a:ext>
+            </a:extLst>
+          </p:cNvPr>
+          <p:cNvPicPr>
+            <a:picLocks noGrp="1" noChangeAspect="1"/>
+          </p:cNvPicPr>
+          <p:nvPr>
+            <p:ph sz="half" idx="1"/>
+          </p:nvPr>
+        </p:nvPicPr>
+        <p:blipFill>
+          <a:blip r:embed="rId3">
+            <a:extLst>
+              <a:ext uri="{28A0092B-C50C-407E-A947-70E740481C1C}">
+                <a14:useLocalDpi xmlns:a14="http://schemas.microsoft.com/office/drawing/2010/main" val="0"/>
+              </a:ext>
+            </a:extLst>
+          </a:blip>
+          <a:stretch>
+            <a:fillRect/>
+          </a:stretch>
+        </p:blipFill>
+        <p:spPr>
+          <a:xfrm>
+            <a:off x="2850356" y="3322637"/>
+            <a:ext cx="1733550" cy="1733550"/>
+          </a:xfrm>
+        </p:spPr>
+      </p:pic>
+      <p:sp>
+        <p:nvSpPr>
+          <p:cNvPr id="14" name="Rechteck 13">
+            <a:extLst>
+              <a:ext uri="{FF2B5EF4-FFF2-40B4-BE49-F238E27FC236}">
+                <a16:creationId xmlns:a16="http://schemas.microsoft.com/office/drawing/2014/main" id="{DFE61FCB-A974-3DFF-FF92-E531E87B646B}"/>
+              </a:ext>
+            </a:extLst>
+          </p:cNvPr>
+          <p:cNvSpPr/>
+          <p:nvPr/>
+        </p:nvSpPr>
+        <p:spPr>
+          <a:xfrm>
+            <a:off x="2377281" y="5333425"/>
+            <a:ext cx="2578100" cy="610175"/>
+          </a:xfrm>
+          <a:prstGeom prst="rect">
+            <a:avLst/>
+          </a:prstGeom>
+          <a:solidFill>
+            <a:schemeClr val="bg1"/>
+          </a:solidFill>
+          <a:ln w="19050">
+            <a:solidFill>
+              <a:srgbClr val="404040"/>
+            </a:solidFill>
+          </a:ln>
+        </p:spPr>
+        <p:style>
+          <a:lnRef idx="2">
+            <a:schemeClr val="accent1">
+              <a:shade val="15000"/>
+            </a:schemeClr>
+          </a:lnRef>
+          <a:fillRef idx="1">
+            <a:schemeClr val="accent1"/>
+          </a:fillRef>
+          <a:effectRef idx="0">
+            <a:schemeClr val="accent1"/>
+          </a:effectRef>
+          <a:fontRef idx="minor">
+            <a:schemeClr val="lt1"/>
+          </a:fontRef>
+        </p:style>
+        <p:txBody>
+          <a:bodyPr rtlCol="0" anchor="ctr"/>
+          <a:lstStyle/>
+          <a:p>
+            <a:pPr algn="ctr"/>
+            <a:endParaRPr lang="en-US">
+              <a:solidFill>
+                <a:sysClr val="windowText" lastClr="000000"/>
+              </a:solidFill>
+            </a:endParaRPr>
+          </a:p>
+        </p:txBody>
+      </p:sp>
+      <p:sp>
+        <p:nvSpPr>
+          <p:cNvPr id="15" name="Textfeld 14">
+            <a:extLst>
+              <a:ext uri="{FF2B5EF4-FFF2-40B4-BE49-F238E27FC236}">
+                <a16:creationId xmlns:a16="http://schemas.microsoft.com/office/drawing/2014/main" id="{6D335EA4-CBD6-6D7E-0D4B-86F8A3227B5F}"/>
+              </a:ext>
+            </a:extLst>
+          </p:cNvPr>
+          <p:cNvSpPr txBox="1"/>
+          <p:nvPr/>
+        </p:nvSpPr>
+        <p:spPr>
+          <a:xfrm>
+            <a:off x="2377281" y="5358825"/>
+            <a:ext cx="2578100" cy="584775"/>
+          </a:xfrm>
+          <a:prstGeom prst="rect">
+            <a:avLst/>
+          </a:prstGeom>
+          <a:noFill/>
+        </p:spPr>
+        <p:txBody>
+          <a:bodyPr wrap="square" rtlCol="0">
+            <a:spAutoFit/>
+          </a:bodyPr>
+          <a:lstStyle/>
+          <a:p>
+            <a:pPr algn="ctr"/>
+            <a:r>
+              <a:rPr lang="en-US" sz="1600" dirty="0"/>
+              <a:t>‘</a:t>
+            </a:r>
+            <a:r>
+              <a:rPr lang="en-US" altLang="ja-JP" sz="1600" dirty="0"/>
+              <a:t>PropertyType</a:t>
+            </a:r>
+            <a:r>
+              <a:rPr lang="en-US" sz="1600" dirty="0"/>
+              <a:t>’ is a simple table, see test case in test.sql</a:t>
+            </a:r>
+          </a:p>
+        </p:txBody>
+      </p:sp>
     </p:spTree>
     <p:extLst>
       <p:ext uri="{BB962C8B-B14F-4D97-AF65-F5344CB8AC3E}">
@@ -6389,41 +7929,6 @@
           </a:p>
         </p:txBody>
       </p:sp>
-      <p:pic>
-        <p:nvPicPr>
-          <p:cNvPr id="6" name="Inhaltsplatzhalter 5" descr="Ein Bild, das Text, Screenshot, Zahl, Schrift enthält.&#10;&#10;Automatisch generierte Beschreibung">
-            <a:extLst>
-              <a:ext uri="{FF2B5EF4-FFF2-40B4-BE49-F238E27FC236}">
-                <a16:creationId xmlns:a16="http://schemas.microsoft.com/office/drawing/2014/main" id="{4AE50E0B-519B-8B43-6F14-C0E1EA5A12FC}"/>
-              </a:ext>
-            </a:extLst>
-          </p:cNvPr>
-          <p:cNvPicPr>
-            <a:picLocks noGrp="1" noChangeAspect="1"/>
-          </p:cNvPicPr>
-          <p:nvPr>
-            <p:ph sz="half" idx="1"/>
-          </p:nvPr>
-        </p:nvPicPr>
-        <p:blipFill>
-          <a:blip r:embed="rId2">
-            <a:extLst>
-              <a:ext uri="{28A0092B-C50C-407E-A947-70E740481C1C}">
-                <a14:useLocalDpi xmlns:a14="http://schemas.microsoft.com/office/drawing/2010/main" val="0"/>
-              </a:ext>
-            </a:extLst>
-          </a:blip>
-          <a:stretch>
-            <a:fillRect/>
-          </a:stretch>
-        </p:blipFill>
-        <p:spPr>
-          <a:xfrm>
-            <a:off x="3133496" y="2638425"/>
-            <a:ext cx="1167271" cy="3101975"/>
-          </a:xfrm>
-        </p:spPr>
-      </p:pic>
       <p:sp>
         <p:nvSpPr>
           <p:cNvPr id="4" name="Inhaltsplatzhalter 3">
@@ -6440,10 +7945,15 @@
             <p:ph sz="half" idx="2"/>
           </p:nvPr>
         </p:nvSpPr>
-        <p:spPr/>
+        <p:spPr>
+          <a:xfrm>
+            <a:off x="6338315" y="2638044"/>
+            <a:ext cx="4270247" cy="3591306"/>
+          </a:xfrm>
+        </p:spPr>
         <p:txBody>
           <a:bodyPr>
-            <a:normAutofit/>
+            <a:normAutofit fontScale="92500" lnSpcReduction="20000"/>
           </a:bodyPr>
           <a:lstStyle/>
           <a:p>
@@ -6468,6 +7978,20 @@
             <a:r>
               <a:rPr lang="en-US" dirty="0"/>
               <a:t>The optional ‘cancelled’ Boolean and the relevant ‘refund_amount’ is only used in case the booking is cancelled.</a:t>
+            </a:r>
+          </a:p>
+          <a:p>
+            <a:r>
+              <a:rPr lang="en-US" dirty="0"/>
+              <a:t>The test cases displays that the relationships work </a:t>
+            </a:r>
+            <a:r>
+              <a:rPr lang="en-US" altLang="ja-JP" dirty="0"/>
+              <a:t>as intended,</a:t>
+            </a:r>
+            <a:r>
+              <a:rPr lang="en-US" dirty="0"/>
+              <a:t> and the related data is properly drawn into one coherent data entry.</a:t>
             </a:r>
           </a:p>
           <a:p>
@@ -6490,7 +8014,7 @@
           <p:nvPr/>
         </p:nvPicPr>
         <p:blipFill>
-          <a:blip r:embed="rId3">
+          <a:blip r:embed="rId2">
             <a:extLst>
               <a:ext uri="{28A0092B-C50C-407E-A947-70E740481C1C}">
                 <a14:useLocalDpi xmlns:a14="http://schemas.microsoft.com/office/drawing/2010/main" val="0"/>
@@ -6505,6 +8029,113 @@
           <a:xfrm>
             <a:off x="11633200" y="6299200"/>
             <a:ext cx="457200" cy="457200"/>
+          </a:xfrm>
+          <a:prstGeom prst="rect">
+            <a:avLst/>
+          </a:prstGeom>
+        </p:spPr>
+      </p:pic>
+      <p:pic>
+        <p:nvPicPr>
+          <p:cNvPr id="9" name="Inhaltsplatzhalter 8" descr="Ein Bild, das Text, Screenshot, Software, Multimedia-Software enthält.&#10;&#10;Automatisch generierte Beschreibung">
+            <a:extLst>
+              <a:ext uri="{FF2B5EF4-FFF2-40B4-BE49-F238E27FC236}">
+                <a16:creationId xmlns:a16="http://schemas.microsoft.com/office/drawing/2014/main" id="{8794FD95-C70C-7222-92FB-82913905A613}"/>
+              </a:ext>
+            </a:extLst>
+          </p:cNvPr>
+          <p:cNvPicPr>
+            <a:picLocks noGrp="1" noChangeAspect="1"/>
+          </p:cNvPicPr>
+          <p:nvPr>
+            <p:ph sz="half" idx="1"/>
+          </p:nvPr>
+        </p:nvPicPr>
+        <p:blipFill>
+          <a:blip r:embed="rId3">
+            <a:extLst>
+              <a:ext uri="{28A0092B-C50C-407E-A947-70E740481C1C}">
+                <a14:useLocalDpi xmlns:a14="http://schemas.microsoft.com/office/drawing/2010/main" val="0"/>
+              </a:ext>
+            </a:extLst>
+          </a:blip>
+          <a:stretch>
+            <a:fillRect/>
+          </a:stretch>
+        </p:blipFill>
+        <p:spPr>
+          <a:xfrm>
+            <a:off x="252283" y="2638044"/>
+            <a:ext cx="4913314" cy="2502093"/>
+          </a:xfrm>
+        </p:spPr>
+      </p:pic>
+      <p:pic>
+        <p:nvPicPr>
+          <p:cNvPr id="11" name="Grafik 10" descr="Ein Bild, das Text, Screenshot, Zahl, Schrift enthält.&#10;&#10;Automatisch generierte Beschreibung">
+            <a:extLst>
+              <a:ext uri="{FF2B5EF4-FFF2-40B4-BE49-F238E27FC236}">
+                <a16:creationId xmlns:a16="http://schemas.microsoft.com/office/drawing/2014/main" id="{3B081226-A85F-3664-9DAE-D7D4CECF121C}"/>
+              </a:ext>
+            </a:extLst>
+          </p:cNvPr>
+          <p:cNvPicPr>
+            <a:picLocks noChangeAspect="1"/>
+          </p:cNvPicPr>
+          <p:nvPr/>
+        </p:nvPicPr>
+        <p:blipFill>
+          <a:blip r:embed="rId4">
+            <a:extLst>
+              <a:ext uri="{28A0092B-C50C-407E-A947-70E740481C1C}">
+                <a14:useLocalDpi xmlns:a14="http://schemas.microsoft.com/office/drawing/2010/main" val="0"/>
+              </a:ext>
+            </a:extLst>
+          </a:blip>
+          <a:stretch>
+            <a:fillRect/>
+          </a:stretch>
+        </p:blipFill>
+        <p:spPr>
+          <a:xfrm>
+            <a:off x="4829462" y="2888488"/>
+            <a:ext cx="1508853" cy="3747262"/>
+          </a:xfrm>
+          <a:prstGeom prst="rect">
+            <a:avLst/>
+          </a:prstGeom>
+        </p:spPr>
+      </p:pic>
+      <p:pic>
+        <p:nvPicPr>
+          <p:cNvPr id="17" name="Grafik 16">
+            <a:extLst>
+              <a:ext uri="{FF2B5EF4-FFF2-40B4-BE49-F238E27FC236}">
+                <a16:creationId xmlns:a16="http://schemas.microsoft.com/office/drawing/2014/main" id="{AD215FA4-EDF6-4C25-B5CA-BDB4CA6E30DC}"/>
+              </a:ext>
+            </a:extLst>
+          </p:cNvPr>
+          <p:cNvPicPr>
+            <a:picLocks noChangeAspect="1"/>
+          </p:cNvPicPr>
+          <p:nvPr/>
+        </p:nvPicPr>
+        <p:blipFill>
+          <a:blip r:embed="rId5">
+            <a:extLst>
+              <a:ext uri="{28A0092B-C50C-407E-A947-70E740481C1C}">
+                <a14:useLocalDpi xmlns:a14="http://schemas.microsoft.com/office/drawing/2010/main" val="0"/>
+              </a:ext>
+            </a:extLst>
+          </a:blip>
+          <a:stretch>
+            <a:fillRect/>
+          </a:stretch>
+        </p:blipFill>
+        <p:spPr>
+          <a:xfrm>
+            <a:off x="252283" y="5296733"/>
+            <a:ext cx="4516567" cy="596575"/>
           </a:xfrm>
           <a:prstGeom prst="rect">
             <a:avLst/>
@@ -6569,41 +8200,6 @@
           </a:p>
         </p:txBody>
       </p:sp>
-      <p:pic>
-        <p:nvPicPr>
-          <p:cNvPr id="6" name="Inhaltsplatzhalter 5" descr="Ein Bild, das Text, Screenshot, Schrift, Quittung enthält.&#10;&#10;Automatisch generierte Beschreibung">
-            <a:extLst>
-              <a:ext uri="{FF2B5EF4-FFF2-40B4-BE49-F238E27FC236}">
-                <a16:creationId xmlns:a16="http://schemas.microsoft.com/office/drawing/2014/main" id="{D5450C34-AA6D-5705-702C-BD1926056D9D}"/>
-              </a:ext>
-            </a:extLst>
-          </p:cNvPr>
-          <p:cNvPicPr>
-            <a:picLocks noGrp="1" noChangeAspect="1"/>
-          </p:cNvPicPr>
-          <p:nvPr>
-            <p:ph sz="half" idx="1"/>
-          </p:nvPr>
-        </p:nvPicPr>
-        <p:blipFill>
-          <a:blip r:embed="rId2">
-            <a:extLst>
-              <a:ext uri="{28A0092B-C50C-407E-A947-70E740481C1C}">
-                <a14:useLocalDpi xmlns:a14="http://schemas.microsoft.com/office/drawing/2010/main" val="0"/>
-              </a:ext>
-            </a:extLst>
-          </a:blip>
-          <a:stretch>
-            <a:fillRect/>
-          </a:stretch>
-        </p:blipFill>
-        <p:spPr>
-          <a:xfrm>
-            <a:off x="2855119" y="3327400"/>
-            <a:ext cx="1724025" cy="1724025"/>
-          </a:xfrm>
-        </p:spPr>
-      </p:pic>
       <p:sp>
         <p:nvSpPr>
           <p:cNvPr id="4" name="Inhaltsplatzhalter 3">
@@ -6620,9 +8216,16 @@
             <p:ph sz="half" idx="2"/>
           </p:nvPr>
         </p:nvSpPr>
-        <p:spPr/>
-        <p:txBody>
-          <a:bodyPr/>
+        <p:spPr>
+          <a:xfrm>
+            <a:off x="6338315" y="2638044"/>
+            <a:ext cx="4270247" cy="3255264"/>
+          </a:xfrm>
+        </p:spPr>
+        <p:txBody>
+          <a:bodyPr>
+            <a:normAutofit lnSpcReduction="10000"/>
+          </a:bodyPr>
           <a:lstStyle/>
           <a:p>
             <a:r>
@@ -6640,6 +8243,12 @@
             <a:r>
               <a:rPr lang="en-US" dirty="0"/>
               <a:t>The rest of the information given in this table is example data relevant to Banks.</a:t>
+            </a:r>
+          </a:p>
+          <a:p>
+            <a:r>
+              <a:rPr lang="en-US" dirty="0"/>
+              <a:t>This tables relationships are tested via other test cases, the content itself is tested once again via a select all query at the end of the test.sql file.</a:t>
             </a:r>
           </a:p>
         </p:txBody>
@@ -6659,7 +8268,7 @@
           <p:nvPr/>
         </p:nvPicPr>
         <p:blipFill>
-          <a:blip r:embed="rId3">
+          <a:blip r:embed="rId2">
             <a:extLst>
               <a:ext uri="{28A0092B-C50C-407E-A947-70E740481C1C}">
                 <a14:useLocalDpi xmlns:a14="http://schemas.microsoft.com/office/drawing/2010/main" val="0"/>
@@ -6680,6 +8289,135 @@
           </a:prstGeom>
         </p:spPr>
       </p:pic>
+      <p:pic>
+        <p:nvPicPr>
+          <p:cNvPr id="11" name="Inhaltsplatzhalter 10" descr="Ein Bild, das Text, Screenshot, Schrift, Quittung enthält.&#10;&#10;Automatisch generierte Beschreibung">
+            <a:extLst>
+              <a:ext uri="{FF2B5EF4-FFF2-40B4-BE49-F238E27FC236}">
+                <a16:creationId xmlns:a16="http://schemas.microsoft.com/office/drawing/2014/main" id="{FE029004-F558-0A50-CD7F-93D155A12DED}"/>
+              </a:ext>
+            </a:extLst>
+          </p:cNvPr>
+          <p:cNvPicPr>
+            <a:picLocks noGrp="1" noChangeAspect="1"/>
+          </p:cNvPicPr>
+          <p:nvPr>
+            <p:ph sz="half" idx="1"/>
+          </p:nvPr>
+        </p:nvPicPr>
+        <p:blipFill>
+          <a:blip r:embed="rId3">
+            <a:extLst>
+              <a:ext uri="{28A0092B-C50C-407E-A947-70E740481C1C}">
+                <a14:useLocalDpi xmlns:a14="http://schemas.microsoft.com/office/drawing/2010/main" val="0"/>
+              </a:ext>
+            </a:extLst>
+          </a:blip>
+          <a:stretch>
+            <a:fillRect/>
+          </a:stretch>
+        </p:blipFill>
+        <p:spPr>
+          <a:xfrm>
+            <a:off x="2850356" y="3327400"/>
+            <a:ext cx="1733550" cy="1724025"/>
+          </a:xfrm>
+        </p:spPr>
+      </p:pic>
+      <p:sp>
+        <p:nvSpPr>
+          <p:cNvPr id="8" name="Rechteck 7">
+            <a:extLst>
+              <a:ext uri="{FF2B5EF4-FFF2-40B4-BE49-F238E27FC236}">
+                <a16:creationId xmlns:a16="http://schemas.microsoft.com/office/drawing/2014/main" id="{8DB64BE8-7BAA-F9E0-1525-82AE416905E5}"/>
+              </a:ext>
+            </a:extLst>
+          </p:cNvPr>
+          <p:cNvSpPr/>
+          <p:nvPr/>
+        </p:nvSpPr>
+        <p:spPr>
+          <a:xfrm>
+            <a:off x="2428081" y="5283133"/>
+            <a:ext cx="2578100" cy="610175"/>
+          </a:xfrm>
+          <a:prstGeom prst="rect">
+            <a:avLst/>
+          </a:prstGeom>
+          <a:solidFill>
+            <a:schemeClr val="bg1"/>
+          </a:solidFill>
+          <a:ln w="19050">
+            <a:solidFill>
+              <a:srgbClr val="404040"/>
+            </a:solidFill>
+          </a:ln>
+        </p:spPr>
+        <p:style>
+          <a:lnRef idx="2">
+            <a:schemeClr val="accent1">
+              <a:shade val="15000"/>
+            </a:schemeClr>
+          </a:lnRef>
+          <a:fillRef idx="1">
+            <a:schemeClr val="accent1"/>
+          </a:fillRef>
+          <a:effectRef idx="0">
+            <a:schemeClr val="accent1"/>
+          </a:effectRef>
+          <a:fontRef idx="minor">
+            <a:schemeClr val="lt1"/>
+          </a:fontRef>
+        </p:style>
+        <p:txBody>
+          <a:bodyPr rtlCol="0" anchor="ctr"/>
+          <a:lstStyle/>
+          <a:p>
+            <a:pPr algn="ctr"/>
+            <a:endParaRPr lang="en-US">
+              <a:solidFill>
+                <a:sysClr val="windowText" lastClr="000000"/>
+              </a:solidFill>
+            </a:endParaRPr>
+          </a:p>
+        </p:txBody>
+      </p:sp>
+      <p:sp>
+        <p:nvSpPr>
+          <p:cNvPr id="9" name="Textfeld 8">
+            <a:extLst>
+              <a:ext uri="{FF2B5EF4-FFF2-40B4-BE49-F238E27FC236}">
+                <a16:creationId xmlns:a16="http://schemas.microsoft.com/office/drawing/2014/main" id="{C505DE39-8E4A-91AF-96FD-6B2AC6D1D9A1}"/>
+              </a:ext>
+            </a:extLst>
+          </p:cNvPr>
+          <p:cNvSpPr txBox="1"/>
+          <p:nvPr/>
+        </p:nvSpPr>
+        <p:spPr>
+          <a:xfrm>
+            <a:off x="2428081" y="5308533"/>
+            <a:ext cx="2578100" cy="584775"/>
+          </a:xfrm>
+          <a:prstGeom prst="rect">
+            <a:avLst/>
+          </a:prstGeom>
+          <a:noFill/>
+        </p:spPr>
+        <p:txBody>
+          <a:bodyPr wrap="square" rtlCol="0">
+            <a:spAutoFit/>
+          </a:bodyPr>
+          <a:lstStyle/>
+          <a:p>
+            <a:pPr algn="ctr"/>
+            <a:r>
+              <a:rPr lang="en-US" sz="1600" dirty="0"/>
+              <a:t>Tested via multiple other test cases</a:t>
+            </a:r>
+          </a:p>
+        </p:txBody>
+      </p:sp>
     </p:spTree>
     <p:extLst>
       <p:ext uri="{BB962C8B-B14F-4D97-AF65-F5344CB8AC3E}">
@@ -6738,41 +8476,6 @@
           </a:p>
         </p:txBody>
       </p:sp>
-      <p:pic>
-        <p:nvPicPr>
-          <p:cNvPr id="6" name="Inhaltsplatzhalter 5" descr="Ein Bild, das Text, Screenshot, Schrift, Quittung enthält.&#10;&#10;Automatisch generierte Beschreibung">
-            <a:extLst>
-              <a:ext uri="{FF2B5EF4-FFF2-40B4-BE49-F238E27FC236}">
-                <a16:creationId xmlns:a16="http://schemas.microsoft.com/office/drawing/2014/main" id="{BDB9D102-DA20-7749-B41C-5CB8A304FC0C}"/>
-              </a:ext>
-            </a:extLst>
-          </p:cNvPr>
-          <p:cNvPicPr>
-            <a:picLocks noGrp="1" noChangeAspect="1"/>
-          </p:cNvPicPr>
-          <p:nvPr>
-            <p:ph sz="half" idx="1"/>
-          </p:nvPr>
-        </p:nvPicPr>
-        <p:blipFill>
-          <a:blip r:embed="rId2">
-            <a:extLst>
-              <a:ext uri="{28A0092B-C50C-407E-A947-70E740481C1C}">
-                <a14:useLocalDpi xmlns:a14="http://schemas.microsoft.com/office/drawing/2010/main" val="0"/>
-              </a:ext>
-            </a:extLst>
-          </a:blip>
-          <a:stretch>
-            <a:fillRect/>
-          </a:stretch>
-        </p:blipFill>
-        <p:spPr>
-          <a:xfrm>
-            <a:off x="2807494" y="3184525"/>
-            <a:ext cx="1819275" cy="2009775"/>
-          </a:xfrm>
-        </p:spPr>
-      </p:pic>
       <p:sp>
         <p:nvSpPr>
           <p:cNvPr id="4" name="Inhaltsplatzhalter 3">
@@ -6791,7 +8494,9 @@
         </p:nvSpPr>
         <p:spPr/>
         <p:txBody>
-          <a:bodyPr/>
+          <a:bodyPr>
+            <a:normAutofit fontScale="92500" lnSpcReduction="10000"/>
+          </a:bodyPr>
           <a:lstStyle/>
           <a:p>
             <a:r>
@@ -6812,7 +8517,10 @@
             </a:r>
           </a:p>
           <a:p>
-            <a:endParaRPr lang="en-US" dirty="0"/>
+            <a:r>
+              <a:rPr lang="en-US" dirty="0"/>
+              <a:t>Counterpart to the previous table, both are also tested in the test cases of the ‘Transaction’ table in the following slide.</a:t>
+            </a:r>
           </a:p>
         </p:txBody>
       </p:sp>
@@ -6831,7 +8539,7 @@
           <p:nvPr/>
         </p:nvPicPr>
         <p:blipFill>
-          <a:blip r:embed="rId3">
+          <a:blip r:embed="rId2">
             <a:extLst>
               <a:ext uri="{28A0092B-C50C-407E-A947-70E740481C1C}">
                 <a14:useLocalDpi xmlns:a14="http://schemas.microsoft.com/office/drawing/2010/main" val="0"/>
@@ -6852,6 +8560,135 @@
           </a:prstGeom>
         </p:spPr>
       </p:pic>
+      <p:pic>
+        <p:nvPicPr>
+          <p:cNvPr id="11" name="Inhaltsplatzhalter 10" descr="Ein Bild, das Text, Screenshot, Schrift enthält.&#10;&#10;Automatisch generierte Beschreibung">
+            <a:extLst>
+              <a:ext uri="{FF2B5EF4-FFF2-40B4-BE49-F238E27FC236}">
+                <a16:creationId xmlns:a16="http://schemas.microsoft.com/office/drawing/2014/main" id="{AF742EBA-825C-288D-A75E-46B4CB441F24}"/>
+              </a:ext>
+            </a:extLst>
+          </p:cNvPr>
+          <p:cNvPicPr>
+            <a:picLocks noGrp="1" noChangeAspect="1"/>
+          </p:cNvPicPr>
+          <p:nvPr>
+            <p:ph sz="half" idx="1"/>
+          </p:nvPr>
+        </p:nvPicPr>
+        <p:blipFill>
+          <a:blip r:embed="rId3">
+            <a:extLst>
+              <a:ext uri="{28A0092B-C50C-407E-A947-70E740481C1C}">
+                <a14:useLocalDpi xmlns:a14="http://schemas.microsoft.com/office/drawing/2010/main" val="0"/>
+              </a:ext>
+            </a:extLst>
+          </a:blip>
+          <a:stretch>
+            <a:fillRect/>
+          </a:stretch>
+        </p:blipFill>
+        <p:spPr>
+          <a:xfrm>
+            <a:off x="2802731" y="3184525"/>
+            <a:ext cx="1828800" cy="2009775"/>
+          </a:xfrm>
+        </p:spPr>
+      </p:pic>
+      <p:sp>
+        <p:nvSpPr>
+          <p:cNvPr id="8" name="Rechteck 7">
+            <a:extLst>
+              <a:ext uri="{FF2B5EF4-FFF2-40B4-BE49-F238E27FC236}">
+                <a16:creationId xmlns:a16="http://schemas.microsoft.com/office/drawing/2014/main" id="{F35F7718-A496-20FA-0A38-60FA43721F2C}"/>
+              </a:ext>
+            </a:extLst>
+          </p:cNvPr>
+          <p:cNvSpPr/>
+          <p:nvPr/>
+        </p:nvSpPr>
+        <p:spPr>
+          <a:xfrm>
+            <a:off x="2428081" y="5283133"/>
+            <a:ext cx="2578100" cy="610175"/>
+          </a:xfrm>
+          <a:prstGeom prst="rect">
+            <a:avLst/>
+          </a:prstGeom>
+          <a:solidFill>
+            <a:schemeClr val="bg1"/>
+          </a:solidFill>
+          <a:ln w="19050">
+            <a:solidFill>
+              <a:srgbClr val="404040"/>
+            </a:solidFill>
+          </a:ln>
+        </p:spPr>
+        <p:style>
+          <a:lnRef idx="2">
+            <a:schemeClr val="accent1">
+              <a:shade val="15000"/>
+            </a:schemeClr>
+          </a:lnRef>
+          <a:fillRef idx="1">
+            <a:schemeClr val="accent1"/>
+          </a:fillRef>
+          <a:effectRef idx="0">
+            <a:schemeClr val="accent1"/>
+          </a:effectRef>
+          <a:fontRef idx="minor">
+            <a:schemeClr val="lt1"/>
+          </a:fontRef>
+        </p:style>
+        <p:txBody>
+          <a:bodyPr rtlCol="0" anchor="ctr"/>
+          <a:lstStyle/>
+          <a:p>
+            <a:pPr algn="ctr"/>
+            <a:endParaRPr lang="en-US">
+              <a:solidFill>
+                <a:sysClr val="windowText" lastClr="000000"/>
+              </a:solidFill>
+            </a:endParaRPr>
+          </a:p>
+        </p:txBody>
+      </p:sp>
+      <p:sp>
+        <p:nvSpPr>
+          <p:cNvPr id="9" name="Textfeld 8">
+            <a:extLst>
+              <a:ext uri="{FF2B5EF4-FFF2-40B4-BE49-F238E27FC236}">
+                <a16:creationId xmlns:a16="http://schemas.microsoft.com/office/drawing/2014/main" id="{B0AABF4F-B152-9315-3369-7A900E249239}"/>
+              </a:ext>
+            </a:extLst>
+          </p:cNvPr>
+          <p:cNvSpPr txBox="1"/>
+          <p:nvPr/>
+        </p:nvSpPr>
+        <p:spPr>
+          <a:xfrm>
+            <a:off x="2428081" y="5308533"/>
+            <a:ext cx="2578100" cy="584775"/>
+          </a:xfrm>
+          <a:prstGeom prst="rect">
+            <a:avLst/>
+          </a:prstGeom>
+          <a:noFill/>
+        </p:spPr>
+        <p:txBody>
+          <a:bodyPr wrap="square" rtlCol="0">
+            <a:spAutoFit/>
+          </a:bodyPr>
+          <a:lstStyle/>
+          <a:p>
+            <a:pPr algn="ctr"/>
+            <a:r>
+              <a:rPr lang="en-US" sz="1600" dirty="0"/>
+              <a:t>Tested via multiple other test cases</a:t>
+            </a:r>
+          </a:p>
+        </p:txBody>
+      </p:sp>
     </p:spTree>
     <p:extLst>
       <p:ext uri="{BB962C8B-B14F-4D97-AF65-F5344CB8AC3E}">
@@ -6942,43 +8779,14 @@
               <a:t>The table references ‘BankInformation’ and ‘CreditCardInformation’, as well as the booking it was made for.</a:t>
             </a:r>
           </a:p>
-        </p:txBody>
-      </p:sp>
-      <p:pic>
-        <p:nvPicPr>
-          <p:cNvPr id="10" name="Inhaltsplatzhalter 9" descr="Ein Bild, das Text, Screenshot, Quittung, Schrift enthält.&#10;&#10;Automatisch generierte Beschreibung">
-            <a:extLst>
-              <a:ext uri="{FF2B5EF4-FFF2-40B4-BE49-F238E27FC236}">
-                <a16:creationId xmlns:a16="http://schemas.microsoft.com/office/drawing/2014/main" id="{40397811-DA83-2A75-0EC9-39A04C47ECD4}"/>
-              </a:ext>
-            </a:extLst>
-          </p:cNvPr>
-          <p:cNvPicPr>
-            <a:picLocks noGrp="1" noChangeAspect="1"/>
-          </p:cNvPicPr>
-          <p:nvPr>
-            <p:ph sz="half" idx="1"/>
-          </p:nvPr>
-        </p:nvPicPr>
-        <p:blipFill>
-          <a:blip r:embed="rId2">
-            <a:extLst>
-              <a:ext uri="{28A0092B-C50C-407E-A947-70E740481C1C}">
-                <a14:useLocalDpi xmlns:a14="http://schemas.microsoft.com/office/drawing/2010/main" val="0"/>
-              </a:ext>
-            </a:extLst>
-          </a:blip>
-          <a:stretch>
-            <a:fillRect/>
-          </a:stretch>
-        </p:blipFill>
-        <p:spPr>
-          <a:xfrm>
-            <a:off x="2855119" y="3179762"/>
-            <a:ext cx="1724025" cy="2019300"/>
-          </a:xfrm>
-        </p:spPr>
-      </p:pic>
+          <a:p>
+            <a:r>
+              <a:rPr lang="en-US" dirty="0"/>
+              <a:t>The test case can be used to check if the relationships of the transaction table and the respective payment information and ‘booking_id’ are plausible.</a:t>
+            </a:r>
+          </a:p>
+        </p:txBody>
+      </p:sp>
       <p:pic>
         <p:nvPicPr>
           <p:cNvPr id="11" name="Grafik 10">
@@ -6994,7 +8802,7 @@
           <p:nvPr/>
         </p:nvPicPr>
         <p:blipFill>
-          <a:blip r:embed="rId3">
+          <a:blip r:embed="rId2">
             <a:extLst>
               <a:ext uri="{28A0092B-C50C-407E-A947-70E740481C1C}">
                 <a14:useLocalDpi xmlns:a14="http://schemas.microsoft.com/office/drawing/2010/main" val="0"/>
@@ -7009,6 +8817,113 @@
           <a:xfrm>
             <a:off x="11633200" y="6299200"/>
             <a:ext cx="457200" cy="457200"/>
+          </a:xfrm>
+          <a:prstGeom prst="rect">
+            <a:avLst/>
+          </a:prstGeom>
+        </p:spPr>
+      </p:pic>
+      <p:pic>
+        <p:nvPicPr>
+          <p:cNvPr id="7" name="Inhaltsplatzhalter 6" descr="Ein Bild, das Text, Screenshot, Software, Schrift enthält.&#10;&#10;Automatisch generierte Beschreibung">
+            <a:extLst>
+              <a:ext uri="{FF2B5EF4-FFF2-40B4-BE49-F238E27FC236}">
+                <a16:creationId xmlns:a16="http://schemas.microsoft.com/office/drawing/2014/main" id="{9FA212C6-D246-5549-5A0C-82412419E58B}"/>
+              </a:ext>
+            </a:extLst>
+          </p:cNvPr>
+          <p:cNvPicPr>
+            <a:picLocks noGrp="1" noChangeAspect="1"/>
+          </p:cNvPicPr>
+          <p:nvPr>
+            <p:ph sz="half" idx="1"/>
+          </p:nvPr>
+        </p:nvPicPr>
+        <p:blipFill>
+          <a:blip r:embed="rId3">
+            <a:extLst>
+              <a:ext uri="{28A0092B-C50C-407E-A947-70E740481C1C}">
+                <a14:useLocalDpi xmlns:a14="http://schemas.microsoft.com/office/drawing/2010/main" val="0"/>
+              </a:ext>
+            </a:extLst>
+          </a:blip>
+          <a:stretch>
+            <a:fillRect/>
+          </a:stretch>
+        </p:blipFill>
+        <p:spPr>
+          <a:xfrm>
+            <a:off x="525016" y="2474309"/>
+            <a:ext cx="4832539" cy="2312914"/>
+          </a:xfrm>
+        </p:spPr>
+      </p:pic>
+      <p:pic>
+        <p:nvPicPr>
+          <p:cNvPr id="9" name="Grafik 8" descr="Ein Bild, das Text, Screenshot, Schrift, Zahl enthält.&#10;&#10;Automatisch generierte Beschreibung">
+            <a:extLst>
+              <a:ext uri="{FF2B5EF4-FFF2-40B4-BE49-F238E27FC236}">
+                <a16:creationId xmlns:a16="http://schemas.microsoft.com/office/drawing/2014/main" id="{E9090D60-EB46-58A5-4656-37BEFF7EC95C}"/>
+              </a:ext>
+            </a:extLst>
+          </p:cNvPr>
+          <p:cNvPicPr>
+            <a:picLocks noChangeAspect="1"/>
+          </p:cNvPicPr>
+          <p:nvPr/>
+        </p:nvPicPr>
+        <p:blipFill>
+          <a:blip r:embed="rId4">
+            <a:extLst>
+              <a:ext uri="{28A0092B-C50C-407E-A947-70E740481C1C}">
+                <a14:useLocalDpi xmlns:a14="http://schemas.microsoft.com/office/drawing/2010/main" val="0"/>
+              </a:ext>
+            </a:extLst>
+          </a:blip>
+          <a:stretch>
+            <a:fillRect/>
+          </a:stretch>
+        </p:blipFill>
+        <p:spPr>
+          <a:xfrm>
+            <a:off x="4776652" y="3155202"/>
+            <a:ext cx="1561662" cy="1810498"/>
+          </a:xfrm>
+          <a:prstGeom prst="rect">
+            <a:avLst/>
+          </a:prstGeom>
+        </p:spPr>
+      </p:pic>
+      <p:pic>
+        <p:nvPicPr>
+          <p:cNvPr id="13" name="Grafik 12">
+            <a:extLst>
+              <a:ext uri="{FF2B5EF4-FFF2-40B4-BE49-F238E27FC236}">
+                <a16:creationId xmlns:a16="http://schemas.microsoft.com/office/drawing/2014/main" id="{71C43FAA-4C2D-AA82-5B13-9DA1CA0465F7}"/>
+              </a:ext>
+            </a:extLst>
+          </p:cNvPr>
+          <p:cNvPicPr>
+            <a:picLocks noChangeAspect="1"/>
+          </p:cNvPicPr>
+          <p:nvPr/>
+        </p:nvPicPr>
+        <p:blipFill>
+          <a:blip r:embed="rId5">
+            <a:extLst>
+              <a:ext uri="{28A0092B-C50C-407E-A947-70E740481C1C}">
+                <a14:useLocalDpi xmlns:a14="http://schemas.microsoft.com/office/drawing/2010/main" val="0"/>
+              </a:ext>
+            </a:extLst>
+          </a:blip>
+          <a:stretch>
+            <a:fillRect/>
+          </a:stretch>
+        </p:blipFill>
+        <p:spPr>
+          <a:xfrm>
+            <a:off x="525016" y="5789013"/>
+            <a:ext cx="10083546" cy="601508"/>
           </a:xfrm>
           <a:prstGeom prst="rect">
             <a:avLst/>
@@ -7073,41 +8988,6 @@
           </a:p>
         </p:txBody>
       </p:sp>
-      <p:pic>
-        <p:nvPicPr>
-          <p:cNvPr id="6" name="Inhaltsplatzhalter 5" descr="Ein Bild, das Text, Screenshot, Schrift, Quittung enthält.&#10;&#10;Automatisch generierte Beschreibung">
-            <a:extLst>
-              <a:ext uri="{FF2B5EF4-FFF2-40B4-BE49-F238E27FC236}">
-                <a16:creationId xmlns:a16="http://schemas.microsoft.com/office/drawing/2014/main" id="{1E934BC1-25D8-C963-5CCA-632153D08528}"/>
-              </a:ext>
-            </a:extLst>
-          </p:cNvPr>
-          <p:cNvPicPr>
-            <a:picLocks noGrp="1" noChangeAspect="1"/>
-          </p:cNvPicPr>
-          <p:nvPr>
-            <p:ph sz="half" idx="1"/>
-          </p:nvPr>
-        </p:nvPicPr>
-        <p:blipFill>
-          <a:blip r:embed="rId2">
-            <a:extLst>
-              <a:ext uri="{28A0092B-C50C-407E-A947-70E740481C1C}">
-                <a14:useLocalDpi xmlns:a14="http://schemas.microsoft.com/office/drawing/2010/main" val="0"/>
-              </a:ext>
-            </a:extLst>
-          </a:blip>
-          <a:stretch>
-            <a:fillRect/>
-          </a:stretch>
-        </p:blipFill>
-        <p:spPr>
-          <a:xfrm>
-            <a:off x="2855119" y="3327400"/>
-            <a:ext cx="1724025" cy="1724025"/>
-          </a:xfrm>
-        </p:spPr>
-      </p:pic>
       <p:sp>
         <p:nvSpPr>
           <p:cNvPr id="4" name="Inhaltsplatzhalter 3">
@@ -7126,7 +9006,9 @@
         </p:nvSpPr>
         <p:spPr/>
         <p:txBody>
-          <a:bodyPr/>
+          <a:bodyPr>
+            <a:normAutofit fontScale="92500" lnSpcReduction="20000"/>
+          </a:bodyPr>
           <a:lstStyle/>
           <a:p>
             <a:r>
@@ -7144,6 +9026,12 @@
             <a:r>
               <a:rPr lang="en-US" dirty="0"/>
               <a:t>The ‘currency_id’ attribute can then be used to convert it, if necessary</a:t>
+            </a:r>
+          </a:p>
+          <a:p>
+            <a:r>
+              <a:rPr lang="en-US" dirty="0"/>
+              <a:t>The GiftCard table is a very simple, which is not as important as other tables to the functionality of the system and therefore does not warrant a complicated test case, content is checked again at the end of the test.sql file.</a:t>
             </a:r>
           </a:p>
         </p:txBody>
@@ -7163,7 +9051,7 @@
           <p:nvPr/>
         </p:nvPicPr>
         <p:blipFill>
-          <a:blip r:embed="rId3">
+          <a:blip r:embed="rId2">
             <a:extLst>
               <a:ext uri="{28A0092B-C50C-407E-A947-70E740481C1C}">
                 <a14:useLocalDpi xmlns:a14="http://schemas.microsoft.com/office/drawing/2010/main" val="0"/>
@@ -7184,6 +9072,143 @@
           </a:prstGeom>
         </p:spPr>
       </p:pic>
+      <p:pic>
+        <p:nvPicPr>
+          <p:cNvPr id="9" name="Inhaltsplatzhalter 8" descr="Ein Bild, das Text, Screenshot, Schrift, Quittung enthält.&#10;&#10;Automatisch generierte Beschreibung">
+            <a:extLst>
+              <a:ext uri="{FF2B5EF4-FFF2-40B4-BE49-F238E27FC236}">
+                <a16:creationId xmlns:a16="http://schemas.microsoft.com/office/drawing/2014/main" id="{4D619FDB-5D26-CCBF-C17D-8A07278B14B1}"/>
+              </a:ext>
+            </a:extLst>
+          </p:cNvPr>
+          <p:cNvPicPr>
+            <a:picLocks noGrp="1" noChangeAspect="1"/>
+          </p:cNvPicPr>
+          <p:nvPr>
+            <p:ph sz="half" idx="1"/>
+          </p:nvPr>
+        </p:nvPicPr>
+        <p:blipFill>
+          <a:blip r:embed="rId3">
+            <a:extLst>
+              <a:ext uri="{28A0092B-C50C-407E-A947-70E740481C1C}">
+                <a14:useLocalDpi xmlns:a14="http://schemas.microsoft.com/office/drawing/2010/main" val="0"/>
+              </a:ext>
+            </a:extLst>
+          </a:blip>
+          <a:stretch>
+            <a:fillRect/>
+          </a:stretch>
+        </p:blipFill>
+        <p:spPr>
+          <a:xfrm>
+            <a:off x="2850356" y="3327400"/>
+            <a:ext cx="1733550" cy="1724025"/>
+          </a:xfrm>
+        </p:spPr>
+      </p:pic>
+      <p:sp>
+        <p:nvSpPr>
+          <p:cNvPr id="10" name="Rechteck 9">
+            <a:extLst>
+              <a:ext uri="{FF2B5EF4-FFF2-40B4-BE49-F238E27FC236}">
+                <a16:creationId xmlns:a16="http://schemas.microsoft.com/office/drawing/2014/main" id="{C863E2DF-7FBF-1AD8-FFD4-870BE2F5F135}"/>
+              </a:ext>
+            </a:extLst>
+          </p:cNvPr>
+          <p:cNvSpPr/>
+          <p:nvPr/>
+        </p:nvSpPr>
+        <p:spPr>
+          <a:xfrm>
+            <a:off x="2485231" y="5390488"/>
+            <a:ext cx="2578100" cy="610175"/>
+          </a:xfrm>
+          <a:prstGeom prst="rect">
+            <a:avLst/>
+          </a:prstGeom>
+          <a:solidFill>
+            <a:schemeClr val="bg1"/>
+          </a:solidFill>
+          <a:ln w="19050">
+            <a:solidFill>
+              <a:srgbClr val="404040"/>
+            </a:solidFill>
+          </a:ln>
+        </p:spPr>
+        <p:style>
+          <a:lnRef idx="2">
+            <a:schemeClr val="accent1">
+              <a:shade val="15000"/>
+            </a:schemeClr>
+          </a:lnRef>
+          <a:fillRef idx="1">
+            <a:schemeClr val="accent1"/>
+          </a:fillRef>
+          <a:effectRef idx="0">
+            <a:schemeClr val="accent1"/>
+          </a:effectRef>
+          <a:fontRef idx="minor">
+            <a:schemeClr val="lt1"/>
+          </a:fontRef>
+        </p:style>
+        <p:txBody>
+          <a:bodyPr rtlCol="0" anchor="ctr"/>
+          <a:lstStyle/>
+          <a:p>
+            <a:pPr algn="ctr"/>
+            <a:endParaRPr lang="en-US">
+              <a:solidFill>
+                <a:sysClr val="windowText" lastClr="000000"/>
+              </a:solidFill>
+            </a:endParaRPr>
+          </a:p>
+        </p:txBody>
+      </p:sp>
+      <p:sp>
+        <p:nvSpPr>
+          <p:cNvPr id="11" name="Textfeld 10">
+            <a:extLst>
+              <a:ext uri="{FF2B5EF4-FFF2-40B4-BE49-F238E27FC236}">
+                <a16:creationId xmlns:a16="http://schemas.microsoft.com/office/drawing/2014/main" id="{90F34D5E-F526-2168-5F11-BE82A787854E}"/>
+              </a:ext>
+            </a:extLst>
+          </p:cNvPr>
+          <p:cNvSpPr txBox="1"/>
+          <p:nvPr/>
+        </p:nvSpPr>
+        <p:spPr>
+          <a:xfrm>
+            <a:off x="2485231" y="5415888"/>
+            <a:ext cx="2578100" cy="584775"/>
+          </a:xfrm>
+          <a:prstGeom prst="rect">
+            <a:avLst/>
+          </a:prstGeom>
+          <a:noFill/>
+        </p:spPr>
+        <p:txBody>
+          <a:bodyPr wrap="square" rtlCol="0">
+            <a:spAutoFit/>
+          </a:bodyPr>
+          <a:lstStyle/>
+          <a:p>
+            <a:pPr algn="ctr"/>
+            <a:r>
+              <a:rPr lang="en-US" sz="1600" dirty="0"/>
+              <a:t>‘</a:t>
+            </a:r>
+            <a:r>
+              <a:rPr lang="en-US" altLang="ja-JP" sz="1600" dirty="0"/>
+              <a:t>GiftCard</a:t>
+            </a:r>
+            <a:r>
+              <a:rPr lang="en-US" sz="1600" dirty="0"/>
+              <a:t>’ is a simple table, see test case in test.sql</a:t>
+            </a:r>
+          </a:p>
+        </p:txBody>
+      </p:sp>
     </p:spTree>
     <p:extLst>
       <p:ext uri="{BB962C8B-B14F-4D97-AF65-F5344CB8AC3E}">
@@ -7286,13 +9311,10 @@
             <a:pPr marL="0" indent="0">
               <a:buNone/>
             </a:pPr>
-            <a:endParaRPr lang="en-US" dirty="0"/>
-          </a:p>
-          <a:p>
-            <a:pPr marL="0" indent="0">
-              <a:buNone/>
-            </a:pPr>
-            <a:endParaRPr lang="en-US" dirty="0"/>
+            <a:r>
+              <a:rPr lang="en-US" dirty="0"/>
+              <a:t>- I encourage the reader to run the test commands in their own environment for better readability.</a:t>
+            </a:r>
           </a:p>
           <a:p>
             <a:pPr marL="0" indent="0">
@@ -7427,9 +9449,10 @@
           <a:bodyPr/>
           <a:lstStyle/>
           <a:p>
-            <a:r>
-              <a:rPr lang="en-US" dirty="0"/>
-              <a:t>Additional information is given is the Pebble Pad submission as well as in code via comments.</a:t>
+            <a:pPr algn="ctr"/>
+            <a:r>
+              <a:rPr lang="en-US" dirty="0"/>
+              <a:t>Additional information is given in the Pebble Pad submission as well as in code via comments.</a:t>
             </a:r>
           </a:p>
         </p:txBody>
@@ -7820,7 +9843,7 @@
         <p:spPr/>
         <p:txBody>
           <a:bodyPr>
-            <a:normAutofit fontScale="92500" lnSpcReduction="10000"/>
+            <a:normAutofit fontScale="92500" lnSpcReduction="20000"/>
           </a:bodyPr>
           <a:lstStyle/>
           <a:p>
@@ -7845,15 +9868,7 @@
             <a:pPr lvl="1"/>
             <a:r>
               <a:rPr lang="en-US" dirty="0"/>
-              <a:t>Addresses now have an ‘</a:t>
-            </a:r>
-            <a:r>
-              <a:rPr lang="en-US" dirty="0" err="1"/>
-              <a:t>address_type</a:t>
-            </a:r>
-            <a:r>
-              <a:rPr lang="en-US" dirty="0"/>
-              <a:t>’ attribute</a:t>
+              <a:t>Addresses now have an ‘address_type’ attribute</a:t>
             </a:r>
           </a:p>
           <a:p>
@@ -7867,15 +9882,14 @@
             <a:pPr lvl="1"/>
             <a:r>
               <a:rPr lang="en-US" dirty="0"/>
-              <a:t>Bookings no longer have the ‘</a:t>
-            </a:r>
-            <a:r>
-              <a:rPr lang="en-US" dirty="0" err="1"/>
-              <a:t>transaction_id</a:t>
-            </a:r>
-            <a:r>
-              <a:rPr lang="en-US" dirty="0"/>
-              <a:t>’ attribute</a:t>
+              <a:t>Bookings no longer have the ‘transaction_id’ attribute</a:t>
+            </a:r>
+          </a:p>
+          <a:p>
+            <a:pPr lvl="1"/>
+            <a:r>
+              <a:rPr lang="en-US" dirty="0"/>
+              <a:t>PropertyListing now has the ‘owning_host_id’ attribute</a:t>
             </a:r>
           </a:p>
           <a:p>
@@ -8045,10 +10059,10 @@
       </p:sp>
       <p:pic>
         <p:nvPicPr>
-          <p:cNvPr id="25" name="Grafik 24" descr="Ein Bild, das Text, Diagramm, Plan, parallel enthält.&#10;&#10;Automatisch generierte Beschreibung">
-            <a:extLst>
-              <a:ext uri="{FF2B5EF4-FFF2-40B4-BE49-F238E27FC236}">
-                <a16:creationId xmlns:a16="http://schemas.microsoft.com/office/drawing/2014/main" id="{B6E0BD8B-3E36-7DC5-1CDA-97EA0A93C35F}"/>
+          <p:cNvPr id="5" name="Grafik 4" descr="Ein Bild, das Text, Diagramm, Plan, parallel enthält.&#10;&#10;Automatisch generierte Beschreibung">
+            <a:extLst>
+              <a:ext uri="{FF2B5EF4-FFF2-40B4-BE49-F238E27FC236}">
+                <a16:creationId xmlns:a16="http://schemas.microsoft.com/office/drawing/2014/main" id="{57A29CD3-E67D-9748-063C-AD5D49AE4BFF}"/>
               </a:ext>
             </a:extLst>
           </p:cNvPr>
@@ -8071,7 +10085,7 @@
         </p:blipFill>
         <p:spPr>
           <a:xfrm>
-            <a:off x="5537200" y="711200"/>
+            <a:off x="6096000" y="0"/>
             <a:ext cx="6096000" cy="6858000"/>
           </a:xfrm>
           <a:prstGeom prst="rect">
@@ -8191,12 +10205,14 @@
         </p:nvSpPr>
         <p:spPr/>
         <p:txBody>
-          <a:bodyPr/>
-          <a:lstStyle/>
-          <a:p>
-            <a:r>
-              <a:rPr lang="en-US" dirty="0"/>
-              <a:t>The User is the base class for all users and holds attributes any user will have</a:t>
+          <a:bodyPr>
+            <a:normAutofit lnSpcReduction="10000"/>
+          </a:bodyPr>
+          <a:lstStyle/>
+          <a:p>
+            <a:r>
+              <a:rPr lang="en-US" dirty="0"/>
+              <a:t>The User is the base/super class for all users and holds attributes any user will have</a:t>
             </a:r>
           </a:p>
           <a:p>
@@ -8211,43 +10227,14 @@
               <a:t>The ‘governmentid_image_id’ is a foreign key that references the image table.</a:t>
             </a:r>
           </a:p>
-        </p:txBody>
-      </p:sp>
-      <p:pic>
-        <p:nvPicPr>
-          <p:cNvPr id="10" name="Inhaltsplatzhalter 9" descr="Ein Bild, das Text, Quittung, Screenshot, Schrift enthält.&#10;&#10;Automatisch generierte Beschreibung">
-            <a:extLst>
-              <a:ext uri="{FF2B5EF4-FFF2-40B4-BE49-F238E27FC236}">
-                <a16:creationId xmlns:a16="http://schemas.microsoft.com/office/drawing/2014/main" id="{2432A590-5738-51DE-7218-94BD08D6190A}"/>
-              </a:ext>
-            </a:extLst>
-          </p:cNvPr>
-          <p:cNvPicPr>
-            <a:picLocks noGrp="1" noChangeAspect="1"/>
-          </p:cNvPicPr>
-          <p:nvPr>
-            <p:ph sz="half" idx="1"/>
-          </p:nvPr>
-        </p:nvPicPr>
-        <p:blipFill>
-          <a:blip r:embed="rId2">
-            <a:extLst>
-              <a:ext uri="{28A0092B-C50C-407E-A947-70E740481C1C}">
-                <a14:useLocalDpi xmlns:a14="http://schemas.microsoft.com/office/drawing/2010/main" val="0"/>
-              </a:ext>
-            </a:extLst>
-          </a:blip>
-          <a:stretch>
-            <a:fillRect/>
-          </a:stretch>
-        </p:blipFill>
-        <p:spPr>
-          <a:xfrm>
-            <a:off x="2855119" y="3327400"/>
-            <a:ext cx="1724025" cy="1724025"/>
-          </a:xfrm>
-        </p:spPr>
-      </p:pic>
+          <a:p>
+            <a:r>
+              <a:rPr lang="en-US" dirty="0"/>
+              <a:t>This table is tested via the host and guest tables which can be seen in the following two slides</a:t>
+            </a:r>
+          </a:p>
+        </p:txBody>
+      </p:sp>
       <p:pic>
         <p:nvPicPr>
           <p:cNvPr id="11" name="Grafik 10">
@@ -8263,7 +10250,7 @@
           <p:nvPr/>
         </p:nvPicPr>
         <p:blipFill>
-          <a:blip r:embed="rId3">
+          <a:blip r:embed="rId2">
             <a:extLst>
               <a:ext uri="{28A0092B-C50C-407E-A947-70E740481C1C}">
                 <a14:useLocalDpi xmlns:a14="http://schemas.microsoft.com/office/drawing/2010/main" val="0"/>
@@ -8284,6 +10271,135 @@
           </a:prstGeom>
         </p:spPr>
       </p:pic>
+      <p:pic>
+        <p:nvPicPr>
+          <p:cNvPr id="7" name="Inhaltsplatzhalter 6" descr="Ein Bild, das Text, Screenshot, Quittung, Schrift enthält.&#10;&#10;Automatisch generierte Beschreibung">
+            <a:extLst>
+              <a:ext uri="{FF2B5EF4-FFF2-40B4-BE49-F238E27FC236}">
+                <a16:creationId xmlns:a16="http://schemas.microsoft.com/office/drawing/2014/main" id="{C1DF98B6-FB2E-5676-FF93-A8588944E7B4}"/>
+              </a:ext>
+            </a:extLst>
+          </p:cNvPr>
+          <p:cNvPicPr>
+            <a:picLocks noGrp="1" noChangeAspect="1"/>
+          </p:cNvPicPr>
+          <p:nvPr>
+            <p:ph sz="half" idx="1"/>
+          </p:nvPr>
+        </p:nvPicPr>
+        <p:blipFill>
+          <a:blip r:embed="rId3">
+            <a:extLst>
+              <a:ext uri="{28A0092B-C50C-407E-A947-70E740481C1C}">
+                <a14:useLocalDpi xmlns:a14="http://schemas.microsoft.com/office/drawing/2010/main" val="0"/>
+              </a:ext>
+            </a:extLst>
+          </a:blip>
+          <a:stretch>
+            <a:fillRect/>
+          </a:stretch>
+        </p:blipFill>
+        <p:spPr>
+          <a:xfrm>
+            <a:off x="2850356" y="3327400"/>
+            <a:ext cx="1733550" cy="1724025"/>
+          </a:xfrm>
+        </p:spPr>
+      </p:pic>
+      <p:sp>
+        <p:nvSpPr>
+          <p:cNvPr id="8" name="Rechteck 7">
+            <a:extLst>
+              <a:ext uri="{FF2B5EF4-FFF2-40B4-BE49-F238E27FC236}">
+                <a16:creationId xmlns:a16="http://schemas.microsoft.com/office/drawing/2014/main" id="{BC3B91E8-280F-8097-3629-82CA047EAEFC}"/>
+              </a:ext>
+            </a:extLst>
+          </p:cNvPr>
+          <p:cNvSpPr/>
+          <p:nvPr/>
+        </p:nvSpPr>
+        <p:spPr>
+          <a:xfrm>
+            <a:off x="2428081" y="5283133"/>
+            <a:ext cx="2578100" cy="610175"/>
+          </a:xfrm>
+          <a:prstGeom prst="rect">
+            <a:avLst/>
+          </a:prstGeom>
+          <a:solidFill>
+            <a:schemeClr val="bg1"/>
+          </a:solidFill>
+          <a:ln w="19050">
+            <a:solidFill>
+              <a:srgbClr val="404040"/>
+            </a:solidFill>
+          </a:ln>
+        </p:spPr>
+        <p:style>
+          <a:lnRef idx="2">
+            <a:schemeClr val="accent1">
+              <a:shade val="15000"/>
+            </a:schemeClr>
+          </a:lnRef>
+          <a:fillRef idx="1">
+            <a:schemeClr val="accent1"/>
+          </a:fillRef>
+          <a:effectRef idx="0">
+            <a:schemeClr val="accent1"/>
+          </a:effectRef>
+          <a:fontRef idx="minor">
+            <a:schemeClr val="lt1"/>
+          </a:fontRef>
+        </p:style>
+        <p:txBody>
+          <a:bodyPr rtlCol="0" anchor="ctr"/>
+          <a:lstStyle/>
+          <a:p>
+            <a:pPr algn="ctr"/>
+            <a:endParaRPr lang="en-US">
+              <a:solidFill>
+                <a:sysClr val="windowText" lastClr="000000"/>
+              </a:solidFill>
+            </a:endParaRPr>
+          </a:p>
+        </p:txBody>
+      </p:sp>
+      <p:sp>
+        <p:nvSpPr>
+          <p:cNvPr id="9" name="Textfeld 8">
+            <a:extLst>
+              <a:ext uri="{FF2B5EF4-FFF2-40B4-BE49-F238E27FC236}">
+                <a16:creationId xmlns:a16="http://schemas.microsoft.com/office/drawing/2014/main" id="{605D3E2F-A3DD-D489-3689-8526C5E0BAC1}"/>
+              </a:ext>
+            </a:extLst>
+          </p:cNvPr>
+          <p:cNvSpPr txBox="1"/>
+          <p:nvPr/>
+        </p:nvSpPr>
+        <p:spPr>
+          <a:xfrm>
+            <a:off x="2428081" y="5308533"/>
+            <a:ext cx="2578100" cy="584775"/>
+          </a:xfrm>
+          <a:prstGeom prst="rect">
+            <a:avLst/>
+          </a:prstGeom>
+          <a:noFill/>
+        </p:spPr>
+        <p:txBody>
+          <a:bodyPr wrap="square" rtlCol="0">
+            <a:spAutoFit/>
+          </a:bodyPr>
+          <a:lstStyle/>
+          <a:p>
+            <a:pPr algn="ctr"/>
+            <a:r>
+              <a:rPr lang="en-US" sz="1600" dirty="0"/>
+              <a:t>Tested via ‘Guest’ and ‘Host’ test cases</a:t>
+            </a:r>
+          </a:p>
+        </p:txBody>
+      </p:sp>
     </p:spTree>
     <p:extLst>
       <p:ext uri="{BB962C8B-B14F-4D97-AF65-F5344CB8AC3E}">
@@ -8374,6 +10490,12 @@
               <a:t>‘profile_image_id’ references the id of an image that can be loaded to display the users profile image</a:t>
             </a:r>
           </a:p>
+          <a:p>
+            <a:r>
+              <a:rPr lang="en-US" dirty="0"/>
+              <a:t>The test case is meant to test the relationship between the ‘Guest’ table/class and its super class ‘User’. As well as testing other relevant relationships.</a:t>
+            </a:r>
+          </a:p>
         </p:txBody>
       </p:sp>
       <p:pic>
@@ -8414,10 +10536,10 @@
       </p:pic>
       <p:pic>
         <p:nvPicPr>
-          <p:cNvPr id="10" name="Inhaltsplatzhalter 9" descr="Ein Bild, das Text, Screenshot, Schrift, Quittung enthält.&#10;&#10;Automatisch generierte Beschreibung">
-            <a:extLst>
-              <a:ext uri="{FF2B5EF4-FFF2-40B4-BE49-F238E27FC236}">
-                <a16:creationId xmlns:a16="http://schemas.microsoft.com/office/drawing/2014/main" id="{436CB6BE-81AC-EEEC-3C4D-9DC505401F23}"/>
+          <p:cNvPr id="8" name="Inhaltsplatzhalter 7" descr="Ein Bild, das Text, Screenshot, Software enthält.&#10;&#10;Automatisch generierte Beschreibung">
+            <a:extLst>
+              <a:ext uri="{FF2B5EF4-FFF2-40B4-BE49-F238E27FC236}">
+                <a16:creationId xmlns:a16="http://schemas.microsoft.com/office/drawing/2014/main" id="{5D6E7314-E2B7-4FCD-E294-2CF2C4E7C7E9}"/>
               </a:ext>
             </a:extLst>
           </p:cNvPr>
@@ -8442,9 +10564,123 @@
         </p:blipFill>
         <p:spPr>
           <a:xfrm>
-            <a:off x="2855119" y="3327400"/>
-            <a:ext cx="1724025" cy="1724025"/>
-          </a:xfrm>
+            <a:off x="860800" y="2200050"/>
+            <a:ext cx="3791193" cy="3540573"/>
+          </a:xfrm>
+        </p:spPr>
+      </p:pic>
+      <p:pic>
+        <p:nvPicPr>
+          <p:cNvPr id="11" name="Grafik 10" descr="Ein Bild, das Text, Screenshot, Quittung, Schrift enthält.&#10;&#10;Automatisch generierte Beschreibung">
+            <a:extLst>
+              <a:ext uri="{FF2B5EF4-FFF2-40B4-BE49-F238E27FC236}">
+                <a16:creationId xmlns:a16="http://schemas.microsoft.com/office/drawing/2014/main" id="{B82D5D80-1347-6E5A-68C5-45AA9D28A627}"/>
+              </a:ext>
+            </a:extLst>
+          </p:cNvPr>
+          <p:cNvPicPr>
+            <a:picLocks noChangeAspect="1"/>
+          </p:cNvPicPr>
+          <p:nvPr/>
+        </p:nvPicPr>
+        <p:blipFill>
+          <a:blip r:embed="rId4">
+            <a:extLst>
+              <a:ext uri="{28A0092B-C50C-407E-A947-70E740481C1C}">
+                <a14:useLocalDpi xmlns:a14="http://schemas.microsoft.com/office/drawing/2010/main" val="0"/>
+              </a:ext>
+            </a:extLst>
+          </a:blip>
+          <a:stretch>
+            <a:fillRect/>
+          </a:stretch>
+        </p:blipFill>
+        <p:spPr>
+          <a:xfrm>
+            <a:off x="3930885" y="3054350"/>
+            <a:ext cx="1733550" cy="1724025"/>
+          </a:xfrm>
+          <a:prstGeom prst="rect">
+            <a:avLst/>
+          </a:prstGeom>
+        </p:spPr>
+      </p:pic>
+      <p:sp>
+        <p:nvSpPr>
+          <p:cNvPr id="18" name="Textfeld 17">
+            <a:extLst>
+              <a:ext uri="{FF2B5EF4-FFF2-40B4-BE49-F238E27FC236}">
+                <a16:creationId xmlns:a16="http://schemas.microsoft.com/office/drawing/2014/main" id="{A00EF40E-A93B-AAF5-9577-AEA4B542A8FB}"/>
+              </a:ext>
+            </a:extLst>
+          </p:cNvPr>
+          <p:cNvSpPr txBox="1"/>
+          <p:nvPr/>
+        </p:nvSpPr>
+        <p:spPr>
+          <a:xfrm>
+            <a:off x="4651993" y="2180284"/>
+            <a:ext cx="4260850" cy="215444"/>
+          </a:xfrm>
+          <a:prstGeom prst="rect">
+            <a:avLst/>
+          </a:prstGeom>
+          <a:noFill/>
+        </p:spPr>
+        <p:txBody>
+          <a:bodyPr wrap="square" rtlCol="0">
+            <a:spAutoFit/>
+          </a:bodyPr>
+          <a:lstStyle/>
+          <a:p>
+            <a:r>
+              <a:rPr lang="en-US" sz="800" dirty="0">
+                <a:solidFill>
+                  <a:schemeClr val="tx2">
+                    <a:lumMod val="60000"/>
+                    <a:lumOff val="40000"/>
+                  </a:schemeClr>
+                </a:solidFill>
+              </a:rPr>
+              <a:t>*code line indicator in screenshots may differ slightly compared to the file.</a:t>
+            </a:r>
+          </a:p>
+        </p:txBody>
+      </p:sp>
+      <p:pic>
+        <p:nvPicPr>
+          <p:cNvPr id="20" name="Grafik 19">
+            <a:extLst>
+              <a:ext uri="{FF2B5EF4-FFF2-40B4-BE49-F238E27FC236}">
+                <a16:creationId xmlns:a16="http://schemas.microsoft.com/office/drawing/2014/main" id="{E09C1193-5A40-86DC-AE8D-BB1FD6F871D0}"/>
+              </a:ext>
+            </a:extLst>
+          </p:cNvPr>
+          <p:cNvPicPr>
+            <a:picLocks noChangeAspect="1"/>
+          </p:cNvPicPr>
+          <p:nvPr/>
+        </p:nvPicPr>
+        <p:blipFill>
+          <a:blip r:embed="rId5">
+            <a:extLst>
+              <a:ext uri="{28A0092B-C50C-407E-A947-70E740481C1C}">
+                <a14:useLocalDpi xmlns:a14="http://schemas.microsoft.com/office/drawing/2010/main" val="0"/>
+              </a:ext>
+            </a:extLst>
+          </a:blip>
+          <a:stretch>
+            <a:fillRect/>
+          </a:stretch>
+        </p:blipFill>
+        <p:spPr>
+          <a:xfrm>
+            <a:off x="860800" y="5787262"/>
+            <a:ext cx="9747762" cy="1049377"/>
+          </a:xfrm>
+          <a:prstGeom prst="rect">
+            <a:avLst/>
+          </a:prstGeom>
         </p:spPr>
       </p:pic>
     </p:spTree>
@@ -8505,64 +10741,12 @@
           </a:p>
         </p:txBody>
       </p:sp>
-      <p:sp>
-        <p:nvSpPr>
-          <p:cNvPr id="4" name="Inhaltsplatzhalter 3">
-            <a:extLst>
-              <a:ext uri="{FF2B5EF4-FFF2-40B4-BE49-F238E27FC236}">
-                <a16:creationId xmlns:a16="http://schemas.microsoft.com/office/drawing/2014/main" id="{C26E891E-9E25-DD3C-9EF6-0C1E15B080A9}"/>
-              </a:ext>
-            </a:extLst>
-          </p:cNvPr>
-          <p:cNvSpPr>
-            <a:spLocks noGrp="1"/>
-          </p:cNvSpPr>
-          <p:nvPr>
-            <p:ph sz="half" idx="2"/>
-          </p:nvPr>
-        </p:nvSpPr>
-        <p:spPr/>
-        <p:txBody>
-          <a:bodyPr>
-            <a:normAutofit lnSpcReduction="10000"/>
-          </a:bodyPr>
-          <a:lstStyle/>
-          <a:p>
-            <a:r>
-              <a:rPr lang="en-US" dirty="0"/>
-              <a:t>The ‘user_id’ attribute refers back to the base class</a:t>
-            </a:r>
-          </a:p>
-          <a:p>
-            <a:r>
-              <a:rPr lang="en-US" dirty="0"/>
-              <a:t>‘profile_image_id’ references the id of an image that can be loaded to display the users profile image</a:t>
-            </a:r>
-          </a:p>
-          <a:p>
-            <a:pPr lvl="1"/>
-            <a:r>
-              <a:rPr lang="en-US" dirty="0"/>
-              <a:t>The reasoning for having this attribute in both subclasses is that it is only required for </a:t>
-            </a:r>
-          </a:p>
-          <a:p>
-            <a:r>
-              <a:rPr lang="en-US" dirty="0"/>
-              <a:t>The ‘triphistory_id’ is used to link together</a:t>
-            </a:r>
-          </a:p>
-          <a:p>
-            <a:endParaRPr lang="en-US" dirty="0"/>
-          </a:p>
-        </p:txBody>
-      </p:sp>
       <p:pic>
         <p:nvPicPr>
-          <p:cNvPr id="10" name="Inhaltsplatzhalter 9" descr="Ein Bild, das Text, Screenshot, Schrift, Quittung enthält.&#10;&#10;Automatisch generierte Beschreibung">
-            <a:extLst>
-              <a:ext uri="{FF2B5EF4-FFF2-40B4-BE49-F238E27FC236}">
-                <a16:creationId xmlns:a16="http://schemas.microsoft.com/office/drawing/2014/main" id="{CE5D841F-2EF0-85D0-6354-BB615AF0BB74}"/>
+          <p:cNvPr id="17" name="Inhaltsplatzhalter 16" descr="Ein Bild, das Text, Screenshot, Software enthält.&#10;&#10;Automatisch generierte Beschreibung">
+            <a:extLst>
+              <a:ext uri="{FF2B5EF4-FFF2-40B4-BE49-F238E27FC236}">
+                <a16:creationId xmlns:a16="http://schemas.microsoft.com/office/drawing/2014/main" id="{2ECA2B6B-F279-FBD8-1096-079951C0EFCB}"/>
               </a:ext>
             </a:extLst>
           </p:cNvPr>
@@ -8587,11 +10771,71 @@
         </p:blipFill>
         <p:spPr>
           <a:xfrm>
-            <a:off x="2855119" y="3327400"/>
-            <a:ext cx="1724025" cy="1724025"/>
+            <a:off x="845115" y="2201974"/>
+            <a:ext cx="4075764" cy="3307659"/>
           </a:xfrm>
         </p:spPr>
       </p:pic>
+      <p:sp>
+        <p:nvSpPr>
+          <p:cNvPr id="4" name="Inhaltsplatzhalter 3">
+            <a:extLst>
+              <a:ext uri="{FF2B5EF4-FFF2-40B4-BE49-F238E27FC236}">
+                <a16:creationId xmlns:a16="http://schemas.microsoft.com/office/drawing/2014/main" id="{C26E891E-9E25-DD3C-9EF6-0C1E15B080A9}"/>
+              </a:ext>
+            </a:extLst>
+          </p:cNvPr>
+          <p:cNvSpPr>
+            <a:spLocks noGrp="1"/>
+          </p:cNvSpPr>
+          <p:nvPr>
+            <p:ph sz="half" idx="2"/>
+          </p:nvPr>
+        </p:nvSpPr>
+        <p:spPr>
+          <a:xfrm>
+            <a:off x="6338315" y="2638044"/>
+            <a:ext cx="4270247" cy="3661156"/>
+          </a:xfrm>
+        </p:spPr>
+        <p:txBody>
+          <a:bodyPr>
+            <a:normAutofit fontScale="92500"/>
+          </a:bodyPr>
+          <a:lstStyle/>
+          <a:p>
+            <a:r>
+              <a:rPr lang="en-US" dirty="0"/>
+              <a:t>The ‘user_id’ attribute refers back to the base class</a:t>
+            </a:r>
+          </a:p>
+          <a:p>
+            <a:r>
+              <a:rPr lang="en-US" dirty="0"/>
+              <a:t>‘profile_image_id’ references the id of an image that can be loaded to display the users profile image</a:t>
+            </a:r>
+          </a:p>
+          <a:p>
+            <a:pPr lvl="1"/>
+            <a:r>
+              <a:rPr lang="en-US" dirty="0"/>
+              <a:t>The reasoning for having this attribute in both subclasses is that it is only required for </a:t>
+            </a:r>
+          </a:p>
+          <a:p>
+            <a:r>
+              <a:rPr lang="en-US" dirty="0"/>
+              <a:t>The ‘triphistory_id’ is used to link together</a:t>
+            </a:r>
+          </a:p>
+          <a:p>
+            <a:r>
+              <a:rPr lang="en-US" dirty="0"/>
+              <a:t>The test case is very similar to that of the previous guest class, adjusting where relevant relationships change compared to the previous slide.</a:t>
+            </a:r>
+          </a:p>
+        </p:txBody>
+      </p:sp>
       <p:pic>
         <p:nvPicPr>
           <p:cNvPr id="3" name="Grafik 2">
@@ -8622,6 +10866,78 @@
           <a:xfrm>
             <a:off x="11633200" y="6299200"/>
             <a:ext cx="457200" cy="457200"/>
+          </a:xfrm>
+          <a:prstGeom prst="rect">
+            <a:avLst/>
+          </a:prstGeom>
+        </p:spPr>
+      </p:pic>
+      <p:pic>
+        <p:nvPicPr>
+          <p:cNvPr id="11" name="Grafik 10" descr="Ein Bild, das Text, Screenshot, Schrift, Quittung enthält.&#10;&#10;Automatisch generierte Beschreibung">
+            <a:extLst>
+              <a:ext uri="{FF2B5EF4-FFF2-40B4-BE49-F238E27FC236}">
+                <a16:creationId xmlns:a16="http://schemas.microsoft.com/office/drawing/2014/main" id="{0B4EC0D8-C434-31BB-4C92-6029B8E48E2B}"/>
+              </a:ext>
+            </a:extLst>
+          </p:cNvPr>
+          <p:cNvPicPr>
+            <a:picLocks noChangeAspect="1"/>
+          </p:cNvPicPr>
+          <p:nvPr/>
+        </p:nvPicPr>
+        <p:blipFill>
+          <a:blip r:embed="rId4">
+            <a:extLst>
+              <a:ext uri="{28A0092B-C50C-407E-A947-70E740481C1C}">
+                <a14:useLocalDpi xmlns:a14="http://schemas.microsoft.com/office/drawing/2010/main" val="0"/>
+              </a:ext>
+            </a:extLst>
+          </a:blip>
+          <a:stretch>
+            <a:fillRect/>
+          </a:stretch>
+        </p:blipFill>
+        <p:spPr>
+          <a:xfrm>
+            <a:off x="4120136" y="2993790"/>
+            <a:ext cx="1733550" cy="1724025"/>
+          </a:xfrm>
+          <a:prstGeom prst="rect">
+            <a:avLst/>
+          </a:prstGeom>
+        </p:spPr>
+      </p:pic>
+      <p:pic>
+        <p:nvPicPr>
+          <p:cNvPr id="19" name="Grafik 18" descr="Ein Bild, das Screenshot, Text, Schrift enthält.&#10;&#10;Automatisch generierte Beschreibung">
+            <a:extLst>
+              <a:ext uri="{FF2B5EF4-FFF2-40B4-BE49-F238E27FC236}">
+                <a16:creationId xmlns:a16="http://schemas.microsoft.com/office/drawing/2014/main" id="{BB1E3549-BDF0-C76D-2A67-5C514C95223B}"/>
+              </a:ext>
+            </a:extLst>
+          </p:cNvPr>
+          <p:cNvPicPr>
+            <a:picLocks noChangeAspect="1"/>
+          </p:cNvPicPr>
+          <p:nvPr/>
+        </p:nvPicPr>
+        <p:blipFill>
+          <a:blip r:embed="rId5">
+            <a:extLst>
+              <a:ext uri="{28A0092B-C50C-407E-A947-70E740481C1C}">
+                <a14:useLocalDpi xmlns:a14="http://schemas.microsoft.com/office/drawing/2010/main" val="0"/>
+              </a:ext>
+            </a:extLst>
+          </a:blip>
+          <a:stretch>
+            <a:fillRect/>
+          </a:stretch>
+        </p:blipFill>
+        <p:spPr>
+          <a:xfrm>
+            <a:off x="845115" y="5534750"/>
+            <a:ext cx="5573234" cy="1285658"/>
           </a:xfrm>
           <a:prstGeom prst="rect">
             <a:avLst/>

</xml_diff>

<commit_message>
data dictionary and adjustments
- data dictionary updated to reflect current state
- some changes that were made cause of data dictionary:

- [x]  `PropertyReview` attributes were changed → test case & results
- [x]  added `name` attribute in `BankInformation`
- [x]  changed `amount_usd` to `amount` in `GiftCard`
- [x]  changed `owning_user_id` to `author_user_id` in `Message`
</commit_message>
<xml_diff>
--- a/phase_2/phase_2_db_presentation.pptx
+++ b/phase_2/phase_2_db_presentation.pptx
@@ -304,7 +304,7 @@
           <a:p>
             <a:fld id="{E830B2F3-B660-420C-A775-B5839CDE7B55}" type="datetimeFigureOut">
               <a:rPr lang="en-US" smtClean="0"/>
-              <a:t>1/16/2024</a:t>
+              <a:t>1/18/2024</a:t>
             </a:fld>
             <a:endParaRPr lang="en-US"/>
           </a:p>
@@ -474,7 +474,7 @@
           <a:p>
             <a:fld id="{E830B2F3-B660-420C-A775-B5839CDE7B55}" type="datetimeFigureOut">
               <a:rPr lang="en-US" smtClean="0"/>
-              <a:t>1/16/2024</a:t>
+              <a:t>1/18/2024</a:t>
             </a:fld>
             <a:endParaRPr lang="en-US"/>
           </a:p>
@@ -654,7 +654,7 @@
           <a:p>
             <a:fld id="{E830B2F3-B660-420C-A775-B5839CDE7B55}" type="datetimeFigureOut">
               <a:rPr lang="en-US" smtClean="0"/>
-              <a:t>1/16/2024</a:t>
+              <a:t>1/18/2024</a:t>
             </a:fld>
             <a:endParaRPr lang="en-US"/>
           </a:p>
@@ -824,7 +824,7 @@
           <a:p>
             <a:fld id="{E830B2F3-B660-420C-A775-B5839CDE7B55}" type="datetimeFigureOut">
               <a:rPr lang="en-US" smtClean="0"/>
-              <a:t>1/16/2024</a:t>
+              <a:t>1/18/2024</a:t>
             </a:fld>
             <a:endParaRPr lang="en-US"/>
           </a:p>
@@ -1092,7 +1092,7 @@
           <a:p>
             <a:fld id="{E830B2F3-B660-420C-A775-B5839CDE7B55}" type="datetimeFigureOut">
               <a:rPr lang="en-US" smtClean="0"/>
-              <a:t>1/16/2024</a:t>
+              <a:t>1/18/2024</a:t>
             </a:fld>
             <a:endParaRPr lang="en-US"/>
           </a:p>
@@ -1324,7 +1324,7 @@
           <a:p>
             <a:fld id="{E830B2F3-B660-420C-A775-B5839CDE7B55}" type="datetimeFigureOut">
               <a:rPr lang="en-US" smtClean="0"/>
-              <a:t>1/16/2024</a:t>
+              <a:t>1/18/2024</a:t>
             </a:fld>
             <a:endParaRPr lang="en-US"/>
           </a:p>
@@ -1683,7 +1683,7 @@
           <a:p>
             <a:fld id="{E830B2F3-B660-420C-A775-B5839CDE7B55}" type="datetimeFigureOut">
               <a:rPr lang="en-US" smtClean="0"/>
-              <a:t>1/16/2024</a:t>
+              <a:t>1/18/2024</a:t>
             </a:fld>
             <a:endParaRPr lang="en-US"/>
           </a:p>
@@ -1824,7 +1824,7 @@
           <a:p>
             <a:fld id="{E830B2F3-B660-420C-A775-B5839CDE7B55}" type="datetimeFigureOut">
               <a:rPr lang="en-US" smtClean="0"/>
-              <a:t>1/16/2024</a:t>
+              <a:t>1/18/2024</a:t>
             </a:fld>
             <a:endParaRPr lang="en-US"/>
           </a:p>
@@ -1919,7 +1919,7 @@
           <a:p>
             <a:fld id="{E830B2F3-B660-420C-A775-B5839CDE7B55}" type="datetimeFigureOut">
               <a:rPr lang="en-US" smtClean="0"/>
-              <a:t>1/16/2024</a:t>
+              <a:t>1/18/2024</a:t>
             </a:fld>
             <a:endParaRPr lang="en-US"/>
           </a:p>
@@ -2276,7 +2276,7 @@
           <a:p>
             <a:fld id="{E830B2F3-B660-420C-A775-B5839CDE7B55}" type="datetimeFigureOut">
               <a:rPr lang="en-US" smtClean="0"/>
-              <a:t>1/16/2024</a:t>
+              <a:t>1/18/2024</a:t>
             </a:fld>
             <a:endParaRPr lang="en-US"/>
           </a:p>
@@ -2633,7 +2633,7 @@
           <a:p>
             <a:fld id="{E830B2F3-B660-420C-A775-B5839CDE7B55}" type="datetimeFigureOut">
               <a:rPr lang="en-US" smtClean="0"/>
-              <a:t>1/16/2024</a:t>
+              <a:t>1/18/2024</a:t>
             </a:fld>
             <a:endParaRPr lang="en-US"/>
           </a:p>
@@ -2875,7 +2875,7 @@
           <a:p>
             <a:fld id="{E830B2F3-B660-420C-A775-B5839CDE7B55}" type="datetimeFigureOut">
               <a:rPr lang="en-US" smtClean="0"/>
-              <a:t>1/16/2024</a:t>
+              <a:t>1/18/2024</a:t>
             </a:fld>
             <a:endParaRPr lang="en-US"/>
           </a:p>
@@ -5160,65 +5160,12 @@
           </a:p>
         </p:txBody>
       </p:sp>
-      <p:sp>
-        <p:nvSpPr>
-          <p:cNvPr id="4" name="Inhaltsplatzhalter 3">
-            <a:extLst>
-              <a:ext uri="{FF2B5EF4-FFF2-40B4-BE49-F238E27FC236}">
-                <a16:creationId xmlns:a16="http://schemas.microsoft.com/office/drawing/2014/main" id="{54688B71-4AB8-4EC6-2A31-993E4DD6400C}"/>
-              </a:ext>
-            </a:extLst>
-          </p:cNvPr>
-          <p:cNvSpPr>
-            <a:spLocks noGrp="1"/>
-          </p:cNvSpPr>
-          <p:nvPr>
-            <p:ph sz="half" idx="2"/>
-          </p:nvPr>
-        </p:nvSpPr>
-        <p:spPr>
-          <a:xfrm>
-            <a:off x="6338317" y="2511552"/>
-            <a:ext cx="4270247" cy="3318256"/>
-          </a:xfrm>
-        </p:spPr>
-        <p:txBody>
-          <a:bodyPr>
-            <a:normAutofit fontScale="92500" lnSpcReduction="20000"/>
-          </a:bodyPr>
-          <a:lstStyle/>
-          <a:p>
-            <a:r>
-              <a:rPr lang="en-US" dirty="0"/>
-              <a:t>The message is linked to the chat via the chat id, represented here as ‘owning_chat_id’.</a:t>
-            </a:r>
-          </a:p>
-          <a:p>
-            <a:r>
-              <a:rPr lang="en-US" dirty="0"/>
-              <a:t>As Airbnb enables users to share images in chats, a message may contain an image instead of text. This necessitates the optional ‘image_id’ attribute. </a:t>
-            </a:r>
-          </a:p>
-          <a:p>
-            <a:r>
-              <a:rPr lang="en-US" dirty="0"/>
-              <a:t>The created timestamp is essentially the ‘sent’ timestamp of the message.</a:t>
-            </a:r>
-          </a:p>
-          <a:p>
-            <a:r>
-              <a:rPr lang="en-US" dirty="0"/>
-              <a:t>The second test case in the screenshot test the relationship of ‘Chat’ and ‘Message’ tables by returning all data entries of messages for a given</a:t>
-            </a:r>
-          </a:p>
-        </p:txBody>
-      </p:sp>
       <p:pic>
         <p:nvPicPr>
-          <p:cNvPr id="7" name="Grafik 6">
-            <a:extLst>
-              <a:ext uri="{FF2B5EF4-FFF2-40B4-BE49-F238E27FC236}">
-                <a16:creationId xmlns:a16="http://schemas.microsoft.com/office/drawing/2014/main" id="{BD0EF9BF-A617-4A30-7FA7-F4764D9DE14A}"/>
+          <p:cNvPr id="5" name="Grafik 4" descr="Ein Bild, das Text, Screenshot, Schrift, Quittung enthält.&#10;&#10;Automatisch generierte Beschreibung">
+            <a:extLst>
+              <a:ext uri="{FF2B5EF4-FFF2-40B4-BE49-F238E27FC236}">
+                <a16:creationId xmlns:a16="http://schemas.microsoft.com/office/drawing/2014/main" id="{0415C353-7B75-98FE-C064-027769D479E1}"/>
               </a:ext>
             </a:extLst>
           </p:cNvPr>
@@ -5241,29 +5188,80 @@
         </p:blipFill>
         <p:spPr>
           <a:xfrm>
-            <a:off x="11633200" y="6299200"/>
-            <a:ext cx="457200" cy="457200"/>
+            <a:off x="4371975" y="3373436"/>
+            <a:ext cx="1724025" cy="2009775"/>
           </a:xfrm>
           <a:prstGeom prst="rect">
             <a:avLst/>
           </a:prstGeom>
         </p:spPr>
       </p:pic>
+      <p:sp>
+        <p:nvSpPr>
+          <p:cNvPr id="4" name="Inhaltsplatzhalter 3">
+            <a:extLst>
+              <a:ext uri="{FF2B5EF4-FFF2-40B4-BE49-F238E27FC236}">
+                <a16:creationId xmlns:a16="http://schemas.microsoft.com/office/drawing/2014/main" id="{54688B71-4AB8-4EC6-2A31-993E4DD6400C}"/>
+              </a:ext>
+            </a:extLst>
+          </p:cNvPr>
+          <p:cNvSpPr>
+            <a:spLocks noGrp="1"/>
+          </p:cNvSpPr>
+          <p:nvPr>
+            <p:ph sz="half" idx="2"/>
+          </p:nvPr>
+        </p:nvSpPr>
+        <p:spPr>
+          <a:xfrm>
+            <a:off x="6338317" y="2511552"/>
+            <a:ext cx="4270247" cy="3641598"/>
+          </a:xfrm>
+        </p:spPr>
+        <p:txBody>
+          <a:bodyPr>
+            <a:normAutofit fontScale="92500" lnSpcReduction="20000"/>
+          </a:bodyPr>
+          <a:lstStyle/>
+          <a:p>
+            <a:r>
+              <a:rPr lang="en-US" dirty="0"/>
+              <a:t>The message is linked to the chat via the chat id, represented here as ‘owning_chat_id’. The ‘author_user_id’ attribute holds the author; Both id’s can be used to reconstruct a chat.</a:t>
+            </a:r>
+          </a:p>
+          <a:p>
+            <a:r>
+              <a:rPr lang="en-US" dirty="0"/>
+              <a:t>As Airbnb enables users to share images in chats, a message may contain an image instead of text. This necessitates the optional ‘image_id’ attribute. </a:t>
+            </a:r>
+          </a:p>
+          <a:p>
+            <a:r>
+              <a:rPr lang="en-US" dirty="0"/>
+              <a:t>The created timestamp is essentially the ‘sent’ timestamp of the message.</a:t>
+            </a:r>
+          </a:p>
+          <a:p>
+            <a:r>
+              <a:rPr lang="en-US" dirty="0"/>
+              <a:t>The second test case in the screenshot test the relationship of ‘Chat’ and ‘Message’ tables by returning all data entries of messages for a given</a:t>
+            </a:r>
+          </a:p>
+        </p:txBody>
+      </p:sp>
       <p:pic>
         <p:nvPicPr>
-          <p:cNvPr id="15" name="Inhaltsplatzhalter 14" descr="Ein Bild, das Text, Screenshot, Quittung, Schrift enthält.&#10;&#10;Automatisch generierte Beschreibung">
-            <a:extLst>
-              <a:ext uri="{FF2B5EF4-FFF2-40B4-BE49-F238E27FC236}">
-                <a16:creationId xmlns:a16="http://schemas.microsoft.com/office/drawing/2014/main" id="{DCFA7393-EE2D-65D0-E31A-1D74D209148A}"/>
+          <p:cNvPr id="7" name="Grafik 6">
+            <a:extLst>
+              <a:ext uri="{FF2B5EF4-FFF2-40B4-BE49-F238E27FC236}">
+                <a16:creationId xmlns:a16="http://schemas.microsoft.com/office/drawing/2014/main" id="{BD0EF9BF-A617-4A30-7FA7-F4764D9DE14A}"/>
               </a:ext>
             </a:extLst>
           </p:cNvPr>
           <p:cNvPicPr>
-            <a:picLocks noGrp="1" noChangeAspect="1"/>
+            <a:picLocks noChangeAspect="1"/>
           </p:cNvPicPr>
-          <p:nvPr>
-            <p:ph sz="half" idx="1"/>
-          </p:nvPr>
+          <p:nvPr/>
         </p:nvPicPr>
         <p:blipFill>
           <a:blip r:embed="rId4">
@@ -5279,9 +5277,12 @@
         </p:blipFill>
         <p:spPr>
           <a:xfrm>
-            <a:off x="4362450" y="3373437"/>
-            <a:ext cx="1733550" cy="2009775"/>
-          </a:xfrm>
+            <a:off x="11633200" y="6299200"/>
+            <a:ext cx="457200" cy="457200"/>
+          </a:xfrm>
+          <a:prstGeom prst="rect">
+            <a:avLst/>
+          </a:prstGeom>
         </p:spPr>
       </p:pic>
       <p:pic>
@@ -6587,93 +6588,12 @@
           <a:chExt cx="0" cy="0"/>
         </a:xfrm>
       </p:grpSpPr>
-      <p:sp>
-        <p:nvSpPr>
-          <p:cNvPr id="2" name="Titel 1">
-            <a:extLst>
-              <a:ext uri="{FF2B5EF4-FFF2-40B4-BE49-F238E27FC236}">
-                <a16:creationId xmlns:a16="http://schemas.microsoft.com/office/drawing/2014/main" id="{F6540344-E980-EFC2-A1AC-AE48AEF0F80C}"/>
-              </a:ext>
-            </a:extLst>
-          </p:cNvPr>
-          <p:cNvSpPr>
-            <a:spLocks noGrp="1"/>
-          </p:cNvSpPr>
-          <p:nvPr>
-            <p:ph type="title"/>
-          </p:nvPr>
-        </p:nvSpPr>
-        <p:spPr/>
-        <p:txBody>
-          <a:bodyPr/>
-          <a:lstStyle/>
-          <a:p>
-            <a:r>
-              <a:rPr lang="en-US" dirty="0"/>
-              <a:t>Table - PropertyReview</a:t>
-            </a:r>
-          </a:p>
-        </p:txBody>
-      </p:sp>
-      <p:sp>
-        <p:nvSpPr>
-          <p:cNvPr id="4" name="Inhaltsplatzhalter 3">
-            <a:extLst>
-              <a:ext uri="{FF2B5EF4-FFF2-40B4-BE49-F238E27FC236}">
-                <a16:creationId xmlns:a16="http://schemas.microsoft.com/office/drawing/2014/main" id="{F7288F43-7D20-C531-80D6-EDFA2237D8C1}"/>
-              </a:ext>
-            </a:extLst>
-          </p:cNvPr>
-          <p:cNvSpPr>
-            <a:spLocks noGrp="1"/>
-          </p:cNvSpPr>
-          <p:nvPr>
-            <p:ph sz="half" idx="2"/>
-          </p:nvPr>
-        </p:nvSpPr>
-        <p:spPr>
-          <a:xfrm>
-            <a:off x="6338315" y="2638043"/>
-            <a:ext cx="4270247" cy="3391165"/>
-          </a:xfrm>
-        </p:spPr>
-        <p:txBody>
-          <a:bodyPr>
-            <a:normAutofit fontScale="92500" lnSpcReduction="10000"/>
-          </a:bodyPr>
-          <a:lstStyle/>
-          <a:p>
-            <a:r>
-              <a:rPr lang="en-US" dirty="0"/>
-              <a:t>Similar to a User Review this table holds the reviews given by guests to properties.</a:t>
-            </a:r>
-          </a:p>
-          <a:p>
-            <a:r>
-              <a:rPr lang="en-US" dirty="0"/>
-              <a:t>It holds multiple ratings for overall, location, cleanliness, communication, check in and accuracy which are displayed on the listing page. These are represented as integers with values from 0 to 5. (Star rating)</a:t>
-            </a:r>
-          </a:p>
-          <a:p>
-            <a:r>
-              <a:rPr lang="en-US" dirty="0"/>
-              <a:t>Users can also add comments and images to the review.</a:t>
-            </a:r>
-          </a:p>
-          <a:p>
-            <a:r>
-              <a:rPr lang="en-US" dirty="0"/>
-              <a:t>The test case simple checks the relationship between propertylistings and reviews, as well as the review content.</a:t>
-            </a:r>
-          </a:p>
-        </p:txBody>
-      </p:sp>
       <p:pic>
         <p:nvPicPr>
-          <p:cNvPr id="7" name="Grafik 6">
-            <a:extLst>
-              <a:ext uri="{FF2B5EF4-FFF2-40B4-BE49-F238E27FC236}">
-                <a16:creationId xmlns:a16="http://schemas.microsoft.com/office/drawing/2014/main" id="{1FB17EF3-60A3-7C88-7042-89F68F3A4DE9}"/>
+          <p:cNvPr id="10" name="Grafik 9">
+            <a:extLst>
+              <a:ext uri="{FF2B5EF4-FFF2-40B4-BE49-F238E27FC236}">
+                <a16:creationId xmlns:a16="http://schemas.microsoft.com/office/drawing/2014/main" id="{223732F2-95FB-2C20-FE91-111844205F5D}"/>
               </a:ext>
             </a:extLst>
           </p:cNvPr>
@@ -6696,29 +6616,108 @@
         </p:blipFill>
         <p:spPr>
           <a:xfrm>
-            <a:off x="11633200" y="6299200"/>
-            <a:ext cx="457200" cy="457200"/>
+            <a:off x="101600" y="6020594"/>
+            <a:ext cx="10775950" cy="493245"/>
           </a:xfrm>
           <a:prstGeom prst="rect">
             <a:avLst/>
           </a:prstGeom>
         </p:spPr>
       </p:pic>
+      <p:sp>
+        <p:nvSpPr>
+          <p:cNvPr id="2" name="Titel 1">
+            <a:extLst>
+              <a:ext uri="{FF2B5EF4-FFF2-40B4-BE49-F238E27FC236}">
+                <a16:creationId xmlns:a16="http://schemas.microsoft.com/office/drawing/2014/main" id="{F6540344-E980-EFC2-A1AC-AE48AEF0F80C}"/>
+              </a:ext>
+            </a:extLst>
+          </p:cNvPr>
+          <p:cNvSpPr>
+            <a:spLocks noGrp="1"/>
+          </p:cNvSpPr>
+          <p:nvPr>
+            <p:ph type="title"/>
+          </p:nvPr>
+        </p:nvSpPr>
+        <p:spPr/>
+        <p:txBody>
+          <a:bodyPr/>
+          <a:lstStyle/>
+          <a:p>
+            <a:r>
+              <a:rPr lang="en-US" dirty="0"/>
+              <a:t>Table - PropertyReview</a:t>
+            </a:r>
+          </a:p>
+        </p:txBody>
+      </p:sp>
+      <p:sp>
+        <p:nvSpPr>
+          <p:cNvPr id="4" name="Inhaltsplatzhalter 3">
+            <a:extLst>
+              <a:ext uri="{FF2B5EF4-FFF2-40B4-BE49-F238E27FC236}">
+                <a16:creationId xmlns:a16="http://schemas.microsoft.com/office/drawing/2014/main" id="{F7288F43-7D20-C531-80D6-EDFA2237D8C1}"/>
+              </a:ext>
+            </a:extLst>
+          </p:cNvPr>
+          <p:cNvSpPr>
+            <a:spLocks noGrp="1"/>
+          </p:cNvSpPr>
+          <p:nvPr>
+            <p:ph sz="half" idx="2"/>
+          </p:nvPr>
+        </p:nvSpPr>
+        <p:spPr>
+          <a:xfrm>
+            <a:off x="6338315" y="2638043"/>
+            <a:ext cx="4270247" cy="3391165"/>
+          </a:xfrm>
+        </p:spPr>
+        <p:txBody>
+          <a:bodyPr>
+            <a:normAutofit lnSpcReduction="10000"/>
+          </a:bodyPr>
+          <a:lstStyle/>
+          <a:p>
+            <a:r>
+              <a:rPr lang="en-US" dirty="0"/>
+              <a:t>Similar to a User Review this table holds the reviews given by guests to properties.</a:t>
+            </a:r>
+          </a:p>
+          <a:p>
+            <a:r>
+              <a:rPr lang="en-US" dirty="0"/>
+              <a:t>It holds multiple ratings/scores which are displayed on the listing page. These are represented as integers with values from 0 to 5. (Star rating)</a:t>
+            </a:r>
+          </a:p>
+          <a:p>
+            <a:r>
+              <a:rPr lang="en-US" dirty="0"/>
+              <a:t>Users can also add comments to the review.</a:t>
+            </a:r>
+          </a:p>
+          <a:p>
+            <a:r>
+              <a:rPr lang="en-US" dirty="0"/>
+              <a:t>The test case simple checks the relationship between propertylistings and reviews, as well as the review content.</a:t>
+            </a:r>
+          </a:p>
+        </p:txBody>
+      </p:sp>
       <p:pic>
         <p:nvPicPr>
-          <p:cNvPr id="11" name="Inhaltsplatzhalter 10" descr="Ein Bild, das Text, Screenshot, Software enthält.&#10;&#10;Automatisch generierte Beschreibung">
-            <a:extLst>
-              <a:ext uri="{FF2B5EF4-FFF2-40B4-BE49-F238E27FC236}">
-                <a16:creationId xmlns:a16="http://schemas.microsoft.com/office/drawing/2014/main" id="{5ECA4C77-A0BE-B411-80B6-AB048F94F0D3}"/>
+          <p:cNvPr id="7" name="Grafik 6">
+            <a:extLst>
+              <a:ext uri="{FF2B5EF4-FFF2-40B4-BE49-F238E27FC236}">
+                <a16:creationId xmlns:a16="http://schemas.microsoft.com/office/drawing/2014/main" id="{1FB17EF3-60A3-7C88-7042-89F68F3A4DE9}"/>
               </a:ext>
             </a:extLst>
           </p:cNvPr>
           <p:cNvPicPr>
-            <a:picLocks noGrp="1" noChangeAspect="1"/>
+            <a:picLocks noChangeAspect="1"/>
           </p:cNvPicPr>
-          <p:nvPr>
-            <p:ph sz="half" idx="1"/>
-          </p:nvPr>
+          <p:nvPr/>
         </p:nvPicPr>
         <p:blipFill>
           <a:blip r:embed="rId3">
@@ -6734,17 +6733,20 @@
         </p:blipFill>
         <p:spPr>
           <a:xfrm>
-            <a:off x="120650" y="2638044"/>
-            <a:ext cx="4932364" cy="1573909"/>
-          </a:xfrm>
+            <a:off x="11633200" y="6299200"/>
+            <a:ext cx="457200" cy="457200"/>
+          </a:xfrm>
+          <a:prstGeom prst="rect">
+            <a:avLst/>
+          </a:prstGeom>
         </p:spPr>
       </p:pic>
       <p:pic>
         <p:nvPicPr>
-          <p:cNvPr id="13" name="Grafik 12" descr="Ein Bild, das Text, Screenshot, Schrift, Zahl enthält.&#10;&#10;Automatisch generierte Beschreibung">
-            <a:extLst>
-              <a:ext uri="{FF2B5EF4-FFF2-40B4-BE49-F238E27FC236}">
-                <a16:creationId xmlns:a16="http://schemas.microsoft.com/office/drawing/2014/main" id="{5AD69A3A-5416-AAB6-C406-98192A02DD0C}"/>
+          <p:cNvPr id="14" name="Grafik 13" descr="Ein Bild, das Text, Screenshot, Software enthält.&#10;&#10;Automatisch generierte Beschreibung">
+            <a:extLst>
+              <a:ext uri="{FF2B5EF4-FFF2-40B4-BE49-F238E27FC236}">
+                <a16:creationId xmlns:a16="http://schemas.microsoft.com/office/drawing/2014/main" id="{A7E42243-389A-7485-965E-D4527A218277}"/>
               </a:ext>
             </a:extLst>
           </p:cNvPr>
@@ -6767,8 +6769,8 @@
         </p:blipFill>
         <p:spPr>
           <a:xfrm>
-            <a:off x="4984176" y="2791554"/>
-            <a:ext cx="1233489" cy="2656746"/>
+            <a:off x="120650" y="2659606"/>
+            <a:ext cx="4932364" cy="1552347"/>
           </a:xfrm>
           <a:prstGeom prst="rect">
             <a:avLst/>
@@ -6777,10 +6779,10 @@
       </p:pic>
       <p:pic>
         <p:nvPicPr>
-          <p:cNvPr id="17" name="Grafik 16">
-            <a:extLst>
-              <a:ext uri="{FF2B5EF4-FFF2-40B4-BE49-F238E27FC236}">
-                <a16:creationId xmlns:a16="http://schemas.microsoft.com/office/drawing/2014/main" id="{AC1B6790-9E80-3AE3-79EE-22B71AAB3113}"/>
+          <p:cNvPr id="5" name="Grafik 4" descr="Ein Bild, das Text, Screenshot, Schrift, Zahl enthält.&#10;&#10;Automatisch generierte Beschreibung">
+            <a:extLst>
+              <a:ext uri="{FF2B5EF4-FFF2-40B4-BE49-F238E27FC236}">
+                <a16:creationId xmlns:a16="http://schemas.microsoft.com/office/drawing/2014/main" id="{AD6BE72A-EB38-A5EC-1AFA-6376C1BCC866}"/>
               </a:ext>
             </a:extLst>
           </p:cNvPr>
@@ -6803,8 +6805,8 @@
         </p:blipFill>
         <p:spPr>
           <a:xfrm>
-            <a:off x="101600" y="6029209"/>
-            <a:ext cx="10775950" cy="493245"/>
+            <a:off x="5006262" y="2762937"/>
+            <a:ext cx="1332053" cy="2656746"/>
           </a:xfrm>
           <a:prstGeom prst="rect">
             <a:avLst/>
@@ -8291,19 +8293,17 @@
       </p:pic>
       <p:pic>
         <p:nvPicPr>
-          <p:cNvPr id="11" name="Inhaltsplatzhalter 10" descr="Ein Bild, das Text, Screenshot, Schrift, Quittung enthält.&#10;&#10;Automatisch generierte Beschreibung">
-            <a:extLst>
-              <a:ext uri="{FF2B5EF4-FFF2-40B4-BE49-F238E27FC236}">
-                <a16:creationId xmlns:a16="http://schemas.microsoft.com/office/drawing/2014/main" id="{FE029004-F558-0A50-CD7F-93D155A12DED}"/>
+          <p:cNvPr id="5" name="Grafik 4" descr="Ein Bild, das Text, Screenshot, Schrift, Quittung enthält.&#10;&#10;Automatisch generierte Beschreibung">
+            <a:extLst>
+              <a:ext uri="{FF2B5EF4-FFF2-40B4-BE49-F238E27FC236}">
+                <a16:creationId xmlns:a16="http://schemas.microsoft.com/office/drawing/2014/main" id="{B0E803B0-12C6-070A-E4BD-8B12F302BA16}"/>
               </a:ext>
             </a:extLst>
           </p:cNvPr>
           <p:cNvPicPr>
-            <a:picLocks noGrp="1" noChangeAspect="1"/>
+            <a:picLocks noChangeAspect="1"/>
           </p:cNvPicPr>
-          <p:nvPr>
-            <p:ph sz="half" idx="1"/>
-          </p:nvPr>
+          <p:nvPr/>
         </p:nvPicPr>
         <p:blipFill>
           <a:blip r:embed="rId3">
@@ -8319,9 +8319,12 @@
         </p:blipFill>
         <p:spPr>
           <a:xfrm>
-            <a:off x="2850356" y="3327400"/>
-            <a:ext cx="1733550" cy="1724025"/>
-          </a:xfrm>
+            <a:off x="2850356" y="3041650"/>
+            <a:ext cx="1724025" cy="2009775"/>
+          </a:xfrm>
+          <a:prstGeom prst="rect">
+            <a:avLst/>
+          </a:prstGeom>
         </p:spPr>
       </p:pic>
       <p:sp>
@@ -8988,60 +8991,12 @@
           </a:p>
         </p:txBody>
       </p:sp>
-      <p:sp>
-        <p:nvSpPr>
-          <p:cNvPr id="4" name="Inhaltsplatzhalter 3">
-            <a:extLst>
-              <a:ext uri="{FF2B5EF4-FFF2-40B4-BE49-F238E27FC236}">
-                <a16:creationId xmlns:a16="http://schemas.microsoft.com/office/drawing/2014/main" id="{C82C23C2-1D1E-590E-FB0B-0AC15D4C26F7}"/>
-              </a:ext>
-            </a:extLst>
-          </p:cNvPr>
-          <p:cNvSpPr>
-            <a:spLocks noGrp="1"/>
-          </p:cNvSpPr>
-          <p:nvPr>
-            <p:ph sz="half" idx="2"/>
-          </p:nvPr>
-        </p:nvSpPr>
-        <p:spPr/>
-        <p:txBody>
-          <a:bodyPr>
-            <a:normAutofit fontScale="92500" lnSpcReduction="20000"/>
-          </a:bodyPr>
-          <a:lstStyle/>
-          <a:p>
-            <a:r>
-              <a:rPr lang="en-US" dirty="0"/>
-              <a:t>The ‘GiftCard’ table contains information relevant to gift cards.</a:t>
-            </a:r>
-          </a:p>
-          <a:p>
-            <a:r>
-              <a:rPr lang="en-US" dirty="0"/>
-              <a:t>The ‘amound_usd’ attribute saves the value of gift card in us dollars.</a:t>
-            </a:r>
-          </a:p>
-          <a:p>
-            <a:r>
-              <a:rPr lang="en-US" dirty="0"/>
-              <a:t>The ‘currency_id’ attribute can then be used to convert it, if necessary</a:t>
-            </a:r>
-          </a:p>
-          <a:p>
-            <a:r>
-              <a:rPr lang="en-US" dirty="0"/>
-              <a:t>The GiftCard table is a very simple, which is not as important as other tables to the functionality of the system and therefore does not warrant a complicated test case, content is checked again at the end of the test.sql file.</a:t>
-            </a:r>
-          </a:p>
-        </p:txBody>
-      </p:sp>
       <p:pic>
         <p:nvPicPr>
-          <p:cNvPr id="7" name="Grafik 6">
-            <a:extLst>
-              <a:ext uri="{FF2B5EF4-FFF2-40B4-BE49-F238E27FC236}">
-                <a16:creationId xmlns:a16="http://schemas.microsoft.com/office/drawing/2014/main" id="{29A0A2F2-6C8D-A19C-71B0-96C79D8F3BF7}"/>
+          <p:cNvPr id="5" name="Grafik 4" descr="Ein Bild, das Text, Screenshot, Schrift, Quittung enthält.&#10;&#10;Automatisch generierte Beschreibung">
+            <a:extLst>
+              <a:ext uri="{FF2B5EF4-FFF2-40B4-BE49-F238E27FC236}">
+                <a16:creationId xmlns:a16="http://schemas.microsoft.com/office/drawing/2014/main" id="{BAB94E85-4C18-D2E8-1A6C-7D434C97D8D2}"/>
               </a:ext>
             </a:extLst>
           </p:cNvPr>
@@ -9064,29 +9019,75 @@
         </p:blipFill>
         <p:spPr>
           <a:xfrm>
-            <a:off x="11633200" y="6299200"/>
-            <a:ext cx="457200" cy="457200"/>
+            <a:off x="2850356" y="3327022"/>
+            <a:ext cx="1724025" cy="1724025"/>
           </a:xfrm>
           <a:prstGeom prst="rect">
             <a:avLst/>
           </a:prstGeom>
         </p:spPr>
       </p:pic>
+      <p:sp>
+        <p:nvSpPr>
+          <p:cNvPr id="4" name="Inhaltsplatzhalter 3">
+            <a:extLst>
+              <a:ext uri="{FF2B5EF4-FFF2-40B4-BE49-F238E27FC236}">
+                <a16:creationId xmlns:a16="http://schemas.microsoft.com/office/drawing/2014/main" id="{C82C23C2-1D1E-590E-FB0B-0AC15D4C26F7}"/>
+              </a:ext>
+            </a:extLst>
+          </p:cNvPr>
+          <p:cNvSpPr>
+            <a:spLocks noGrp="1"/>
+          </p:cNvSpPr>
+          <p:nvPr>
+            <p:ph sz="half" idx="2"/>
+          </p:nvPr>
+        </p:nvSpPr>
+        <p:spPr/>
+        <p:txBody>
+          <a:bodyPr>
+            <a:normAutofit fontScale="92500" lnSpcReduction="20000"/>
+          </a:bodyPr>
+          <a:lstStyle/>
+          <a:p>
+            <a:r>
+              <a:rPr lang="en-US" dirty="0"/>
+              <a:t>The ‘GiftCard’ table contains information relevant to gift cards.</a:t>
+            </a:r>
+          </a:p>
+          <a:p>
+            <a:r>
+              <a:rPr lang="en-US" dirty="0"/>
+              <a:t>The ‘amount’ attribute saves the value of gift card in us dollars.</a:t>
+            </a:r>
+          </a:p>
+          <a:p>
+            <a:r>
+              <a:rPr lang="en-US" dirty="0"/>
+              <a:t>The ‘currency_id’ attribute can then be used to convert it, if necessary</a:t>
+            </a:r>
+          </a:p>
+          <a:p>
+            <a:r>
+              <a:rPr lang="en-US" dirty="0"/>
+              <a:t>The GiftCard table is a very simple, which is not as important as other tables to the functionality of the system and therefore does not warrant a complicated test case, content is checked again at the end of the test.sql file.</a:t>
+            </a:r>
+          </a:p>
+        </p:txBody>
+      </p:sp>
       <p:pic>
         <p:nvPicPr>
-          <p:cNvPr id="9" name="Inhaltsplatzhalter 8" descr="Ein Bild, das Text, Screenshot, Schrift, Quittung enthält.&#10;&#10;Automatisch generierte Beschreibung">
-            <a:extLst>
-              <a:ext uri="{FF2B5EF4-FFF2-40B4-BE49-F238E27FC236}">
-                <a16:creationId xmlns:a16="http://schemas.microsoft.com/office/drawing/2014/main" id="{4D619FDB-5D26-CCBF-C17D-8A07278B14B1}"/>
+          <p:cNvPr id="7" name="Grafik 6">
+            <a:extLst>
+              <a:ext uri="{FF2B5EF4-FFF2-40B4-BE49-F238E27FC236}">
+                <a16:creationId xmlns:a16="http://schemas.microsoft.com/office/drawing/2014/main" id="{29A0A2F2-6C8D-A19C-71B0-96C79D8F3BF7}"/>
               </a:ext>
             </a:extLst>
           </p:cNvPr>
           <p:cNvPicPr>
-            <a:picLocks noGrp="1" noChangeAspect="1"/>
+            <a:picLocks noChangeAspect="1"/>
           </p:cNvPicPr>
-          <p:nvPr>
-            <p:ph sz="half" idx="1"/>
-          </p:nvPr>
+          <p:nvPr/>
         </p:nvPicPr>
         <p:blipFill>
           <a:blip r:embed="rId3">
@@ -9102,9 +9103,12 @@
         </p:blipFill>
         <p:spPr>
           <a:xfrm>
-            <a:off x="2850356" y="3327400"/>
-            <a:ext cx="1733550" cy="1724025"/>
-          </a:xfrm>
+            <a:off x="11633200" y="6299200"/>
+            <a:ext cx="457200" cy="457200"/>
+          </a:xfrm>
+          <a:prstGeom prst="rect">
+            <a:avLst/>
+          </a:prstGeom>
         </p:spPr>
       </p:pic>
       <p:sp>
@@ -9840,10 +9844,15 @@
             <p:ph idx="1"/>
           </p:nvPr>
         </p:nvSpPr>
-        <p:spPr/>
+        <p:spPr>
+          <a:xfrm>
+            <a:off x="2231136" y="2638044"/>
+            <a:ext cx="7729728" cy="3661156"/>
+          </a:xfrm>
+        </p:spPr>
         <p:txBody>
           <a:bodyPr>
-            <a:normAutofit fontScale="92500" lnSpcReduction="20000"/>
+            <a:normAutofit fontScale="85000" lnSpcReduction="20000"/>
           </a:bodyPr>
           <a:lstStyle/>
           <a:p>
@@ -9875,7 +9884,7 @@
             <a:pPr lvl="1"/>
             <a:r>
               <a:rPr lang="en-US" dirty="0"/>
-              <a:t>Messages now have an ‘owning_user_id’ attribute</a:t>
+              <a:t>Messages now have an ‘author_user_id’ attribute</a:t>
             </a:r>
           </a:p>
           <a:p>
@@ -9891,6 +9900,32 @@
               <a:rPr lang="en-US" dirty="0"/>
               <a:t>PropertyListing now has the ‘owning_host_id’ attribute</a:t>
             </a:r>
+          </a:p>
+          <a:p>
+            <a:pPr lvl="1"/>
+            <a:r>
+              <a:rPr lang="en-US" dirty="0"/>
+              <a:t>PropertyReview attributes have changed to better align with the AirBnB app.</a:t>
+            </a:r>
+          </a:p>
+          <a:p>
+            <a:pPr lvl="1"/>
+            <a:r>
+              <a:rPr lang="en-US" dirty="0"/>
+              <a:t>Currency attribute ‘amount_usd’ was changed to ‘amount’</a:t>
+            </a:r>
+          </a:p>
+          <a:p>
+            <a:pPr lvl="1"/>
+            <a:r>
+              <a:rPr lang="en-US" dirty="0"/>
+              <a:t>BankInformation now has a ‘name’ attribute for the </a:t>
+            </a:r>
+            <a:r>
+              <a:rPr lang="en-US" dirty="0" err="1"/>
+              <a:t>Bankname</a:t>
+            </a:r>
+            <a:endParaRPr lang="en-US" dirty="0"/>
           </a:p>
           <a:p>
             <a:pPr lvl="1"/>
@@ -10059,10 +10094,10 @@
       </p:sp>
       <p:pic>
         <p:nvPicPr>
-          <p:cNvPr id="5" name="Grafik 4" descr="Ein Bild, das Text, Diagramm, Plan, parallel enthält.&#10;&#10;Automatisch generierte Beschreibung">
-            <a:extLst>
-              <a:ext uri="{FF2B5EF4-FFF2-40B4-BE49-F238E27FC236}">
-                <a16:creationId xmlns:a16="http://schemas.microsoft.com/office/drawing/2014/main" id="{57A29CD3-E67D-9748-063C-AD5D49AE4BFF}"/>
+          <p:cNvPr id="6" name="Grafik 5" descr="Ein Bild, das Text, Diagramm, Plan, parallel enthält.&#10;&#10;Automatisch generierte Beschreibung">
+            <a:extLst>
+              <a:ext uri="{FF2B5EF4-FFF2-40B4-BE49-F238E27FC236}">
+                <a16:creationId xmlns:a16="http://schemas.microsoft.com/office/drawing/2014/main" id="{DCBE5939-0CCA-23A5-39B6-C0695F1DC37C}"/>
               </a:ext>
             </a:extLst>
           </p:cNvPr>
@@ -10086,7 +10121,7 @@
         <p:spPr>
           <a:xfrm>
             <a:off x="6096000" y="0"/>
-            <a:ext cx="6096000" cy="6858000"/>
+            <a:ext cx="6046470" cy="6858000"/>
           </a:xfrm>
           <a:prstGeom prst="rect">
             <a:avLst/>

</xml_diff>

<commit_message>
final touches - asked prof for feedback on formatting
- changes to data dictionary (format to fit on dina4 pdf pages)
- presentation (cleaner)
- creation of submission folder & file naming conventions
</commit_message>
<xml_diff>
--- a/phase_2/phase_2_db_presentation.pptx
+++ b/phase_2/phase_2_db_presentation.pptx
@@ -4,13 +4,16 @@
   <p:sldMasterIdLst>
     <p:sldMasterId id="2147483767" r:id="rId1"/>
   </p:sldMasterIdLst>
+  <p:notesMasterIdLst>
+    <p:notesMasterId r:id="rId32"/>
+  </p:notesMasterIdLst>
   <p:sldIdLst>
     <p:sldId id="256" r:id="rId2"/>
     <p:sldId id="257" r:id="rId3"/>
     <p:sldId id="258" r:id="rId4"/>
-    <p:sldId id="290" r:id="rId5"/>
-    <p:sldId id="291" r:id="rId6"/>
-    <p:sldId id="259" r:id="rId7"/>
+    <p:sldId id="291" r:id="rId5"/>
+    <p:sldId id="259" r:id="rId6"/>
+    <p:sldId id="293" r:id="rId7"/>
     <p:sldId id="261" r:id="rId8"/>
     <p:sldId id="262" r:id="rId9"/>
     <p:sldId id="263" r:id="rId10"/>
@@ -139,6 +142,440 @@
     </p:ext>
   </p:extLst>
 </p:presentation>
+</file>
+
+<file path=ppt/notesMasters/notesMaster1.xml><?xml version="1.0" encoding="utf-8"?>
+<p:notesMaster xmlns:a="http://schemas.openxmlformats.org/drawingml/2006/main" xmlns:r="http://schemas.openxmlformats.org/officeDocument/2006/relationships" xmlns:p="http://schemas.openxmlformats.org/presentationml/2006/main">
+  <p:cSld>
+    <p:bg>
+      <p:bgRef idx="1001">
+        <a:schemeClr val="bg1"/>
+      </p:bgRef>
+    </p:bg>
+    <p:spTree>
+      <p:nvGrpSpPr>
+        <p:cNvPr id="1" name=""/>
+        <p:cNvGrpSpPr/>
+        <p:nvPr/>
+      </p:nvGrpSpPr>
+      <p:grpSpPr>
+        <a:xfrm>
+          <a:off x="0" y="0"/>
+          <a:ext cx="0" cy="0"/>
+          <a:chOff x="0" y="0"/>
+          <a:chExt cx="0" cy="0"/>
+        </a:xfrm>
+      </p:grpSpPr>
+      <p:sp>
+        <p:nvSpPr>
+          <p:cNvPr id="2" name="Kopfzeilenplatzhalter 1"/>
+          <p:cNvSpPr>
+            <a:spLocks noGrp="1"/>
+          </p:cNvSpPr>
+          <p:nvPr>
+            <p:ph type="hdr" sz="quarter"/>
+          </p:nvPr>
+        </p:nvSpPr>
+        <p:spPr>
+          <a:xfrm>
+            <a:off x="0" y="0"/>
+            <a:ext cx="2971800" cy="458788"/>
+          </a:xfrm>
+          <a:prstGeom prst="rect">
+            <a:avLst/>
+          </a:prstGeom>
+        </p:spPr>
+        <p:txBody>
+          <a:bodyPr vert="horz" lIns="91440" tIns="45720" rIns="91440" bIns="45720" rtlCol="0"/>
+          <a:lstStyle>
+            <a:lvl1pPr algn="l">
+              <a:defRPr sz="1200"/>
+            </a:lvl1pPr>
+          </a:lstStyle>
+          <a:p>
+            <a:endParaRPr lang="en-US"/>
+          </a:p>
+        </p:txBody>
+      </p:sp>
+      <p:sp>
+        <p:nvSpPr>
+          <p:cNvPr id="3" name="Datumsplatzhalter 2"/>
+          <p:cNvSpPr>
+            <a:spLocks noGrp="1"/>
+          </p:cNvSpPr>
+          <p:nvPr>
+            <p:ph type="dt" idx="1"/>
+          </p:nvPr>
+        </p:nvSpPr>
+        <p:spPr>
+          <a:xfrm>
+            <a:off x="3884613" y="0"/>
+            <a:ext cx="2971800" cy="458788"/>
+          </a:xfrm>
+          <a:prstGeom prst="rect">
+            <a:avLst/>
+          </a:prstGeom>
+        </p:spPr>
+        <p:txBody>
+          <a:bodyPr vert="horz" lIns="91440" tIns="45720" rIns="91440" bIns="45720" rtlCol="0"/>
+          <a:lstStyle>
+            <a:lvl1pPr algn="r">
+              <a:defRPr sz="1200"/>
+            </a:lvl1pPr>
+          </a:lstStyle>
+          <a:p>
+            <a:fld id="{E9F177E8-A891-4900-BB83-4982DD9F05E1}" type="datetimeFigureOut">
+              <a:rPr lang="en-US" smtClean="0"/>
+              <a:t>1/18/2024</a:t>
+            </a:fld>
+            <a:endParaRPr lang="en-US"/>
+          </a:p>
+        </p:txBody>
+      </p:sp>
+      <p:sp>
+        <p:nvSpPr>
+          <p:cNvPr id="4" name="Folienbildplatzhalter 3"/>
+          <p:cNvSpPr>
+            <a:spLocks noGrp="1" noRot="1" noChangeAspect="1"/>
+          </p:cNvSpPr>
+          <p:nvPr>
+            <p:ph type="sldImg" idx="2"/>
+          </p:nvPr>
+        </p:nvSpPr>
+        <p:spPr>
+          <a:xfrm>
+            <a:off x="685800" y="1143000"/>
+            <a:ext cx="5486400" cy="3086100"/>
+          </a:xfrm>
+          <a:prstGeom prst="rect">
+            <a:avLst/>
+          </a:prstGeom>
+          <a:noFill/>
+          <a:ln w="12700">
+            <a:solidFill>
+              <a:prstClr val="black"/>
+            </a:solidFill>
+          </a:ln>
+        </p:spPr>
+        <p:txBody>
+          <a:bodyPr vert="horz" lIns="91440" tIns="45720" rIns="91440" bIns="45720" rtlCol="0" anchor="ctr"/>
+          <a:lstStyle/>
+          <a:p>
+            <a:endParaRPr lang="en-US"/>
+          </a:p>
+        </p:txBody>
+      </p:sp>
+      <p:sp>
+        <p:nvSpPr>
+          <p:cNvPr id="5" name="Notizenplatzhalter 4"/>
+          <p:cNvSpPr>
+            <a:spLocks noGrp="1"/>
+          </p:cNvSpPr>
+          <p:nvPr>
+            <p:ph type="body" sz="quarter" idx="3"/>
+          </p:nvPr>
+        </p:nvSpPr>
+        <p:spPr>
+          <a:xfrm>
+            <a:off x="685800" y="4400550"/>
+            <a:ext cx="5486400" cy="3600450"/>
+          </a:xfrm>
+          <a:prstGeom prst="rect">
+            <a:avLst/>
+          </a:prstGeom>
+        </p:spPr>
+        <p:txBody>
+          <a:bodyPr vert="horz" lIns="91440" tIns="45720" rIns="91440" bIns="45720" rtlCol="0"/>
+          <a:lstStyle/>
+          <a:p>
+            <a:pPr lvl="0"/>
+            <a:r>
+              <a:rPr lang="de-DE"/>
+              <a:t>Mastertextformat bearbeiten</a:t>
+            </a:r>
+          </a:p>
+          <a:p>
+            <a:pPr lvl="1"/>
+            <a:r>
+              <a:rPr lang="de-DE"/>
+              <a:t>Zweite Ebene</a:t>
+            </a:r>
+          </a:p>
+          <a:p>
+            <a:pPr lvl="2"/>
+            <a:r>
+              <a:rPr lang="de-DE"/>
+              <a:t>Dritte Ebene</a:t>
+            </a:r>
+          </a:p>
+          <a:p>
+            <a:pPr lvl="3"/>
+            <a:r>
+              <a:rPr lang="de-DE"/>
+              <a:t>Vierte Ebene</a:t>
+            </a:r>
+          </a:p>
+          <a:p>
+            <a:pPr lvl="4"/>
+            <a:r>
+              <a:rPr lang="de-DE"/>
+              <a:t>Fünfte Ebene</a:t>
+            </a:r>
+            <a:endParaRPr lang="en-US"/>
+          </a:p>
+        </p:txBody>
+      </p:sp>
+      <p:sp>
+        <p:nvSpPr>
+          <p:cNvPr id="6" name="Fußzeilenplatzhalter 5"/>
+          <p:cNvSpPr>
+            <a:spLocks noGrp="1"/>
+          </p:cNvSpPr>
+          <p:nvPr>
+            <p:ph type="ftr" sz="quarter" idx="4"/>
+          </p:nvPr>
+        </p:nvSpPr>
+        <p:spPr>
+          <a:xfrm>
+            <a:off x="0" y="8685213"/>
+            <a:ext cx="2971800" cy="458787"/>
+          </a:xfrm>
+          <a:prstGeom prst="rect">
+            <a:avLst/>
+          </a:prstGeom>
+        </p:spPr>
+        <p:txBody>
+          <a:bodyPr vert="horz" lIns="91440" tIns="45720" rIns="91440" bIns="45720" rtlCol="0" anchor="b"/>
+          <a:lstStyle>
+            <a:lvl1pPr algn="l">
+              <a:defRPr sz="1200"/>
+            </a:lvl1pPr>
+          </a:lstStyle>
+          <a:p>
+            <a:endParaRPr lang="en-US"/>
+          </a:p>
+        </p:txBody>
+      </p:sp>
+      <p:sp>
+        <p:nvSpPr>
+          <p:cNvPr id="7" name="Foliennummernplatzhalter 6"/>
+          <p:cNvSpPr>
+            <a:spLocks noGrp="1"/>
+          </p:cNvSpPr>
+          <p:nvPr>
+            <p:ph type="sldNum" sz="quarter" idx="5"/>
+          </p:nvPr>
+        </p:nvSpPr>
+        <p:spPr>
+          <a:xfrm>
+            <a:off x="3884613" y="8685213"/>
+            <a:ext cx="2971800" cy="458787"/>
+          </a:xfrm>
+          <a:prstGeom prst="rect">
+            <a:avLst/>
+          </a:prstGeom>
+        </p:spPr>
+        <p:txBody>
+          <a:bodyPr vert="horz" lIns="91440" tIns="45720" rIns="91440" bIns="45720" rtlCol="0" anchor="b"/>
+          <a:lstStyle>
+            <a:lvl1pPr algn="r">
+              <a:defRPr sz="1200"/>
+            </a:lvl1pPr>
+          </a:lstStyle>
+          <a:p>
+            <a:fld id="{2002AA5A-1450-4FA9-BE3A-B2196509832E}" type="slidenum">
+              <a:rPr lang="en-US" smtClean="0"/>
+              <a:t>‹Nr.›</a:t>
+            </a:fld>
+            <a:endParaRPr lang="en-US"/>
+          </a:p>
+        </p:txBody>
+      </p:sp>
+    </p:spTree>
+    <p:extLst>
+      <p:ext uri="{BB962C8B-B14F-4D97-AF65-F5344CB8AC3E}">
+        <p14:creationId xmlns:p14="http://schemas.microsoft.com/office/powerpoint/2010/main" val="3842450063"/>
+      </p:ext>
+    </p:extLst>
+  </p:cSld>
+  <p:clrMap bg1="lt1" tx1="dk1" bg2="lt2" tx2="dk2" accent1="accent1" accent2="accent2" accent3="accent3" accent4="accent4" accent5="accent5" accent6="accent6" hlink="hlink" folHlink="folHlink"/>
+  <p:notesStyle>
+    <a:lvl1pPr marL="0" algn="l" defTabSz="914400" rtl="0" eaLnBrk="1" latinLnBrk="0" hangingPunct="1">
+      <a:defRPr sz="1200" kern="1200">
+        <a:solidFill>
+          <a:schemeClr val="tx1"/>
+        </a:solidFill>
+        <a:latin typeface="+mn-lt"/>
+        <a:ea typeface="+mn-ea"/>
+        <a:cs typeface="+mn-cs"/>
+      </a:defRPr>
+    </a:lvl1pPr>
+    <a:lvl2pPr marL="457200" algn="l" defTabSz="914400" rtl="0" eaLnBrk="1" latinLnBrk="0" hangingPunct="1">
+      <a:defRPr sz="1200" kern="1200">
+        <a:solidFill>
+          <a:schemeClr val="tx1"/>
+        </a:solidFill>
+        <a:latin typeface="+mn-lt"/>
+        <a:ea typeface="+mn-ea"/>
+        <a:cs typeface="+mn-cs"/>
+      </a:defRPr>
+    </a:lvl2pPr>
+    <a:lvl3pPr marL="914400" algn="l" defTabSz="914400" rtl="0" eaLnBrk="1" latinLnBrk="0" hangingPunct="1">
+      <a:defRPr sz="1200" kern="1200">
+        <a:solidFill>
+          <a:schemeClr val="tx1"/>
+        </a:solidFill>
+        <a:latin typeface="+mn-lt"/>
+        <a:ea typeface="+mn-ea"/>
+        <a:cs typeface="+mn-cs"/>
+      </a:defRPr>
+    </a:lvl3pPr>
+    <a:lvl4pPr marL="1371600" algn="l" defTabSz="914400" rtl="0" eaLnBrk="1" latinLnBrk="0" hangingPunct="1">
+      <a:defRPr sz="1200" kern="1200">
+        <a:solidFill>
+          <a:schemeClr val="tx1"/>
+        </a:solidFill>
+        <a:latin typeface="+mn-lt"/>
+        <a:ea typeface="+mn-ea"/>
+        <a:cs typeface="+mn-cs"/>
+      </a:defRPr>
+    </a:lvl4pPr>
+    <a:lvl5pPr marL="1828800" algn="l" defTabSz="914400" rtl="0" eaLnBrk="1" latinLnBrk="0" hangingPunct="1">
+      <a:defRPr sz="1200" kern="1200">
+        <a:solidFill>
+          <a:schemeClr val="tx1"/>
+        </a:solidFill>
+        <a:latin typeface="+mn-lt"/>
+        <a:ea typeface="+mn-ea"/>
+        <a:cs typeface="+mn-cs"/>
+      </a:defRPr>
+    </a:lvl5pPr>
+    <a:lvl6pPr marL="2286000" algn="l" defTabSz="914400" rtl="0" eaLnBrk="1" latinLnBrk="0" hangingPunct="1">
+      <a:defRPr sz="1200" kern="1200">
+        <a:solidFill>
+          <a:schemeClr val="tx1"/>
+        </a:solidFill>
+        <a:latin typeface="+mn-lt"/>
+        <a:ea typeface="+mn-ea"/>
+        <a:cs typeface="+mn-cs"/>
+      </a:defRPr>
+    </a:lvl6pPr>
+    <a:lvl7pPr marL="2743200" algn="l" defTabSz="914400" rtl="0" eaLnBrk="1" latinLnBrk="0" hangingPunct="1">
+      <a:defRPr sz="1200" kern="1200">
+        <a:solidFill>
+          <a:schemeClr val="tx1"/>
+        </a:solidFill>
+        <a:latin typeface="+mn-lt"/>
+        <a:ea typeface="+mn-ea"/>
+        <a:cs typeface="+mn-cs"/>
+      </a:defRPr>
+    </a:lvl7pPr>
+    <a:lvl8pPr marL="3200400" algn="l" defTabSz="914400" rtl="0" eaLnBrk="1" latinLnBrk="0" hangingPunct="1">
+      <a:defRPr sz="1200" kern="1200">
+        <a:solidFill>
+          <a:schemeClr val="tx1"/>
+        </a:solidFill>
+        <a:latin typeface="+mn-lt"/>
+        <a:ea typeface="+mn-ea"/>
+        <a:cs typeface="+mn-cs"/>
+      </a:defRPr>
+    </a:lvl8pPr>
+    <a:lvl9pPr marL="3657600" algn="l" defTabSz="914400" rtl="0" eaLnBrk="1" latinLnBrk="0" hangingPunct="1">
+      <a:defRPr sz="1200" kern="1200">
+        <a:solidFill>
+          <a:schemeClr val="tx1"/>
+        </a:solidFill>
+        <a:latin typeface="+mn-lt"/>
+        <a:ea typeface="+mn-ea"/>
+        <a:cs typeface="+mn-cs"/>
+      </a:defRPr>
+    </a:lvl9pPr>
+  </p:notesStyle>
+</p:notesMaster>
+</file>
+
+<file path=ppt/notesSlides/notesSlide1.xml><?xml version="1.0" encoding="utf-8"?>
+<p:notes xmlns:a="http://schemas.openxmlformats.org/drawingml/2006/main" xmlns:r="http://schemas.openxmlformats.org/officeDocument/2006/relationships" xmlns:p="http://schemas.openxmlformats.org/presentationml/2006/main">
+  <p:cSld>
+    <p:spTree>
+      <p:nvGrpSpPr>
+        <p:cNvPr id="1" name=""/>
+        <p:cNvGrpSpPr/>
+        <p:nvPr/>
+      </p:nvGrpSpPr>
+      <p:grpSpPr>
+        <a:xfrm>
+          <a:off x="0" y="0"/>
+          <a:ext cx="0" cy="0"/>
+          <a:chOff x="0" y="0"/>
+          <a:chExt cx="0" cy="0"/>
+        </a:xfrm>
+      </p:grpSpPr>
+      <p:sp>
+        <p:nvSpPr>
+          <p:cNvPr id="2" name="Folienbildplatzhalter 1"/>
+          <p:cNvSpPr>
+            <a:spLocks noGrp="1" noRot="1" noChangeAspect="1"/>
+          </p:cNvSpPr>
+          <p:nvPr>
+            <p:ph type="sldImg"/>
+          </p:nvPr>
+        </p:nvSpPr>
+        <p:spPr/>
+      </p:sp>
+      <p:sp>
+        <p:nvSpPr>
+          <p:cNvPr id="3" name="Notizenplatzhalter 2"/>
+          <p:cNvSpPr>
+            <a:spLocks noGrp="1"/>
+          </p:cNvSpPr>
+          <p:nvPr>
+            <p:ph type="body" idx="1"/>
+          </p:nvPr>
+        </p:nvSpPr>
+        <p:spPr/>
+        <p:txBody>
+          <a:bodyPr/>
+          <a:lstStyle/>
+          <a:p>
+            <a:endParaRPr lang="en-US" dirty="0"/>
+          </a:p>
+        </p:txBody>
+      </p:sp>
+      <p:sp>
+        <p:nvSpPr>
+          <p:cNvPr id="4" name="Foliennummernplatzhalter 3"/>
+          <p:cNvSpPr>
+            <a:spLocks noGrp="1"/>
+          </p:cNvSpPr>
+          <p:nvPr>
+            <p:ph type="sldNum" sz="quarter" idx="5"/>
+          </p:nvPr>
+        </p:nvSpPr>
+        <p:spPr/>
+        <p:txBody>
+          <a:bodyPr/>
+          <a:lstStyle/>
+          <a:p>
+            <a:fld id="{2002AA5A-1450-4FA9-BE3A-B2196509832E}" type="slidenum">
+              <a:rPr lang="en-US" smtClean="0"/>
+              <a:t>6</a:t>
+            </a:fld>
+            <a:endParaRPr lang="en-US"/>
+          </a:p>
+        </p:txBody>
+      </p:sp>
+    </p:spTree>
+    <p:extLst>
+      <p:ext uri="{BB962C8B-B14F-4D97-AF65-F5344CB8AC3E}">
+        <p14:creationId xmlns:p14="http://schemas.microsoft.com/office/powerpoint/2010/main" val="2063582390"/>
+      </p:ext>
+    </p:extLst>
+  </p:cSld>
+  <p:clrMapOvr>
+    <a:masterClrMapping/>
+  </p:clrMapOvr>
+</p:notes>
 </file>
 
 <file path=ppt/slideLayouts/slideLayout1.xml><?xml version="1.0" encoding="utf-8"?>
@@ -3352,6 +3789,17 @@
               <a:rPr lang="en-US" dirty="0"/>
               <a:t>Airbnb Database Presentation</a:t>
             </a:r>
+            <a:br>
+              <a:rPr lang="en-US" dirty="0"/>
+            </a:br>
+            <a:r>
+              <a:rPr lang="en-US" sz="1800" dirty="0">
+                <a:solidFill>
+                  <a:srgbClr val="9BAFB5"/>
+                </a:solidFill>
+              </a:rPr>
+              <a:t>Phase 2 - Implementation</a:t>
+            </a:r>
           </a:p>
         </p:txBody>
       </p:sp>
@@ -6243,23 +6691,6 @@
             </a:r>
           </a:p>
           <a:p>
-            <a:pPr marL="457200" indent="-457200">
-              <a:buFont typeface="+mj-lt"/>
-              <a:buAutoNum type="arabicPeriod"/>
-            </a:pPr>
-            <a:r>
-              <a:rPr lang="en-US" dirty="0"/>
-              <a:t>Conclusion &amp; Closing Thoughts</a:t>
-            </a:r>
-          </a:p>
-          <a:p>
-            <a:pPr marL="857250" lvl="1" indent="-457200">
-              <a:buFont typeface="+mj-lt"/>
-              <a:buAutoNum type="arabicPeriod"/>
-            </a:pPr>
-            <a:endParaRPr lang="en-US" dirty="0"/>
-          </a:p>
-          <a:p>
             <a:pPr marL="857250" lvl="1" indent="-457200">
               <a:buFont typeface="+mj-lt"/>
               <a:buAutoNum type="arabicPeriod"/>
@@ -9299,7 +9730,7 @@
             </a:pPr>
             <a:r>
               <a:rPr lang="en-US" dirty="0"/>
-              <a:t>This presentation is a part of the project of phase 2 and intends to provide an extensive overview of the database structure, it’s tables, relationships and constraints, as well as explain the reasoning behind them.</a:t>
+              <a:t>This presentation is a part of phase 2 and intends to provide extensive documentation of the database structure, it’s tables, relationships and constraints, as well as explain the provided test cases, and their results.</a:t>
             </a:r>
           </a:p>
           <a:p>
@@ -9333,7 +9764,7 @@
                   </a:schemeClr>
                 </a:solidFill>
               </a:rPr>
-              <a:t>*One table has been removed; all changes are explained in the following 2 slides.</a:t>
+              <a:t>*One table has been removed; all changes can be found on the following slide.</a:t>
             </a:r>
           </a:p>
         </p:txBody>
@@ -9532,7 +9963,7 @@
           <p:cNvPr id="2" name="Titel 1">
             <a:extLst>
               <a:ext uri="{FF2B5EF4-FFF2-40B4-BE49-F238E27FC236}">
-                <a16:creationId xmlns:a16="http://schemas.microsoft.com/office/drawing/2014/main" id="{F944425D-EEC9-C56C-995E-35260FD4D6EA}"/>
+                <a16:creationId xmlns:a16="http://schemas.microsoft.com/office/drawing/2014/main" id="{8B0C4D0F-EE18-C7A0-37AC-96F5A7D81B7E}"/>
               </a:ext>
             </a:extLst>
           </p:cNvPr>
@@ -9560,7 +9991,7 @@
           <p:cNvPr id="3" name="Inhaltsplatzhalter 2">
             <a:extLst>
               <a:ext uri="{FF2B5EF4-FFF2-40B4-BE49-F238E27FC236}">
-                <a16:creationId xmlns:a16="http://schemas.microsoft.com/office/drawing/2014/main" id="{48B8A92A-6F40-FC84-88A8-71D3E60D3746}"/>
+                <a16:creationId xmlns:a16="http://schemas.microsoft.com/office/drawing/2014/main" id="{5100F35A-0B39-5BDA-02DA-BC00A04FFDC1}"/>
               </a:ext>
             </a:extLst>
           </p:cNvPr>
@@ -9573,49 +10004,108 @@
         </p:nvSpPr>
         <p:spPr>
           <a:xfrm>
-            <a:off x="5848350" y="2638044"/>
-            <a:ext cx="4112514" cy="3101983"/>
+            <a:off x="2231136" y="2441194"/>
+            <a:ext cx="7729728" cy="3965956"/>
           </a:xfrm>
         </p:spPr>
         <p:txBody>
           <a:bodyPr>
-            <a:noAutofit/>
+            <a:normAutofit fontScale="77500" lnSpcReduction="20000"/>
           </a:bodyPr>
           <a:lstStyle/>
           <a:p>
             <a:r>
-              <a:rPr lang="en-US" sz="1450" dirty="0"/>
-              <a:t>I have made some small adjustments compared to the conception phase that I would like to illustrate before introducing the individual tables.</a:t>
-            </a:r>
-          </a:p>
-          <a:p>
-            <a:r>
-              <a:rPr lang="en-US" sz="1450" dirty="0"/>
-              <a:t>The changes are visualized in the following slide as well for easier viewing</a:t>
-            </a:r>
-          </a:p>
-          <a:p>
-            <a:r>
-              <a:rPr lang="en-US" sz="1450" dirty="0"/>
-              <a:t>The ‘government_id’ attribute in the ‘User’ table has been changed to ‘governmentid_image_id’ as I noticed that the application requests users to submit a picture of their id.</a:t>
-            </a:r>
-            <a:endParaRPr lang="en-US" sz="1450" dirty="0">
-              <a:solidFill>
-                <a:schemeClr val="tx2">
-                  <a:lumMod val="60000"/>
-                  <a:lumOff val="40000"/>
-                </a:schemeClr>
-              </a:solidFill>
-            </a:endParaRPr>
+              <a:rPr lang="en-US" dirty="0"/>
+              <a:t>I have decided to remove the triphistory table.  The idea behind the table was to improve the access to the bookings of a guest for easier access. There is however not a significant enough improvement to justify the redundancy.</a:t>
+            </a:r>
+          </a:p>
+          <a:p>
+            <a:r>
+              <a:rPr lang="en-US" dirty="0"/>
+              <a:t>There have been some adjustments to the attribute distribution of the user, guest and host tables after reflecting the requirements/constraints of the individual attributes.</a:t>
+            </a:r>
+          </a:p>
+          <a:p>
+            <a:r>
+              <a:rPr lang="en-US" dirty="0"/>
+              <a:t>The primary key’s now have more descriptive names.</a:t>
+            </a:r>
+          </a:p>
+          <a:p>
+            <a:r>
+              <a:rPr lang="en-US" dirty="0"/>
+              <a:t>Small additional changes include:</a:t>
+            </a:r>
+          </a:p>
+          <a:p>
+            <a:pPr lvl="1"/>
+            <a:r>
+              <a:rPr lang="en-US" dirty="0"/>
+              <a:t>Addresses now have an ‘address_type’ attribute</a:t>
+            </a:r>
+          </a:p>
+          <a:p>
+            <a:pPr lvl="1"/>
+            <a:r>
+              <a:rPr lang="en-US" dirty="0"/>
+              <a:t>User attribute ‘</a:t>
+            </a:r>
+            <a:r>
+              <a:rPr lang="en-US" sz="1600" dirty="0"/>
+              <a:t>‘government_id’ was changed to ‘governmentid_image_id’</a:t>
+            </a:r>
+            <a:endParaRPr lang="en-US" dirty="0"/>
+          </a:p>
+          <a:p>
+            <a:pPr lvl="1"/>
+            <a:r>
+              <a:rPr lang="en-US" dirty="0"/>
+              <a:t>Messages now have an ‘author_user_id’ attribute</a:t>
+            </a:r>
+          </a:p>
+          <a:p>
+            <a:pPr lvl="1"/>
+            <a:r>
+              <a:rPr lang="en-US" dirty="0"/>
+              <a:t>Bookings no longer have the ‘transaction_id’ attribute</a:t>
+            </a:r>
+          </a:p>
+          <a:p>
+            <a:pPr lvl="1"/>
+            <a:r>
+              <a:rPr lang="en-US" dirty="0"/>
+              <a:t>PropertyListing now has the ‘owning_host_id’ attribute</a:t>
+            </a:r>
+          </a:p>
+          <a:p>
+            <a:pPr lvl="1"/>
+            <a:r>
+              <a:rPr lang="en-US" dirty="0"/>
+              <a:t>PropertyReview attributes have changed to better align with the AirBnB app.</a:t>
+            </a:r>
+          </a:p>
+          <a:p>
+            <a:pPr lvl="1"/>
+            <a:r>
+              <a:rPr lang="en-US" dirty="0"/>
+              <a:t>Currency attribute ‘amount_usd’ was changed to ‘amount’</a:t>
+            </a:r>
+          </a:p>
+          <a:p>
+            <a:pPr lvl="1"/>
+            <a:r>
+              <a:rPr lang="en-US" dirty="0"/>
+              <a:t>BankInformation now has a ‘name’ attribute for the bank’s name</a:t>
+            </a:r>
           </a:p>
         </p:txBody>
       </p:sp>
       <p:pic>
         <p:nvPicPr>
-          <p:cNvPr id="8" name="Inhaltsplatzhalter 17" descr="Ein Bild, das Text, Screenshot, Quittung, Schrift enthält.&#10;&#10;Automatisch generierte Beschreibung">
-            <a:extLst>
-              <a:ext uri="{FF2B5EF4-FFF2-40B4-BE49-F238E27FC236}">
-                <a16:creationId xmlns:a16="http://schemas.microsoft.com/office/drawing/2014/main" id="{F03E0693-5436-C049-1884-F821990EEBB9}"/>
+          <p:cNvPr id="4" name="Grafik 3">
+            <a:extLst>
+              <a:ext uri="{FF2B5EF4-FFF2-40B4-BE49-F238E27FC236}">
+                <a16:creationId xmlns:a16="http://schemas.microsoft.com/office/drawing/2014/main" id="{A998EB67-5728-37A7-A3F3-1ADABA89308D}"/>
               </a:ext>
             </a:extLst>
           </p:cNvPr>
@@ -9638,130 +10128,6 @@
         </p:blipFill>
         <p:spPr>
           <a:xfrm>
-            <a:off x="2598546" y="2374520"/>
-            <a:ext cx="1724025" cy="1724025"/>
-          </a:xfrm>
-          <a:prstGeom prst="rect">
-            <a:avLst/>
-          </a:prstGeom>
-        </p:spPr>
-      </p:pic>
-      <p:pic>
-        <p:nvPicPr>
-          <p:cNvPr id="9" name="Inhaltsplatzhalter 15" descr="Ein Bild, das Text, Quittung, Screenshot, Schrift enthält.&#10;&#10;Automatisch generierte Beschreibung">
-            <a:extLst>
-              <a:ext uri="{FF2B5EF4-FFF2-40B4-BE49-F238E27FC236}">
-                <a16:creationId xmlns:a16="http://schemas.microsoft.com/office/drawing/2014/main" id="{0CB73777-BD19-D75F-7258-3C8D10520123}"/>
-              </a:ext>
-            </a:extLst>
-          </p:cNvPr>
-          <p:cNvPicPr>
-            <a:picLocks noChangeAspect="1"/>
-          </p:cNvPicPr>
-          <p:nvPr/>
-        </p:nvPicPr>
-        <p:blipFill>
-          <a:blip r:embed="rId3">
-            <a:extLst>
-              <a:ext uri="{28A0092B-C50C-407E-A947-70E740481C1C}">
-                <a14:useLocalDpi xmlns:a14="http://schemas.microsoft.com/office/drawing/2010/main" val="0"/>
-              </a:ext>
-            </a:extLst>
-          </a:blip>
-          <a:stretch>
-            <a:fillRect/>
-          </a:stretch>
-        </p:blipFill>
-        <p:spPr>
-          <a:xfrm>
-            <a:off x="2598546" y="4464050"/>
-            <a:ext cx="1724025" cy="1724025"/>
-          </a:xfrm>
-          <a:prstGeom prst="rect">
-            <a:avLst/>
-          </a:prstGeom>
-        </p:spPr>
-      </p:pic>
-      <p:sp>
-        <p:nvSpPr>
-          <p:cNvPr id="10" name="Pfeil: nach unten 9">
-            <a:extLst>
-              <a:ext uri="{FF2B5EF4-FFF2-40B4-BE49-F238E27FC236}">
-                <a16:creationId xmlns:a16="http://schemas.microsoft.com/office/drawing/2014/main" id="{4E73AC7D-2879-0A15-3F9F-C963BA665FA6}"/>
-              </a:ext>
-            </a:extLst>
-          </p:cNvPr>
-          <p:cNvSpPr/>
-          <p:nvPr/>
-        </p:nvSpPr>
-        <p:spPr>
-          <a:xfrm>
-            <a:off x="3251008" y="4098545"/>
-            <a:ext cx="419100" cy="365505"/>
-          </a:xfrm>
-          <a:prstGeom prst="downArrow">
-            <a:avLst>
-              <a:gd name="adj1" fmla="val 56060"/>
-              <a:gd name="adj2" fmla="val 67783"/>
-            </a:avLst>
-          </a:prstGeom>
-          <a:ln>
-            <a:noFill/>
-          </a:ln>
-        </p:spPr>
-        <p:style>
-          <a:lnRef idx="2">
-            <a:schemeClr val="accent2">
-              <a:shade val="15000"/>
-            </a:schemeClr>
-          </a:lnRef>
-          <a:fillRef idx="1">
-            <a:schemeClr val="accent2"/>
-          </a:fillRef>
-          <a:effectRef idx="0">
-            <a:schemeClr val="accent2"/>
-          </a:effectRef>
-          <a:fontRef idx="minor">
-            <a:schemeClr val="lt1"/>
-          </a:fontRef>
-        </p:style>
-        <p:txBody>
-          <a:bodyPr rtlCol="0" anchor="ctr"/>
-          <a:lstStyle/>
-          <a:p>
-            <a:pPr algn="ctr"/>
-            <a:endParaRPr lang="en-US"/>
-          </a:p>
-        </p:txBody>
-      </p:sp>
-      <p:pic>
-        <p:nvPicPr>
-          <p:cNvPr id="11" name="Grafik 10">
-            <a:extLst>
-              <a:ext uri="{FF2B5EF4-FFF2-40B4-BE49-F238E27FC236}">
-                <a16:creationId xmlns:a16="http://schemas.microsoft.com/office/drawing/2014/main" id="{D0ED2F57-07F9-2BCF-8800-B1752ACDED24}"/>
-              </a:ext>
-            </a:extLst>
-          </p:cNvPr>
-          <p:cNvPicPr>
-            <a:picLocks noChangeAspect="1"/>
-          </p:cNvPicPr>
-          <p:nvPr/>
-        </p:nvPicPr>
-        <p:blipFill>
-          <a:blip r:embed="rId4">
-            <a:extLst>
-              <a:ext uri="{28A0092B-C50C-407E-A947-70E740481C1C}">
-                <a14:useLocalDpi xmlns:a14="http://schemas.microsoft.com/office/drawing/2010/main" val="0"/>
-              </a:ext>
-            </a:extLst>
-          </a:blip>
-          <a:stretch>
-            <a:fillRect/>
-          </a:stretch>
-        </p:blipFill>
-        <p:spPr>
-          <a:xfrm>
             <a:off x="11633200" y="6299200"/>
             <a:ext cx="457200" cy="457200"/>
           </a:xfrm>
@@ -9773,7 +10139,7 @@
     </p:spTree>
     <p:extLst>
       <p:ext uri="{BB962C8B-B14F-4D97-AF65-F5344CB8AC3E}">
-        <p14:creationId xmlns:p14="http://schemas.microsoft.com/office/powerpoint/2010/main" val="2449291666"/>
+        <p14:creationId xmlns:p14="http://schemas.microsoft.com/office/powerpoint/2010/main" val="1591992961"/>
       </p:ext>
     </p:extLst>
   </p:cSld>
@@ -9805,7 +10171,7 @@
           <p:cNvPr id="2" name="Titel 1">
             <a:extLst>
               <a:ext uri="{FF2B5EF4-FFF2-40B4-BE49-F238E27FC236}">
-                <a16:creationId xmlns:a16="http://schemas.microsoft.com/office/drawing/2014/main" id="{8B0C4D0F-EE18-C7A0-37AC-96F5A7D81B7E}"/>
+                <a16:creationId xmlns:a16="http://schemas.microsoft.com/office/drawing/2014/main" id="{0091354D-B7DC-5D5B-520E-0D72F0528C48}"/>
               </a:ext>
             </a:extLst>
           </p:cNvPr>
@@ -9816,123 +10182,71 @@
             <p:ph type="title"/>
           </p:nvPr>
         </p:nvSpPr>
-        <p:spPr/>
+        <p:spPr>
+          <a:xfrm>
+            <a:off x="765449" y="884928"/>
+            <a:ext cx="4494998" cy="1134640"/>
+          </a:xfrm>
+        </p:spPr>
         <p:txBody>
           <a:bodyPr/>
           <a:lstStyle/>
           <a:p>
             <a:r>
               <a:rPr lang="en-US" dirty="0"/>
-              <a:t>Changes</a:t>
-            </a:r>
-          </a:p>
-        </p:txBody>
-      </p:sp>
-      <p:sp>
-        <p:nvSpPr>
-          <p:cNvPr id="3" name="Inhaltsplatzhalter 2">
-            <a:extLst>
-              <a:ext uri="{FF2B5EF4-FFF2-40B4-BE49-F238E27FC236}">
-                <a16:creationId xmlns:a16="http://schemas.microsoft.com/office/drawing/2014/main" id="{5100F35A-0B39-5BDA-02DA-BC00A04FFDC1}"/>
-              </a:ext>
-            </a:extLst>
-          </p:cNvPr>
-          <p:cNvSpPr>
-            <a:spLocks noGrp="1"/>
-          </p:cNvSpPr>
-          <p:nvPr>
-            <p:ph idx="1"/>
-          </p:nvPr>
-        </p:nvSpPr>
-        <p:spPr>
-          <a:xfrm>
-            <a:off x="2231136" y="2638044"/>
-            <a:ext cx="7729728" cy="3661156"/>
-          </a:xfrm>
-        </p:spPr>
-        <p:txBody>
-          <a:bodyPr>
-            <a:normAutofit fontScale="85000" lnSpcReduction="20000"/>
-          </a:bodyPr>
-          <a:lstStyle/>
-          <a:p>
-            <a:r>
-              <a:rPr lang="en-US" dirty="0"/>
-              <a:t>I have decided to remove the optional triphistory table. The idea behind the table was to improve the access to the bookings of a guest for easier access. There is however not a significant enough improvement to justify the redundancy.</a:t>
-            </a:r>
-          </a:p>
-          <a:p>
-            <a:r>
-              <a:rPr lang="en-US" dirty="0"/>
-              <a:t>There have been some adjustments to the attribute distribution of the user, guest and host tables after reflecting the requirements/constraints of the individual attributes.</a:t>
-            </a:r>
-          </a:p>
-          <a:p>
-            <a:r>
-              <a:rPr lang="en-US" dirty="0"/>
-              <a:t>Small additional changes include:</a:t>
-            </a:r>
-          </a:p>
-          <a:p>
-            <a:pPr lvl="1"/>
-            <a:r>
-              <a:rPr lang="en-US" dirty="0"/>
-              <a:t>Addresses now have an ‘address_type’ attribute</a:t>
-            </a:r>
-          </a:p>
-          <a:p>
-            <a:pPr lvl="1"/>
-            <a:r>
-              <a:rPr lang="en-US" dirty="0"/>
-              <a:t>Messages now have an ‘author_user_id’ attribute</a:t>
-            </a:r>
-          </a:p>
-          <a:p>
-            <a:pPr lvl="1"/>
-            <a:r>
-              <a:rPr lang="en-US" dirty="0"/>
-              <a:t>Bookings no longer have the ‘transaction_id’ attribute</a:t>
-            </a:r>
-          </a:p>
-          <a:p>
-            <a:pPr lvl="1"/>
-            <a:r>
-              <a:rPr lang="en-US" dirty="0"/>
-              <a:t>PropertyListing now has the ‘owning_host_id’ attribute</a:t>
-            </a:r>
-          </a:p>
-          <a:p>
-            <a:pPr lvl="1"/>
-            <a:r>
-              <a:rPr lang="en-US" dirty="0"/>
-              <a:t>PropertyReview attributes have changed to better align with the AirBnB app.</a:t>
-            </a:r>
-          </a:p>
-          <a:p>
-            <a:pPr lvl="1"/>
-            <a:r>
-              <a:rPr lang="en-US" dirty="0"/>
-              <a:t>Currency attribute ‘amount_usd’ was changed to ‘amount’</a:t>
-            </a:r>
-          </a:p>
-          <a:p>
-            <a:pPr lvl="1"/>
-            <a:r>
-              <a:rPr lang="en-US" dirty="0"/>
-              <a:t>BankInformation now has a ‘name’ attribute for the </a:t>
-            </a:r>
-            <a:r>
-              <a:rPr lang="en-US" dirty="0" err="1"/>
-              <a:t>Bankname</a:t>
-            </a:r>
-            <a:endParaRPr lang="en-US" dirty="0"/>
-          </a:p>
-          <a:p>
-            <a:pPr lvl="1"/>
-            <a:endParaRPr lang="en-US" dirty="0"/>
-          </a:p>
-          <a:p>
-            <a:endParaRPr lang="en-US" dirty="0"/>
+              <a:t>Structure</a:t>
+            </a:r>
+          </a:p>
+        </p:txBody>
+      </p:sp>
+      <p:sp>
+        <p:nvSpPr>
+          <p:cNvPr id="4" name="Textplatzhalter 3">
+            <a:extLst>
+              <a:ext uri="{FF2B5EF4-FFF2-40B4-BE49-F238E27FC236}">
+                <a16:creationId xmlns:a16="http://schemas.microsoft.com/office/drawing/2014/main" id="{540EC13E-B084-BC8A-68D5-ACF4BB2C69BA}"/>
+              </a:ext>
+            </a:extLst>
+          </p:cNvPr>
+          <p:cNvSpPr>
+            <a:spLocks noGrp="1"/>
+          </p:cNvSpPr>
+          <p:nvPr>
+            <p:ph type="body" sz="half" idx="2"/>
+          </p:nvPr>
+        </p:nvSpPr>
+        <p:spPr>
+          <a:xfrm>
+            <a:off x="1115568" y="2330450"/>
+            <a:ext cx="3794760" cy="3860800"/>
+          </a:xfrm>
+        </p:spPr>
+        <p:txBody>
+          <a:bodyPr/>
+          <a:lstStyle/>
+          <a:p>
+            <a:r>
+              <a:rPr lang="en-US" dirty="0"/>
+              <a:t>There are two main “blocks” of information the database needs to support: Users and Properties.</a:t>
+            </a:r>
+          </a:p>
+          <a:p>
+            <a:r>
+              <a:rPr lang="en-US" dirty="0"/>
+              <a:t>There are multiple tables facilitating each of these data sets, and their attributes.</a:t>
+            </a:r>
+          </a:p>
+          <a:p>
+            <a:r>
+              <a:rPr lang="en-US" dirty="0"/>
+              <a:t>The two categories of users, ‘guest’ and ‘host’ share a base ‘user’ class creating a joined subclass table strategy.</a:t>
+            </a:r>
+          </a:p>
+          <a:p>
+            <a:r>
+              <a:rPr lang="en-US" dirty="0"/>
+              <a:t>The ‘PropertyListing’ table includes relevant attributes for the properties offered on the page, multiple of which use N:M relations and therefore need to be normalized via additional tables.</a:t>
+            </a:r>
           </a:p>
           <a:p>
             <a:endParaRPr lang="en-US" dirty="0"/>
@@ -9941,10 +10255,10 @@
       </p:sp>
       <p:pic>
         <p:nvPicPr>
-          <p:cNvPr id="4" name="Grafik 3">
-            <a:extLst>
-              <a:ext uri="{FF2B5EF4-FFF2-40B4-BE49-F238E27FC236}">
-                <a16:creationId xmlns:a16="http://schemas.microsoft.com/office/drawing/2014/main" id="{A998EB67-5728-37A7-A3F3-1ADABA89308D}"/>
+          <p:cNvPr id="6" name="Grafik 5" descr="Ein Bild, das Text, Diagramm, Plan, parallel enthält.&#10;&#10;Automatisch generierte Beschreibung">
+            <a:extLst>
+              <a:ext uri="{FF2B5EF4-FFF2-40B4-BE49-F238E27FC236}">
+                <a16:creationId xmlns:a16="http://schemas.microsoft.com/office/drawing/2014/main" id="{DCBE5939-0CCA-23A5-39B6-C0695F1DC37C}"/>
               </a:ext>
             </a:extLst>
           </p:cNvPr>
@@ -9967,6 +10281,42 @@
         </p:blipFill>
         <p:spPr>
           <a:xfrm>
+            <a:off x="6096000" y="0"/>
+            <a:ext cx="6046470" cy="6858000"/>
+          </a:xfrm>
+          <a:prstGeom prst="rect">
+            <a:avLst/>
+          </a:prstGeom>
+        </p:spPr>
+      </p:pic>
+      <p:pic>
+        <p:nvPicPr>
+          <p:cNvPr id="26" name="Grafik 25">
+            <a:extLst>
+              <a:ext uri="{FF2B5EF4-FFF2-40B4-BE49-F238E27FC236}">
+                <a16:creationId xmlns:a16="http://schemas.microsoft.com/office/drawing/2014/main" id="{FADEB38D-BD98-1E57-78B5-562C49072371}"/>
+              </a:ext>
+            </a:extLst>
+          </p:cNvPr>
+          <p:cNvPicPr>
+            <a:picLocks noChangeAspect="1"/>
+          </p:cNvPicPr>
+          <p:nvPr/>
+        </p:nvPicPr>
+        <p:blipFill>
+          <a:blip r:embed="rId3">
+            <a:extLst>
+              <a:ext uri="{28A0092B-C50C-407E-A947-70E740481C1C}">
+                <a14:useLocalDpi xmlns:a14="http://schemas.microsoft.com/office/drawing/2010/main" val="0"/>
+              </a:ext>
+            </a:extLst>
+          </a:blip>
+          <a:stretch>
+            <a:fillRect/>
+          </a:stretch>
+        </p:blipFill>
+        <p:spPr>
+          <a:xfrm>
             <a:off x="11633200" y="6299200"/>
             <a:ext cx="457200" cy="457200"/>
           </a:xfrm>
@@ -9978,7 +10328,7 @@
     </p:spTree>
     <p:extLst>
       <p:ext uri="{BB962C8B-B14F-4D97-AF65-F5344CB8AC3E}">
-        <p14:creationId xmlns:p14="http://schemas.microsoft.com/office/powerpoint/2010/main" val="1591992961"/>
+        <p14:creationId xmlns:p14="http://schemas.microsoft.com/office/powerpoint/2010/main" val="3144123164"/>
       </p:ext>
     </p:extLst>
   </p:cSld>
@@ -10005,135 +10355,12 @@
           <a:chExt cx="0" cy="0"/>
         </a:xfrm>
       </p:grpSpPr>
-      <p:sp>
-        <p:nvSpPr>
-          <p:cNvPr id="2" name="Titel 1">
-            <a:extLst>
-              <a:ext uri="{FF2B5EF4-FFF2-40B4-BE49-F238E27FC236}">
-                <a16:creationId xmlns:a16="http://schemas.microsoft.com/office/drawing/2014/main" id="{0091354D-B7DC-5D5B-520E-0D72F0528C48}"/>
-              </a:ext>
-            </a:extLst>
-          </p:cNvPr>
-          <p:cNvSpPr>
-            <a:spLocks noGrp="1"/>
-          </p:cNvSpPr>
-          <p:nvPr>
-            <p:ph type="title"/>
-          </p:nvPr>
-        </p:nvSpPr>
-        <p:spPr>
-          <a:xfrm>
-            <a:off x="765449" y="884928"/>
-            <a:ext cx="4494998" cy="1134640"/>
-          </a:xfrm>
-        </p:spPr>
-        <p:txBody>
-          <a:bodyPr/>
-          <a:lstStyle/>
-          <a:p>
-            <a:r>
-              <a:rPr lang="en-US" dirty="0"/>
-              <a:t>Structure</a:t>
-            </a:r>
-          </a:p>
-        </p:txBody>
-      </p:sp>
-      <p:sp>
-        <p:nvSpPr>
-          <p:cNvPr id="4" name="Textplatzhalter 3">
-            <a:extLst>
-              <a:ext uri="{FF2B5EF4-FFF2-40B4-BE49-F238E27FC236}">
-                <a16:creationId xmlns:a16="http://schemas.microsoft.com/office/drawing/2014/main" id="{540EC13E-B084-BC8A-68D5-ACF4BB2C69BA}"/>
-              </a:ext>
-            </a:extLst>
-          </p:cNvPr>
-          <p:cNvSpPr>
-            <a:spLocks noGrp="1"/>
-          </p:cNvSpPr>
-          <p:nvPr>
-            <p:ph type="body" sz="half" idx="2"/>
-          </p:nvPr>
-        </p:nvSpPr>
-        <p:spPr>
-          <a:xfrm>
-            <a:off x="1115568" y="2330450"/>
-            <a:ext cx="3794760" cy="3860800"/>
-          </a:xfrm>
-        </p:spPr>
-        <p:txBody>
-          <a:bodyPr/>
-          <a:lstStyle/>
-          <a:p>
-            <a:r>
-              <a:rPr lang="en-US" dirty="0"/>
-              <a:t>There are two major “blocks” of information the database needs to support: Users and Properties.</a:t>
-            </a:r>
-          </a:p>
-          <a:p>
-            <a:r>
-              <a:rPr lang="en-US" dirty="0"/>
-              <a:t>There are multiple tables facilitating each of these data sets, and their attributes.</a:t>
-            </a:r>
-          </a:p>
-          <a:p>
-            <a:r>
-              <a:rPr lang="en-US" dirty="0"/>
-              <a:t>The two categories of users, ‘guest’ and ‘host’ share a base ‘user’ class creating a joined subclass table strategy.</a:t>
-            </a:r>
-          </a:p>
-          <a:p>
-            <a:r>
-              <a:rPr lang="en-US" dirty="0"/>
-              <a:t>The ‘PropertyListing’ table includes relevant attributes for the properties offered on the page, multiple of which use N:M relations and therefore need to be normalized via additional tables.</a:t>
-            </a:r>
-          </a:p>
-          <a:p>
-            <a:endParaRPr lang="en-US" dirty="0"/>
-          </a:p>
-        </p:txBody>
-      </p:sp>
       <p:pic>
         <p:nvPicPr>
-          <p:cNvPr id="6" name="Grafik 5" descr="Ein Bild, das Text, Diagramm, Plan, parallel enthält.&#10;&#10;Automatisch generierte Beschreibung">
-            <a:extLst>
-              <a:ext uri="{FF2B5EF4-FFF2-40B4-BE49-F238E27FC236}">
-                <a16:creationId xmlns:a16="http://schemas.microsoft.com/office/drawing/2014/main" id="{DCBE5939-0CCA-23A5-39B6-C0695F1DC37C}"/>
-              </a:ext>
-            </a:extLst>
-          </p:cNvPr>
-          <p:cNvPicPr>
-            <a:picLocks noChangeAspect="1"/>
-          </p:cNvPicPr>
-          <p:nvPr/>
-        </p:nvPicPr>
-        <p:blipFill>
-          <a:blip r:embed="rId2">
-            <a:extLst>
-              <a:ext uri="{28A0092B-C50C-407E-A947-70E740481C1C}">
-                <a14:useLocalDpi xmlns:a14="http://schemas.microsoft.com/office/drawing/2010/main" val="0"/>
-              </a:ext>
-            </a:extLst>
-          </a:blip>
-          <a:stretch>
-            <a:fillRect/>
-          </a:stretch>
-        </p:blipFill>
-        <p:spPr>
-          <a:xfrm>
-            <a:off x="6096000" y="0"/>
-            <a:ext cx="6046470" cy="6858000"/>
-          </a:xfrm>
-          <a:prstGeom prst="rect">
-            <a:avLst/>
-          </a:prstGeom>
-        </p:spPr>
-      </p:pic>
-      <p:pic>
-        <p:nvPicPr>
-          <p:cNvPr id="26" name="Grafik 25">
-            <a:extLst>
-              <a:ext uri="{FF2B5EF4-FFF2-40B4-BE49-F238E27FC236}">
-                <a16:creationId xmlns:a16="http://schemas.microsoft.com/office/drawing/2014/main" id="{FADEB38D-BD98-1E57-78B5-562C49072371}"/>
+          <p:cNvPr id="5" name="Grafik 4" descr="Ein Bild, das Text, Diagramm, Plan, parallel enthält.&#10;&#10;Automatisch generierte Beschreibung">
+            <a:extLst>
+              <a:ext uri="{FF2B5EF4-FFF2-40B4-BE49-F238E27FC236}">
+                <a16:creationId xmlns:a16="http://schemas.microsoft.com/office/drawing/2014/main" id="{8088F99C-14CB-4D43-4E56-EBC089B2E77E}"/>
               </a:ext>
             </a:extLst>
           </p:cNvPr>
@@ -10156,6 +10383,168 @@
         </p:blipFill>
         <p:spPr>
           <a:xfrm>
+            <a:off x="7541261" y="0"/>
+            <a:ext cx="4650739" cy="6858000"/>
+          </a:xfrm>
+          <a:prstGeom prst="rect">
+            <a:avLst/>
+          </a:prstGeom>
+        </p:spPr>
+      </p:pic>
+      <p:pic>
+        <p:nvPicPr>
+          <p:cNvPr id="7" name="Grafik 6" descr="Ein Bild, das Text, Diagramm, Plan, technische Zeichnung enthält.&#10;&#10;Automatisch generierte Beschreibung">
+            <a:extLst>
+              <a:ext uri="{FF2B5EF4-FFF2-40B4-BE49-F238E27FC236}">
+                <a16:creationId xmlns:a16="http://schemas.microsoft.com/office/drawing/2014/main" id="{FE9E2B74-528C-3465-3A4C-35CA31AEFBFA}"/>
+              </a:ext>
+            </a:extLst>
+          </p:cNvPr>
+          <p:cNvPicPr>
+            <a:picLocks noChangeAspect="1"/>
+          </p:cNvPicPr>
+          <p:nvPr/>
+        </p:nvPicPr>
+        <p:blipFill>
+          <a:blip r:embed="rId4">
+            <a:extLst>
+              <a:ext uri="{28A0092B-C50C-407E-A947-70E740481C1C}">
+                <a14:useLocalDpi xmlns:a14="http://schemas.microsoft.com/office/drawing/2010/main" val="0"/>
+              </a:ext>
+            </a:extLst>
+          </a:blip>
+          <a:stretch>
+            <a:fillRect/>
+          </a:stretch>
+        </p:blipFill>
+        <p:spPr>
+          <a:xfrm>
+            <a:off x="0" y="0"/>
+            <a:ext cx="4706158" cy="6858000"/>
+          </a:xfrm>
+          <a:prstGeom prst="rect">
+            <a:avLst/>
+          </a:prstGeom>
+        </p:spPr>
+      </p:pic>
+      <p:sp>
+        <p:nvSpPr>
+          <p:cNvPr id="8" name="Pfeil: nach unten 7">
+            <a:extLst>
+              <a:ext uri="{FF2B5EF4-FFF2-40B4-BE49-F238E27FC236}">
+                <a16:creationId xmlns:a16="http://schemas.microsoft.com/office/drawing/2014/main" id="{43158149-295C-4A90-4D52-1801AB0274CD}"/>
+              </a:ext>
+            </a:extLst>
+          </p:cNvPr>
+          <p:cNvSpPr/>
+          <p:nvPr/>
+        </p:nvSpPr>
+        <p:spPr>
+          <a:xfrm rot="16200000">
+            <a:off x="4801423" y="2012732"/>
+            <a:ext cx="2647142" cy="2832534"/>
+          </a:xfrm>
+          <a:prstGeom prst="downArrow">
+            <a:avLst>
+              <a:gd name="adj1" fmla="val 100000"/>
+              <a:gd name="adj2" fmla="val 100047"/>
+            </a:avLst>
+          </a:prstGeom>
+          <a:solidFill>
+            <a:schemeClr val="accent2"/>
+          </a:solidFill>
+          <a:ln>
+            <a:noFill/>
+          </a:ln>
+        </p:spPr>
+        <p:style>
+          <a:lnRef idx="2">
+            <a:schemeClr val="accent1">
+              <a:shade val="15000"/>
+            </a:schemeClr>
+          </a:lnRef>
+          <a:fillRef idx="1">
+            <a:schemeClr val="accent1"/>
+          </a:fillRef>
+          <a:effectRef idx="0">
+            <a:schemeClr val="accent1"/>
+          </a:effectRef>
+          <a:fontRef idx="minor">
+            <a:schemeClr val="lt1"/>
+          </a:fontRef>
+        </p:style>
+        <p:txBody>
+          <a:bodyPr rtlCol="0" anchor="ctr"/>
+          <a:lstStyle/>
+          <a:p>
+            <a:pPr algn="ctr"/>
+            <a:endParaRPr lang="en-US" dirty="0"/>
+          </a:p>
+        </p:txBody>
+      </p:sp>
+      <p:sp>
+        <p:nvSpPr>
+          <p:cNvPr id="2" name="Titel 1">
+            <a:extLst>
+              <a:ext uri="{FF2B5EF4-FFF2-40B4-BE49-F238E27FC236}">
+                <a16:creationId xmlns:a16="http://schemas.microsoft.com/office/drawing/2014/main" id="{DB05F02C-EC23-A54F-504E-E2EE6FCDAF10}"/>
+              </a:ext>
+            </a:extLst>
+          </p:cNvPr>
+          <p:cNvSpPr>
+            <a:spLocks noGrp="1"/>
+          </p:cNvSpPr>
+          <p:nvPr>
+            <p:ph type="title"/>
+          </p:nvPr>
+        </p:nvSpPr>
+        <p:spPr>
+          <a:xfrm>
+            <a:off x="5022850" y="0"/>
+            <a:ext cx="2190750" cy="6857999"/>
+          </a:xfrm>
+        </p:spPr>
+        <p:txBody>
+          <a:bodyPr>
+            <a:normAutofit/>
+          </a:bodyPr>
+          <a:lstStyle/>
+          <a:p>
+            <a:r>
+              <a:rPr lang="en-US" sz="2200" dirty="0"/>
+              <a:t>Structure Changes Overview</a:t>
+            </a:r>
+          </a:p>
+        </p:txBody>
+      </p:sp>
+      <p:pic>
+        <p:nvPicPr>
+          <p:cNvPr id="9" name="Grafik 8">
+            <a:extLst>
+              <a:ext uri="{FF2B5EF4-FFF2-40B4-BE49-F238E27FC236}">
+                <a16:creationId xmlns:a16="http://schemas.microsoft.com/office/drawing/2014/main" id="{A993257F-C99F-340F-8AD0-F6C51378F24A}"/>
+              </a:ext>
+            </a:extLst>
+          </p:cNvPr>
+          <p:cNvPicPr>
+            <a:picLocks noChangeAspect="1"/>
+          </p:cNvPicPr>
+          <p:nvPr/>
+        </p:nvPicPr>
+        <p:blipFill>
+          <a:blip r:embed="rId5">
+            <a:extLst>
+              <a:ext uri="{28A0092B-C50C-407E-A947-70E740481C1C}">
+                <a14:useLocalDpi xmlns:a14="http://schemas.microsoft.com/office/drawing/2010/main" val="0"/>
+              </a:ext>
+            </a:extLst>
+          </a:blip>
+          <a:stretch>
+            <a:fillRect/>
+          </a:stretch>
+        </p:blipFill>
+        <p:spPr>
+          <a:xfrm>
             <a:off x="11633200" y="6299200"/>
             <a:ext cx="457200" cy="457200"/>
           </a:xfrm>
@@ -10167,7 +10556,7 @@
     </p:spTree>
     <p:extLst>
       <p:ext uri="{BB962C8B-B14F-4D97-AF65-F5344CB8AC3E}">
-        <p14:creationId xmlns:p14="http://schemas.microsoft.com/office/powerpoint/2010/main" val="3144123164"/>
+        <p14:creationId xmlns:p14="http://schemas.microsoft.com/office/powerpoint/2010/main" val="1093401247"/>
       </p:ext>
     </p:extLst>
   </p:cSld>
@@ -11250,4 +11639,299 @@
     </a:ext>
   </a:extLst>
 </a:theme>
+</file>
+
+<file path=ppt/theme/theme2.xml><?xml version="1.0" encoding="utf-8"?>
+<a:theme xmlns:a="http://schemas.openxmlformats.org/drawingml/2006/main" name="Office">
+  <a:themeElements>
+    <a:clrScheme name="Office">
+      <a:dk1>
+        <a:sysClr val="windowText" lastClr="000000"/>
+      </a:dk1>
+      <a:lt1>
+        <a:sysClr val="window" lastClr="FFFFFF"/>
+      </a:lt1>
+      <a:dk2>
+        <a:srgbClr val="44546A"/>
+      </a:dk2>
+      <a:lt2>
+        <a:srgbClr val="E7E6E6"/>
+      </a:lt2>
+      <a:accent1>
+        <a:srgbClr val="4472C4"/>
+      </a:accent1>
+      <a:accent2>
+        <a:srgbClr val="ED7D31"/>
+      </a:accent2>
+      <a:accent3>
+        <a:srgbClr val="A5A5A5"/>
+      </a:accent3>
+      <a:accent4>
+        <a:srgbClr val="FFC000"/>
+      </a:accent4>
+      <a:accent5>
+        <a:srgbClr val="5B9BD5"/>
+      </a:accent5>
+      <a:accent6>
+        <a:srgbClr val="70AD47"/>
+      </a:accent6>
+      <a:hlink>
+        <a:srgbClr val="0563C1"/>
+      </a:hlink>
+      <a:folHlink>
+        <a:srgbClr val="954F72"/>
+      </a:folHlink>
+    </a:clrScheme>
+    <a:fontScheme name="Office">
+      <a:majorFont>
+        <a:latin typeface="Calibri Light" panose="020F0302020204030204"/>
+        <a:ea typeface=""/>
+        <a:cs typeface=""/>
+        <a:font script="Jpan" typeface="游ゴシック Light"/>
+        <a:font script="Hang" typeface="맑은 고딕"/>
+        <a:font script="Hans" typeface="等线 Light"/>
+        <a:font script="Hant" typeface="新細明體"/>
+        <a:font script="Arab" typeface="Times New Roman"/>
+        <a:font script="Hebr" typeface="Times New Roman"/>
+        <a:font script="Thai" typeface="Angsana New"/>
+        <a:font script="Ethi" typeface="Nyala"/>
+        <a:font script="Beng" typeface="Vrinda"/>
+        <a:font script="Gujr" typeface="Shruti"/>
+        <a:font script="Khmr" typeface="MoolBoran"/>
+        <a:font script="Knda" typeface="Tunga"/>
+        <a:font script="Guru" typeface="Raavi"/>
+        <a:font script="Cans" typeface="Euphemia"/>
+        <a:font script="Cher" typeface="Plantagenet Cherokee"/>
+        <a:font script="Yiii" typeface="Microsoft Yi Baiti"/>
+        <a:font script="Tibt" typeface="Microsoft Himalaya"/>
+        <a:font script="Thaa" typeface="MV Boli"/>
+        <a:font script="Deva" typeface="Mangal"/>
+        <a:font script="Telu" typeface="Gautami"/>
+        <a:font script="Taml" typeface="Latha"/>
+        <a:font script="Syrc" typeface="Estrangelo Edessa"/>
+        <a:font script="Orya" typeface="Kalinga"/>
+        <a:font script="Mlym" typeface="Kartika"/>
+        <a:font script="Laoo" typeface="DokChampa"/>
+        <a:font script="Sinh" typeface="Iskoola Pota"/>
+        <a:font script="Mong" typeface="Mongolian Baiti"/>
+        <a:font script="Viet" typeface="Times New Roman"/>
+        <a:font script="Uigh" typeface="Microsoft Uighur"/>
+        <a:font script="Geor" typeface="Sylfaen"/>
+        <a:font script="Armn" typeface="Arial"/>
+        <a:font script="Bugi" typeface="Leelawadee UI"/>
+        <a:font script="Bopo" typeface="Microsoft JhengHei"/>
+        <a:font script="Java" typeface="Javanese Text"/>
+        <a:font script="Lisu" typeface="Segoe UI"/>
+        <a:font script="Mymr" typeface="Myanmar Text"/>
+        <a:font script="Nkoo" typeface="Ebrima"/>
+        <a:font script="Olck" typeface="Nirmala UI"/>
+        <a:font script="Osma" typeface="Ebrima"/>
+        <a:font script="Phag" typeface="Phagspa"/>
+        <a:font script="Syrn" typeface="Estrangelo Edessa"/>
+        <a:font script="Syrj" typeface="Estrangelo Edessa"/>
+        <a:font script="Syre" typeface="Estrangelo Edessa"/>
+        <a:font script="Sora" typeface="Nirmala UI"/>
+        <a:font script="Tale" typeface="Microsoft Tai Le"/>
+        <a:font script="Talu" typeface="Microsoft New Tai Lue"/>
+        <a:font script="Tfng" typeface="Ebrima"/>
+      </a:majorFont>
+      <a:minorFont>
+        <a:latin typeface="Calibri" panose="020F0502020204030204"/>
+        <a:ea typeface=""/>
+        <a:cs typeface=""/>
+        <a:font script="Jpan" typeface="游ゴシック"/>
+        <a:font script="Hang" typeface="맑은 고딕"/>
+        <a:font script="Hans" typeface="等线"/>
+        <a:font script="Hant" typeface="新細明體"/>
+        <a:font script="Arab" typeface="Arial"/>
+        <a:font script="Hebr" typeface="Arial"/>
+        <a:font script="Thai" typeface="Cordia New"/>
+        <a:font script="Ethi" typeface="Nyala"/>
+        <a:font script="Beng" typeface="Vrinda"/>
+        <a:font script="Gujr" typeface="Shruti"/>
+        <a:font script="Khmr" typeface="DaunPenh"/>
+        <a:font script="Knda" typeface="Tunga"/>
+        <a:font script="Guru" typeface="Raavi"/>
+        <a:font script="Cans" typeface="Euphemia"/>
+        <a:font script="Cher" typeface="Plantagenet Cherokee"/>
+        <a:font script="Yiii" typeface="Microsoft Yi Baiti"/>
+        <a:font script="Tibt" typeface="Microsoft Himalaya"/>
+        <a:font script="Thaa" typeface="MV Boli"/>
+        <a:font script="Deva" typeface="Mangal"/>
+        <a:font script="Telu" typeface="Gautami"/>
+        <a:font script="Taml" typeface="Latha"/>
+        <a:font script="Syrc" typeface="Estrangelo Edessa"/>
+        <a:font script="Orya" typeface="Kalinga"/>
+        <a:font script="Mlym" typeface="Kartika"/>
+        <a:font script="Laoo" typeface="DokChampa"/>
+        <a:font script="Sinh" typeface="Iskoola Pota"/>
+        <a:font script="Mong" typeface="Mongolian Baiti"/>
+        <a:font script="Viet" typeface="Arial"/>
+        <a:font script="Uigh" typeface="Microsoft Uighur"/>
+        <a:font script="Geor" typeface="Sylfaen"/>
+        <a:font script="Armn" typeface="Arial"/>
+        <a:font script="Bugi" typeface="Leelawadee UI"/>
+        <a:font script="Bopo" typeface="Microsoft JhengHei"/>
+        <a:font script="Java" typeface="Javanese Text"/>
+        <a:font script="Lisu" typeface="Segoe UI"/>
+        <a:font script="Mymr" typeface="Myanmar Text"/>
+        <a:font script="Nkoo" typeface="Ebrima"/>
+        <a:font script="Olck" typeface="Nirmala UI"/>
+        <a:font script="Osma" typeface="Ebrima"/>
+        <a:font script="Phag" typeface="Phagspa"/>
+        <a:font script="Syrn" typeface="Estrangelo Edessa"/>
+        <a:font script="Syrj" typeface="Estrangelo Edessa"/>
+        <a:font script="Syre" typeface="Estrangelo Edessa"/>
+        <a:font script="Sora" typeface="Nirmala UI"/>
+        <a:font script="Tale" typeface="Microsoft Tai Le"/>
+        <a:font script="Talu" typeface="Microsoft New Tai Lue"/>
+        <a:font script="Tfng" typeface="Ebrima"/>
+      </a:minorFont>
+    </a:fontScheme>
+    <a:fmtScheme name="Office">
+      <a:fillStyleLst>
+        <a:solidFill>
+          <a:schemeClr val="phClr"/>
+        </a:solidFill>
+        <a:gradFill rotWithShape="1">
+          <a:gsLst>
+            <a:gs pos="0">
+              <a:schemeClr val="phClr">
+                <a:lumMod val="110000"/>
+                <a:satMod val="105000"/>
+                <a:tint val="67000"/>
+              </a:schemeClr>
+            </a:gs>
+            <a:gs pos="50000">
+              <a:schemeClr val="phClr">
+                <a:lumMod val="105000"/>
+                <a:satMod val="103000"/>
+                <a:tint val="73000"/>
+              </a:schemeClr>
+            </a:gs>
+            <a:gs pos="100000">
+              <a:schemeClr val="phClr">
+                <a:lumMod val="105000"/>
+                <a:satMod val="109000"/>
+                <a:tint val="81000"/>
+              </a:schemeClr>
+            </a:gs>
+          </a:gsLst>
+          <a:lin ang="5400000" scaled="0"/>
+        </a:gradFill>
+        <a:gradFill rotWithShape="1">
+          <a:gsLst>
+            <a:gs pos="0">
+              <a:schemeClr val="phClr">
+                <a:satMod val="103000"/>
+                <a:lumMod val="102000"/>
+                <a:tint val="94000"/>
+              </a:schemeClr>
+            </a:gs>
+            <a:gs pos="50000">
+              <a:schemeClr val="phClr">
+                <a:satMod val="110000"/>
+                <a:lumMod val="100000"/>
+                <a:shade val="100000"/>
+              </a:schemeClr>
+            </a:gs>
+            <a:gs pos="100000">
+              <a:schemeClr val="phClr">
+                <a:lumMod val="99000"/>
+                <a:satMod val="120000"/>
+                <a:shade val="78000"/>
+              </a:schemeClr>
+            </a:gs>
+          </a:gsLst>
+          <a:lin ang="5400000" scaled="0"/>
+        </a:gradFill>
+      </a:fillStyleLst>
+      <a:lnStyleLst>
+        <a:ln w="6350" cap="flat" cmpd="sng" algn="ctr">
+          <a:solidFill>
+            <a:schemeClr val="phClr"/>
+          </a:solidFill>
+          <a:prstDash val="solid"/>
+          <a:miter lim="800000"/>
+        </a:ln>
+        <a:ln w="12700" cap="flat" cmpd="sng" algn="ctr">
+          <a:solidFill>
+            <a:schemeClr val="phClr"/>
+          </a:solidFill>
+          <a:prstDash val="solid"/>
+          <a:miter lim="800000"/>
+        </a:ln>
+        <a:ln w="19050" cap="flat" cmpd="sng" algn="ctr">
+          <a:solidFill>
+            <a:schemeClr val="phClr"/>
+          </a:solidFill>
+          <a:prstDash val="solid"/>
+          <a:miter lim="800000"/>
+        </a:ln>
+      </a:lnStyleLst>
+      <a:effectStyleLst>
+        <a:effectStyle>
+          <a:effectLst/>
+        </a:effectStyle>
+        <a:effectStyle>
+          <a:effectLst/>
+        </a:effectStyle>
+        <a:effectStyle>
+          <a:effectLst>
+            <a:outerShdw blurRad="57150" dist="19050" dir="5400000" algn="ctr" rotWithShape="0">
+              <a:srgbClr val="000000">
+                <a:alpha val="63000"/>
+              </a:srgbClr>
+            </a:outerShdw>
+          </a:effectLst>
+        </a:effectStyle>
+      </a:effectStyleLst>
+      <a:bgFillStyleLst>
+        <a:solidFill>
+          <a:schemeClr val="phClr"/>
+        </a:solidFill>
+        <a:solidFill>
+          <a:schemeClr val="phClr">
+            <a:tint val="95000"/>
+            <a:satMod val="170000"/>
+          </a:schemeClr>
+        </a:solidFill>
+        <a:gradFill rotWithShape="1">
+          <a:gsLst>
+            <a:gs pos="0">
+              <a:schemeClr val="phClr">
+                <a:tint val="93000"/>
+                <a:satMod val="150000"/>
+                <a:shade val="98000"/>
+                <a:lumMod val="102000"/>
+              </a:schemeClr>
+            </a:gs>
+            <a:gs pos="50000">
+              <a:schemeClr val="phClr">
+                <a:tint val="98000"/>
+                <a:satMod val="130000"/>
+                <a:shade val="90000"/>
+                <a:lumMod val="103000"/>
+              </a:schemeClr>
+            </a:gs>
+            <a:gs pos="100000">
+              <a:schemeClr val="phClr">
+                <a:shade val="63000"/>
+                <a:satMod val="120000"/>
+              </a:schemeClr>
+            </a:gs>
+          </a:gsLst>
+          <a:lin ang="5400000" scaled="0"/>
+        </a:gradFill>
+      </a:bgFillStyleLst>
+    </a:fmtScheme>
+  </a:themeElements>
+  <a:objectDefaults/>
+  <a:extraClrSchemeLst/>
+  <a:extLst>
+    <a:ext uri="{05A4C25C-085E-4340-85A3-A5531E510DB2}">
+      <thm15:themeFamily xmlns:thm15="http://schemas.microsoft.com/office/thememl/2012/main" name="Office Theme" id="{62F939B6-93AF-4DB8-9C6B-D6C7DFDC589F}" vid="{4A3C46E8-61CC-4603-A589-7422A47A8E4A}"/>
+    </a:ext>
+  </a:extLst>
+</a:theme>
 </file>
</xml_diff>